<commit_message>
Presentacion - dia 2
</commit_message>
<xml_diff>
--- a/Presentacion/Presentacion_TFM_Eleazar_Rubio.pptx
+++ b/Presentacion/Presentacion_TFM_Eleazar_Rubio.pptx
@@ -5,7 +5,7 @@
     <p:sldMasterId id="2147483661" r:id="rId1"/>
   </p:sldMasterIdLst>
   <p:notesMasterIdLst>
-    <p:notesMasterId r:id="rId22"/>
+    <p:notesMasterId r:id="rId27"/>
   </p:notesMasterIdLst>
   <p:sldIdLst>
     <p:sldId id="278" r:id="rId2"/>
@@ -23,11 +23,16 @@
     <p:sldId id="308" r:id="rId14"/>
     <p:sldId id="282" r:id="rId15"/>
     <p:sldId id="283" r:id="rId16"/>
-    <p:sldId id="309" r:id="rId17"/>
-    <p:sldId id="307" r:id="rId18"/>
-    <p:sldId id="306" r:id="rId19"/>
-    <p:sldId id="299" r:id="rId20"/>
-    <p:sldId id="300" r:id="rId21"/>
+    <p:sldId id="311" r:id="rId17"/>
+    <p:sldId id="310" r:id="rId18"/>
+    <p:sldId id="312" r:id="rId19"/>
+    <p:sldId id="309" r:id="rId20"/>
+    <p:sldId id="307" r:id="rId21"/>
+    <p:sldId id="313" r:id="rId22"/>
+    <p:sldId id="306" r:id="rId23"/>
+    <p:sldId id="299" r:id="rId24"/>
+    <p:sldId id="314" r:id="rId25"/>
+    <p:sldId id="300" r:id="rId26"/>
   </p:sldIdLst>
   <p:sldSz cx="9144000" cy="6858000" type="screen4x3"/>
   <p:notesSz cx="6858000" cy="9144000"/>
@@ -227,7 +232,7 @@
           <a:p>
             <a:fld id="{7861D7D9-7EAA-4F56-AF8E-F0CD985F94AB}" type="datetimeFigureOut">
               <a:rPr lang="es-ES" smtClean="0"/>
-              <a:t>17/09/2017</a:t>
+              <a:t>18/09/2017</a:t>
             </a:fld>
             <a:endParaRPr lang="es-ES"/>
           </a:p>
@@ -935,6 +940,22 @@
           <a:bodyPr/>
           <a:lstStyle/>
           <a:p>
+            <a:r>
+              <a:rPr lang="es-ES" dirty="0" smtClean="0"/>
+              <a:t>Buscar iconos</a:t>
+            </a:r>
+            <a:r>
+              <a:rPr lang="es-ES" baseline="0" dirty="0" smtClean="0"/>
+              <a:t> que representen esto – Puede merecer la pena poner el código </a:t>
+            </a:r>
+            <a:r>
+              <a:rPr lang="es-ES" baseline="0" dirty="0" err="1" smtClean="0"/>
+              <a:t>Groovy</a:t>
+            </a:r>
+            <a:r>
+              <a:rPr lang="es-ES" baseline="0" dirty="0" smtClean="0"/>
+              <a:t> antes de esta diapositiva… aunque  lo pase rápido</a:t>
+            </a:r>
             <a:endParaRPr lang="es-ES" dirty="0"/>
           </a:p>
         </p:txBody>
@@ -1143,7 +1164,7 @@
     </p:spTree>
     <p:extLst>
       <p:ext uri="{BB962C8B-B14F-4D97-AF65-F5344CB8AC3E}">
-        <p14:creationId xmlns:p14="http://schemas.microsoft.com/office/powerpoint/2010/main" val="2680127700"/>
+        <p14:creationId xmlns:p14="http://schemas.microsoft.com/office/powerpoint/2010/main" val="762411186"/>
       </p:ext>
     </p:extLst>
   </p:cSld>
@@ -1232,7 +1253,7 @@
     </p:spTree>
     <p:extLst>
       <p:ext uri="{BB962C8B-B14F-4D97-AF65-F5344CB8AC3E}">
-        <p14:creationId xmlns:p14="http://schemas.microsoft.com/office/powerpoint/2010/main" val="765425707"/>
+        <p14:creationId xmlns:p14="http://schemas.microsoft.com/office/powerpoint/2010/main" val="2780533387"/>
       </p:ext>
     </p:extLst>
   </p:cSld>
@@ -1291,6 +1312,10 @@
           <a:bodyPr/>
           <a:lstStyle/>
           <a:p>
+            <a:r>
+              <a:rPr lang="es-ES" dirty="0" smtClean="0"/>
+              <a:t>Llevarme la línea verde hasta el final</a:t>
+            </a:r>
             <a:endParaRPr lang="es-ES" dirty="0"/>
           </a:p>
         </p:txBody>
@@ -1321,7 +1346,7 @@
     </p:spTree>
     <p:extLst>
       <p:ext uri="{BB962C8B-B14F-4D97-AF65-F5344CB8AC3E}">
-        <p14:creationId xmlns:p14="http://schemas.microsoft.com/office/powerpoint/2010/main" val="79280480"/>
+        <p14:creationId xmlns:p14="http://schemas.microsoft.com/office/powerpoint/2010/main" val="93902462"/>
       </p:ext>
     </p:extLst>
   </p:cSld>
@@ -1380,18 +1405,6 @@
           <a:bodyPr/>
           <a:lstStyle/>
           <a:p>
-            <a:r>
-              <a:rPr lang="es-ES" dirty="0" smtClean="0"/>
-              <a:t>Añadir los iconos</a:t>
-            </a:r>
-            <a:r>
-              <a:rPr lang="es-ES" baseline="0" dirty="0" smtClean="0"/>
-              <a:t> y refinar </a:t>
-            </a:r>
-            <a:r>
-              <a:rPr lang="es-ES" baseline="0" smtClean="0"/>
-              <a:t>los objetivos</a:t>
-            </a:r>
             <a:endParaRPr lang="es-ES" dirty="0"/>
           </a:p>
         </p:txBody>
@@ -1422,7 +1435,96 @@
     </p:spTree>
     <p:extLst>
       <p:ext uri="{BB962C8B-B14F-4D97-AF65-F5344CB8AC3E}">
-        <p14:creationId xmlns:p14="http://schemas.microsoft.com/office/powerpoint/2010/main" val="996630092"/>
+        <p14:creationId xmlns:p14="http://schemas.microsoft.com/office/powerpoint/2010/main" val="2680127700"/>
+      </p:ext>
+    </p:extLst>
+  </p:cSld>
+  <p:clrMapOvr>
+    <a:masterClrMapping/>
+  </p:clrMapOvr>
+</p:notes>
+</file>
+
+<file path=ppt/notesSlides/notesSlide19.xml><?xml version="1.0" encoding="utf-8"?>
+<p:notes xmlns:a="http://schemas.openxmlformats.org/drawingml/2006/main" xmlns:r="http://schemas.openxmlformats.org/officeDocument/2006/relationships" xmlns:p="http://schemas.openxmlformats.org/presentationml/2006/main">
+  <p:cSld>
+    <p:spTree>
+      <p:nvGrpSpPr>
+        <p:cNvPr id="1" name=""/>
+        <p:cNvGrpSpPr/>
+        <p:nvPr/>
+      </p:nvGrpSpPr>
+      <p:grpSpPr>
+        <a:xfrm>
+          <a:off x="0" y="0"/>
+          <a:ext cx="0" cy="0"/>
+          <a:chOff x="0" y="0"/>
+          <a:chExt cx="0" cy="0"/>
+        </a:xfrm>
+      </p:grpSpPr>
+      <p:sp>
+        <p:nvSpPr>
+          <p:cNvPr id="2" name="Marcador de imagen de diapositiva 1"/>
+          <p:cNvSpPr>
+            <a:spLocks noGrp="1" noRot="1" noChangeAspect="1"/>
+          </p:cNvSpPr>
+          <p:nvPr>
+            <p:ph type="sldImg"/>
+          </p:nvPr>
+        </p:nvSpPr>
+        <p:spPr>
+          <a:xfrm>
+            <a:off x="1371600" y="1143000"/>
+            <a:ext cx="4114800" cy="3086100"/>
+          </a:xfrm>
+        </p:spPr>
+      </p:sp>
+      <p:sp>
+        <p:nvSpPr>
+          <p:cNvPr id="3" name="Marcador de notas 2"/>
+          <p:cNvSpPr>
+            <a:spLocks noGrp="1"/>
+          </p:cNvSpPr>
+          <p:nvPr>
+            <p:ph type="body" idx="1"/>
+          </p:nvPr>
+        </p:nvSpPr>
+        <p:spPr/>
+        <p:txBody>
+          <a:bodyPr/>
+          <a:lstStyle/>
+          <a:p>
+            <a:endParaRPr lang="es-ES" dirty="0"/>
+          </a:p>
+        </p:txBody>
+      </p:sp>
+      <p:sp>
+        <p:nvSpPr>
+          <p:cNvPr id="4" name="Marcador de número de diapositiva 3"/>
+          <p:cNvSpPr>
+            <a:spLocks noGrp="1"/>
+          </p:cNvSpPr>
+          <p:nvPr>
+            <p:ph type="sldNum" sz="quarter" idx="10"/>
+          </p:nvPr>
+        </p:nvSpPr>
+        <p:spPr/>
+        <p:txBody>
+          <a:bodyPr/>
+          <a:lstStyle/>
+          <a:p>
+            <a:fld id="{A1DC9A57-F85E-4D53-A5E6-11962196CDE0}" type="slidenum">
+              <a:rPr lang="es-ES" smtClean="0"/>
+              <a:t>20</a:t>
+            </a:fld>
+            <a:endParaRPr lang="es-ES"/>
+          </a:p>
+        </p:txBody>
+      </p:sp>
+    </p:spTree>
+    <p:extLst>
+      <p:ext uri="{BB962C8B-B14F-4D97-AF65-F5344CB8AC3E}">
+        <p14:creationId xmlns:p14="http://schemas.microsoft.com/office/powerpoint/2010/main" val="765425707"/>
       </p:ext>
     </p:extLst>
   </p:cSld>
@@ -1520,6 +1622,406 @@
     <p:extLst>
       <p:ext uri="{BB962C8B-B14F-4D97-AF65-F5344CB8AC3E}">
         <p14:creationId xmlns:p14="http://schemas.microsoft.com/office/powerpoint/2010/main" val="3110249843"/>
+      </p:ext>
+    </p:extLst>
+  </p:cSld>
+  <p:clrMapOvr>
+    <a:masterClrMapping/>
+  </p:clrMapOvr>
+</p:notes>
+</file>
+
+<file path=ppt/notesSlides/notesSlide20.xml><?xml version="1.0" encoding="utf-8"?>
+<p:notes xmlns:a="http://schemas.openxmlformats.org/drawingml/2006/main" xmlns:r="http://schemas.openxmlformats.org/officeDocument/2006/relationships" xmlns:p="http://schemas.openxmlformats.org/presentationml/2006/main">
+  <p:cSld>
+    <p:spTree>
+      <p:nvGrpSpPr>
+        <p:cNvPr id="1" name=""/>
+        <p:cNvGrpSpPr/>
+        <p:nvPr/>
+      </p:nvGrpSpPr>
+      <p:grpSpPr>
+        <a:xfrm>
+          <a:off x="0" y="0"/>
+          <a:ext cx="0" cy="0"/>
+          <a:chOff x="0" y="0"/>
+          <a:chExt cx="0" cy="0"/>
+        </a:xfrm>
+      </p:grpSpPr>
+      <p:sp>
+        <p:nvSpPr>
+          <p:cNvPr id="2" name="Marcador de imagen de diapositiva 1"/>
+          <p:cNvSpPr>
+            <a:spLocks noGrp="1" noRot="1" noChangeAspect="1"/>
+          </p:cNvSpPr>
+          <p:nvPr>
+            <p:ph type="sldImg"/>
+          </p:nvPr>
+        </p:nvSpPr>
+        <p:spPr>
+          <a:xfrm>
+            <a:off x="1371600" y="1143000"/>
+            <a:ext cx="4114800" cy="3086100"/>
+          </a:xfrm>
+        </p:spPr>
+      </p:sp>
+      <p:sp>
+        <p:nvSpPr>
+          <p:cNvPr id="3" name="Marcador de notas 2"/>
+          <p:cNvSpPr>
+            <a:spLocks noGrp="1"/>
+          </p:cNvSpPr>
+          <p:nvPr>
+            <p:ph type="body" idx="1"/>
+          </p:nvPr>
+        </p:nvSpPr>
+        <p:spPr/>
+        <p:txBody>
+          <a:bodyPr/>
+          <a:lstStyle/>
+          <a:p>
+            <a:endParaRPr lang="es-ES" dirty="0"/>
+          </a:p>
+        </p:txBody>
+      </p:sp>
+      <p:sp>
+        <p:nvSpPr>
+          <p:cNvPr id="4" name="Marcador de número de diapositiva 3"/>
+          <p:cNvSpPr>
+            <a:spLocks noGrp="1"/>
+          </p:cNvSpPr>
+          <p:nvPr>
+            <p:ph type="sldNum" sz="quarter" idx="10"/>
+          </p:nvPr>
+        </p:nvSpPr>
+        <p:spPr/>
+        <p:txBody>
+          <a:bodyPr/>
+          <a:lstStyle/>
+          <a:p>
+            <a:fld id="{A1DC9A57-F85E-4D53-A5E6-11962196CDE0}" type="slidenum">
+              <a:rPr lang="es-ES" smtClean="0"/>
+              <a:t>21</a:t>
+            </a:fld>
+            <a:endParaRPr lang="es-ES"/>
+          </a:p>
+        </p:txBody>
+      </p:sp>
+    </p:spTree>
+    <p:extLst>
+      <p:ext uri="{BB962C8B-B14F-4D97-AF65-F5344CB8AC3E}">
+        <p14:creationId xmlns:p14="http://schemas.microsoft.com/office/powerpoint/2010/main" val="609960898"/>
+      </p:ext>
+    </p:extLst>
+  </p:cSld>
+  <p:clrMapOvr>
+    <a:masterClrMapping/>
+  </p:clrMapOvr>
+</p:notes>
+</file>
+
+<file path=ppt/notesSlides/notesSlide21.xml><?xml version="1.0" encoding="utf-8"?>
+<p:notes xmlns:a="http://schemas.openxmlformats.org/drawingml/2006/main" xmlns:r="http://schemas.openxmlformats.org/officeDocument/2006/relationships" xmlns:p="http://schemas.openxmlformats.org/presentationml/2006/main">
+  <p:cSld>
+    <p:spTree>
+      <p:nvGrpSpPr>
+        <p:cNvPr id="1" name=""/>
+        <p:cNvGrpSpPr/>
+        <p:nvPr/>
+      </p:nvGrpSpPr>
+      <p:grpSpPr>
+        <a:xfrm>
+          <a:off x="0" y="0"/>
+          <a:ext cx="0" cy="0"/>
+          <a:chOff x="0" y="0"/>
+          <a:chExt cx="0" cy="0"/>
+        </a:xfrm>
+      </p:grpSpPr>
+      <p:sp>
+        <p:nvSpPr>
+          <p:cNvPr id="2" name="Marcador de imagen de diapositiva 1"/>
+          <p:cNvSpPr>
+            <a:spLocks noGrp="1" noRot="1" noChangeAspect="1"/>
+          </p:cNvSpPr>
+          <p:nvPr>
+            <p:ph type="sldImg"/>
+          </p:nvPr>
+        </p:nvSpPr>
+        <p:spPr>
+          <a:xfrm>
+            <a:off x="1371600" y="1143000"/>
+            <a:ext cx="4114800" cy="3086100"/>
+          </a:xfrm>
+        </p:spPr>
+      </p:sp>
+      <p:sp>
+        <p:nvSpPr>
+          <p:cNvPr id="3" name="Marcador de notas 2"/>
+          <p:cNvSpPr>
+            <a:spLocks noGrp="1"/>
+          </p:cNvSpPr>
+          <p:nvPr>
+            <p:ph type="body" idx="1"/>
+          </p:nvPr>
+        </p:nvSpPr>
+        <p:spPr/>
+        <p:txBody>
+          <a:bodyPr/>
+          <a:lstStyle/>
+          <a:p>
+            <a:r>
+              <a:rPr lang="es-ES" dirty="0" smtClean="0"/>
+              <a:t>Vuelvo</a:t>
+            </a:r>
+            <a:r>
+              <a:rPr lang="es-ES" baseline="0" dirty="0" smtClean="0"/>
+              <a:t> a mostrar el análisis malo?? </a:t>
+            </a:r>
+            <a:r>
+              <a:rPr lang="es-ES" baseline="0" dirty="0" err="1" smtClean="0"/>
+              <a:t>Deberia</a:t>
+            </a:r>
+            <a:r>
+              <a:rPr lang="es-ES" baseline="0" dirty="0" smtClean="0"/>
+              <a:t> poner la pipeline </a:t>
+            </a:r>
+            <a:r>
+              <a:rPr lang="es-ES" baseline="0" dirty="0" err="1" smtClean="0"/>
+              <a:t>tambien</a:t>
+            </a:r>
+            <a:endParaRPr lang="es-ES" dirty="0"/>
+          </a:p>
+        </p:txBody>
+      </p:sp>
+      <p:sp>
+        <p:nvSpPr>
+          <p:cNvPr id="4" name="Marcador de número de diapositiva 3"/>
+          <p:cNvSpPr>
+            <a:spLocks noGrp="1"/>
+          </p:cNvSpPr>
+          <p:nvPr>
+            <p:ph type="sldNum" sz="quarter" idx="10"/>
+          </p:nvPr>
+        </p:nvSpPr>
+        <p:spPr/>
+        <p:txBody>
+          <a:bodyPr/>
+          <a:lstStyle/>
+          <a:p>
+            <a:fld id="{A1DC9A57-F85E-4D53-A5E6-11962196CDE0}" type="slidenum">
+              <a:rPr lang="es-ES" smtClean="0"/>
+              <a:t>22</a:t>
+            </a:fld>
+            <a:endParaRPr lang="es-ES"/>
+          </a:p>
+        </p:txBody>
+      </p:sp>
+    </p:spTree>
+    <p:extLst>
+      <p:ext uri="{BB962C8B-B14F-4D97-AF65-F5344CB8AC3E}">
+        <p14:creationId xmlns:p14="http://schemas.microsoft.com/office/powerpoint/2010/main" val="79280480"/>
+      </p:ext>
+    </p:extLst>
+  </p:cSld>
+  <p:clrMapOvr>
+    <a:masterClrMapping/>
+  </p:clrMapOvr>
+</p:notes>
+</file>
+
+<file path=ppt/notesSlides/notesSlide22.xml><?xml version="1.0" encoding="utf-8"?>
+<p:notes xmlns:a="http://schemas.openxmlformats.org/drawingml/2006/main" xmlns:r="http://schemas.openxmlformats.org/officeDocument/2006/relationships" xmlns:p="http://schemas.openxmlformats.org/presentationml/2006/main">
+  <p:cSld>
+    <p:spTree>
+      <p:nvGrpSpPr>
+        <p:cNvPr id="1" name=""/>
+        <p:cNvGrpSpPr/>
+        <p:nvPr/>
+      </p:nvGrpSpPr>
+      <p:grpSpPr>
+        <a:xfrm>
+          <a:off x="0" y="0"/>
+          <a:ext cx="0" cy="0"/>
+          <a:chOff x="0" y="0"/>
+          <a:chExt cx="0" cy="0"/>
+        </a:xfrm>
+      </p:grpSpPr>
+      <p:sp>
+        <p:nvSpPr>
+          <p:cNvPr id="2" name="Marcador de imagen de diapositiva 1"/>
+          <p:cNvSpPr>
+            <a:spLocks noGrp="1" noRot="1" noChangeAspect="1"/>
+          </p:cNvSpPr>
+          <p:nvPr>
+            <p:ph type="sldImg"/>
+          </p:nvPr>
+        </p:nvSpPr>
+        <p:spPr>
+          <a:xfrm>
+            <a:off x="1371600" y="1143000"/>
+            <a:ext cx="4114800" cy="3086100"/>
+          </a:xfrm>
+        </p:spPr>
+      </p:sp>
+      <p:sp>
+        <p:nvSpPr>
+          <p:cNvPr id="3" name="Marcador de notas 2"/>
+          <p:cNvSpPr>
+            <a:spLocks noGrp="1"/>
+          </p:cNvSpPr>
+          <p:nvPr>
+            <p:ph type="body" idx="1"/>
+          </p:nvPr>
+        </p:nvSpPr>
+        <p:spPr/>
+        <p:txBody>
+          <a:bodyPr/>
+          <a:lstStyle/>
+          <a:p>
+            <a:r>
+              <a:rPr lang="es-ES" dirty="0" smtClean="0"/>
+              <a:t>Añadir los iconos</a:t>
+            </a:r>
+            <a:r>
+              <a:rPr lang="es-ES" baseline="0" dirty="0" smtClean="0"/>
+              <a:t> y refinar </a:t>
+            </a:r>
+            <a:r>
+              <a:rPr lang="es-ES" baseline="0" smtClean="0"/>
+              <a:t>los objetivos</a:t>
+            </a:r>
+            <a:endParaRPr lang="es-ES" dirty="0"/>
+          </a:p>
+        </p:txBody>
+      </p:sp>
+      <p:sp>
+        <p:nvSpPr>
+          <p:cNvPr id="4" name="Marcador de número de diapositiva 3"/>
+          <p:cNvSpPr>
+            <a:spLocks noGrp="1"/>
+          </p:cNvSpPr>
+          <p:nvPr>
+            <p:ph type="sldNum" sz="quarter" idx="10"/>
+          </p:nvPr>
+        </p:nvSpPr>
+        <p:spPr/>
+        <p:txBody>
+          <a:bodyPr/>
+          <a:lstStyle/>
+          <a:p>
+            <a:fld id="{A1DC9A57-F85E-4D53-A5E6-11962196CDE0}" type="slidenum">
+              <a:rPr lang="es-ES" smtClean="0"/>
+              <a:t>23</a:t>
+            </a:fld>
+            <a:endParaRPr lang="es-ES"/>
+          </a:p>
+        </p:txBody>
+      </p:sp>
+    </p:spTree>
+    <p:extLst>
+      <p:ext uri="{BB962C8B-B14F-4D97-AF65-F5344CB8AC3E}">
+        <p14:creationId xmlns:p14="http://schemas.microsoft.com/office/powerpoint/2010/main" val="996630092"/>
+      </p:ext>
+    </p:extLst>
+  </p:cSld>
+  <p:clrMapOvr>
+    <a:masterClrMapping/>
+  </p:clrMapOvr>
+</p:notes>
+</file>
+
+<file path=ppt/notesSlides/notesSlide23.xml><?xml version="1.0" encoding="utf-8"?>
+<p:notes xmlns:a="http://schemas.openxmlformats.org/drawingml/2006/main" xmlns:r="http://schemas.openxmlformats.org/officeDocument/2006/relationships" xmlns:p="http://schemas.openxmlformats.org/presentationml/2006/main">
+  <p:cSld>
+    <p:spTree>
+      <p:nvGrpSpPr>
+        <p:cNvPr id="1" name=""/>
+        <p:cNvGrpSpPr/>
+        <p:nvPr/>
+      </p:nvGrpSpPr>
+      <p:grpSpPr>
+        <a:xfrm>
+          <a:off x="0" y="0"/>
+          <a:ext cx="0" cy="0"/>
+          <a:chOff x="0" y="0"/>
+          <a:chExt cx="0" cy="0"/>
+        </a:xfrm>
+      </p:grpSpPr>
+      <p:sp>
+        <p:nvSpPr>
+          <p:cNvPr id="2" name="Marcador de imagen de diapositiva 1"/>
+          <p:cNvSpPr>
+            <a:spLocks noGrp="1" noRot="1" noChangeAspect="1"/>
+          </p:cNvSpPr>
+          <p:nvPr>
+            <p:ph type="sldImg"/>
+          </p:nvPr>
+        </p:nvSpPr>
+        <p:spPr>
+          <a:xfrm>
+            <a:off x="1371600" y="1143000"/>
+            <a:ext cx="4114800" cy="3086100"/>
+          </a:xfrm>
+        </p:spPr>
+      </p:sp>
+      <p:sp>
+        <p:nvSpPr>
+          <p:cNvPr id="3" name="Marcador de notas 2"/>
+          <p:cNvSpPr>
+            <a:spLocks noGrp="1"/>
+          </p:cNvSpPr>
+          <p:nvPr>
+            <p:ph type="body" idx="1"/>
+          </p:nvPr>
+        </p:nvSpPr>
+        <p:spPr/>
+        <p:txBody>
+          <a:bodyPr/>
+          <a:lstStyle/>
+          <a:p>
+            <a:r>
+              <a:rPr lang="es-ES" dirty="0" smtClean="0"/>
+              <a:t>Cambias la</a:t>
+            </a:r>
+            <a:r>
+              <a:rPr lang="es-ES" baseline="0" dirty="0" smtClean="0"/>
+              <a:t> foto por una sin barra </a:t>
+            </a:r>
+            <a:r>
+              <a:rPr lang="es-ES" baseline="0" smtClean="0"/>
+              <a:t>de marcadores</a:t>
+            </a:r>
+            <a:endParaRPr lang="es-ES" dirty="0"/>
+          </a:p>
+        </p:txBody>
+      </p:sp>
+      <p:sp>
+        <p:nvSpPr>
+          <p:cNvPr id="4" name="Marcador de número de diapositiva 3"/>
+          <p:cNvSpPr>
+            <a:spLocks noGrp="1"/>
+          </p:cNvSpPr>
+          <p:nvPr>
+            <p:ph type="sldNum" sz="quarter" idx="10"/>
+          </p:nvPr>
+        </p:nvSpPr>
+        <p:spPr/>
+        <p:txBody>
+          <a:bodyPr/>
+          <a:lstStyle/>
+          <a:p>
+            <a:fld id="{A1DC9A57-F85E-4D53-A5E6-11962196CDE0}" type="slidenum">
+              <a:rPr lang="es-ES" smtClean="0"/>
+              <a:t>24</a:t>
+            </a:fld>
+            <a:endParaRPr lang="es-ES"/>
+          </a:p>
+        </p:txBody>
+      </p:sp>
+    </p:spTree>
+    <p:extLst>
+      <p:ext uri="{BB962C8B-B14F-4D97-AF65-F5344CB8AC3E}">
+        <p14:creationId xmlns:p14="http://schemas.microsoft.com/office/powerpoint/2010/main" val="361626942"/>
       </p:ext>
     </p:extLst>
   </p:cSld>
@@ -2013,7 +2515,11 @@
           <a:p>
             <a:r>
               <a:rPr lang="es-ES" dirty="0" smtClean="0"/>
-              <a:t>Esquema completo?</a:t>
+              <a:t>Mejor</a:t>
+            </a:r>
+            <a:r>
+              <a:rPr lang="es-ES" baseline="0" dirty="0" smtClean="0"/>
+              <a:t> con iconos</a:t>
             </a:r>
             <a:endParaRPr lang="es-ES" dirty="0"/>
           </a:p>
@@ -2275,7 +2781,7 @@
           <a:p>
             <a:fld id="{E902B559-1605-4DDA-9099-75E24B19782F}" type="datetimeFigureOut">
               <a:rPr lang="es-ES" smtClean="0"/>
-              <a:t>17/09/2017</a:t>
+              <a:t>18/09/2017</a:t>
             </a:fld>
             <a:endParaRPr lang="es-ES"/>
           </a:p>
@@ -2445,7 +2951,7 @@
           <a:p>
             <a:fld id="{E902B559-1605-4DDA-9099-75E24B19782F}" type="datetimeFigureOut">
               <a:rPr lang="es-ES" smtClean="0"/>
-              <a:t>17/09/2017</a:t>
+              <a:t>18/09/2017</a:t>
             </a:fld>
             <a:endParaRPr lang="es-ES"/>
           </a:p>
@@ -2625,7 +3131,7 @@
           <a:p>
             <a:fld id="{E902B559-1605-4DDA-9099-75E24B19782F}" type="datetimeFigureOut">
               <a:rPr lang="es-ES" smtClean="0"/>
-              <a:t>17/09/2017</a:t>
+              <a:t>18/09/2017</a:t>
             </a:fld>
             <a:endParaRPr lang="es-ES"/>
           </a:p>
@@ -3101,7 +3607,7 @@
           <a:p>
             <a:fld id="{E902B559-1605-4DDA-9099-75E24B19782F}" type="datetimeFigureOut">
               <a:rPr lang="es-ES" smtClean="0"/>
-              <a:t>17/09/2017</a:t>
+              <a:t>18/09/2017</a:t>
             </a:fld>
             <a:endParaRPr lang="es-ES"/>
           </a:p>
@@ -3345,7 +3851,7 @@
           <a:p>
             <a:fld id="{E902B559-1605-4DDA-9099-75E24B19782F}" type="datetimeFigureOut">
               <a:rPr lang="es-ES" smtClean="0"/>
-              <a:t>17/09/2017</a:t>
+              <a:t>18/09/2017</a:t>
             </a:fld>
             <a:endParaRPr lang="es-ES"/>
           </a:p>
@@ -3577,7 +4083,7 @@
           <a:p>
             <a:fld id="{E902B559-1605-4DDA-9099-75E24B19782F}" type="datetimeFigureOut">
               <a:rPr lang="es-ES" smtClean="0"/>
-              <a:t>17/09/2017</a:t>
+              <a:t>18/09/2017</a:t>
             </a:fld>
             <a:endParaRPr lang="es-ES"/>
           </a:p>
@@ -3944,7 +4450,7 @@
           <a:p>
             <a:fld id="{E902B559-1605-4DDA-9099-75E24B19782F}" type="datetimeFigureOut">
               <a:rPr lang="es-ES" smtClean="0"/>
-              <a:t>17/09/2017</a:t>
+              <a:t>18/09/2017</a:t>
             </a:fld>
             <a:endParaRPr lang="es-ES"/>
           </a:p>
@@ -4062,7 +4568,7 @@
           <a:p>
             <a:fld id="{E902B559-1605-4DDA-9099-75E24B19782F}" type="datetimeFigureOut">
               <a:rPr lang="es-ES" smtClean="0"/>
-              <a:t>17/09/2017</a:t>
+              <a:t>18/09/2017</a:t>
             </a:fld>
             <a:endParaRPr lang="es-ES"/>
           </a:p>
@@ -4157,7 +4663,7 @@
           <a:p>
             <a:fld id="{E902B559-1605-4DDA-9099-75E24B19782F}" type="datetimeFigureOut">
               <a:rPr lang="es-ES" smtClean="0"/>
-              <a:t>17/09/2017</a:t>
+              <a:t>18/09/2017</a:t>
             </a:fld>
             <a:endParaRPr lang="es-ES"/>
           </a:p>
@@ -4434,7 +4940,7 @@
           <a:p>
             <a:fld id="{E902B559-1605-4DDA-9099-75E24B19782F}" type="datetimeFigureOut">
               <a:rPr lang="es-ES" smtClean="0"/>
-              <a:t>17/09/2017</a:t>
+              <a:t>18/09/2017</a:t>
             </a:fld>
             <a:endParaRPr lang="es-ES"/>
           </a:p>
@@ -4691,7 +5197,7 @@
           <a:p>
             <a:fld id="{E902B559-1605-4DDA-9099-75E24B19782F}" type="datetimeFigureOut">
               <a:rPr lang="es-ES" smtClean="0"/>
-              <a:t>17/09/2017</a:t>
+              <a:t>18/09/2017</a:t>
             </a:fld>
             <a:endParaRPr lang="es-ES"/>
           </a:p>
@@ -4904,7 +5410,7 @@
           <a:p>
             <a:fld id="{E902B559-1605-4DDA-9099-75E24B19782F}" type="datetimeFigureOut">
               <a:rPr lang="es-ES" smtClean="0"/>
-              <a:t>17/09/2017</a:t>
+              <a:t>18/09/2017</a:t>
             </a:fld>
             <a:endParaRPr lang="es-ES"/>
           </a:p>
@@ -5639,7 +6145,7 @@
           <a:graphicData uri="http://schemas.openxmlformats.org/presentationml/2006/ole">
             <mc:AlternateContent xmlns:mc="http://schemas.openxmlformats.org/markup-compatibility/2006">
               <mc:Choice xmlns:v="urn:schemas-microsoft-com:vml" Requires="v">
-                <p:oleObj spid="_x0000_s1070" name="Acrobat Document" r:id="rId5" imgW="1904818" imgH="1904835" progId="AcroExch.Document.DC">
+                <p:oleObj spid="_x0000_s1096" name="Acrobat Document" r:id="rId5" imgW="1904818" imgH="1904835" progId="AcroExch.Document.DC">
                   <p:embed/>
                 </p:oleObj>
               </mc:Choice>
@@ -6700,7 +7206,7 @@
       </p:sp>
       <p:pic>
         <p:nvPicPr>
-          <p:cNvPr id="2" name="Imagen 1"/>
+          <p:cNvPr id="3" name="Imagen 2"/>
           <p:cNvPicPr>
             <a:picLocks noChangeAspect="1"/>
           </p:cNvPicPr>
@@ -6720,48 +7226,44 @@
         </p:blipFill>
         <p:spPr>
           <a:xfrm>
-            <a:off x="0" y="2370438"/>
-            <a:ext cx="9144000" cy="3262365"/>
+            <a:off x="385555" y="3865894"/>
+            <a:ext cx="8124254" cy="2714763"/>
           </a:xfrm>
           <a:prstGeom prst="rect">
             <a:avLst/>
           </a:prstGeom>
         </p:spPr>
       </p:pic>
-      <p:sp>
-        <p:nvSpPr>
-          <p:cNvPr id="11" name="CuadroTexto 10"/>
-          <p:cNvSpPr txBox="1"/>
-          <p:nvPr/>
-        </p:nvSpPr>
-        <p:spPr>
-          <a:xfrm>
-            <a:off x="3596842" y="5904024"/>
-            <a:ext cx="1930337" cy="553998"/>
-          </a:xfrm>
-          <a:prstGeom prst="rect">
-            <a:avLst/>
-          </a:prstGeom>
-          <a:noFill/>
-        </p:spPr>
-        <p:txBody>
-          <a:bodyPr wrap="none" rtlCol="0">
-            <a:spAutoFit/>
-          </a:bodyPr>
-          <a:lstStyle/>
-          <a:p>
-            <a:r>
-              <a:rPr lang="es-ES" sz="3000" b="1" dirty="0" smtClean="0">
-                <a:latin typeface="Century Gothic" panose="020B0502020202020204" pitchFamily="34" charset="0"/>
-              </a:rPr>
-              <a:t>Cambiar!</a:t>
-            </a:r>
-            <a:endParaRPr lang="es-ES" sz="3000" b="1" dirty="0">
-              <a:latin typeface="Century Gothic" panose="020B0502020202020204" pitchFamily="34" charset="0"/>
-            </a:endParaRPr>
-          </a:p>
-        </p:txBody>
-      </p:sp>
+      <p:pic>
+        <p:nvPicPr>
+          <p:cNvPr id="4" name="Imagen 3"/>
+          <p:cNvPicPr>
+            <a:picLocks noChangeAspect="1"/>
+          </p:cNvPicPr>
+          <p:nvPr/>
+        </p:nvPicPr>
+        <p:blipFill>
+          <a:blip r:embed="rId4">
+            <a:extLst>
+              <a:ext uri="{28A0092B-C50C-407E-A947-70E740481C1C}">
+                <a14:useLocalDpi xmlns:a14="http://schemas.microsoft.com/office/drawing/2010/main" val="0"/>
+              </a:ext>
+            </a:extLst>
+          </a:blip>
+          <a:stretch>
+            <a:fillRect/>
+          </a:stretch>
+        </p:blipFill>
+        <p:spPr>
+          <a:xfrm>
+            <a:off x="385554" y="1908390"/>
+            <a:ext cx="8124255" cy="1826383"/>
+          </a:xfrm>
+          <a:prstGeom prst="rect">
+            <a:avLst/>
+          </a:prstGeom>
+        </p:spPr>
+      </p:pic>
     </p:spTree>
     <p:extLst>
       <p:ext uri="{BB962C8B-B14F-4D97-AF65-F5344CB8AC3E}">
@@ -7052,18 +7554,125 @@
               </a:rPr>
               <a:t>Jenkins CI – Configuración inicial</a:t>
             </a:r>
-            <a:endParaRPr lang="en" sz="2000" b="1" dirty="0">
-              <a:solidFill>
-                <a:schemeClr val="bg1"/>
-              </a:solidFill>
-              <a:latin typeface="Century Gothic" panose="020B0502020202020204" pitchFamily="34" charset="0"/>
-              <a:ea typeface="Quicksand"/>
-              <a:cs typeface="Quicksand"/>
-              <a:sym typeface="Quicksand"/>
-            </a:endParaRPr>
-          </a:p>
-        </p:txBody>
-      </p:sp>
+          </a:p>
+        </p:txBody>
+      </p:sp>
+      <p:pic>
+        <p:nvPicPr>
+          <p:cNvPr id="2" name="Imagen 1"/>
+          <p:cNvPicPr>
+            <a:picLocks noChangeAspect="1"/>
+          </p:cNvPicPr>
+          <p:nvPr/>
+        </p:nvPicPr>
+        <p:blipFill rotWithShape="1">
+          <a:blip r:embed="rId3">
+            <a:extLst>
+              <a:ext uri="{28A0092B-C50C-407E-A947-70E740481C1C}">
+                <a14:useLocalDpi xmlns:a14="http://schemas.microsoft.com/office/drawing/2010/main" val="0"/>
+              </a:ext>
+            </a:extLst>
+          </a:blip>
+          <a:srcRect l="23510" t="11608" r="35476"/>
+          <a:stretch/>
+        </p:blipFill>
+        <p:spPr>
+          <a:xfrm>
+            <a:off x="385555" y="4459511"/>
+            <a:ext cx="3750355" cy="2169889"/>
+          </a:xfrm>
+          <a:prstGeom prst="rect">
+            <a:avLst/>
+          </a:prstGeom>
+        </p:spPr>
+      </p:pic>
+      <p:pic>
+        <p:nvPicPr>
+          <p:cNvPr id="4" name="Imagen 3"/>
+          <p:cNvPicPr>
+            <a:picLocks noChangeAspect="1"/>
+          </p:cNvPicPr>
+          <p:nvPr/>
+        </p:nvPicPr>
+        <p:blipFill rotWithShape="1">
+          <a:blip r:embed="rId4">
+            <a:extLst>
+              <a:ext uri="{28A0092B-C50C-407E-A947-70E740481C1C}">
+                <a14:useLocalDpi xmlns:a14="http://schemas.microsoft.com/office/drawing/2010/main" val="0"/>
+              </a:ext>
+            </a:extLst>
+          </a:blip>
+          <a:srcRect l="23508" t="9233" r="23159"/>
+          <a:stretch/>
+        </p:blipFill>
+        <p:spPr>
+          <a:xfrm>
+            <a:off x="-4523" y="1539486"/>
+            <a:ext cx="4552460" cy="2592331"/>
+          </a:xfrm>
+          <a:prstGeom prst="rect">
+            <a:avLst/>
+          </a:prstGeom>
+        </p:spPr>
+      </p:pic>
+      <p:pic>
+        <p:nvPicPr>
+          <p:cNvPr id="3" name="Imagen 2"/>
+          <p:cNvPicPr>
+            <a:picLocks noChangeAspect="1"/>
+          </p:cNvPicPr>
+          <p:nvPr/>
+        </p:nvPicPr>
+        <p:blipFill rotWithShape="1">
+          <a:blip r:embed="rId5">
+            <a:extLst>
+              <a:ext uri="{28A0092B-C50C-407E-A947-70E740481C1C}">
+                <a14:useLocalDpi xmlns:a14="http://schemas.microsoft.com/office/drawing/2010/main" val="0"/>
+              </a:ext>
+            </a:extLst>
+          </a:blip>
+          <a:srcRect r="43158" b="26936"/>
+          <a:stretch/>
+        </p:blipFill>
+        <p:spPr>
+          <a:xfrm>
+            <a:off x="4355432" y="3475266"/>
+            <a:ext cx="4788568" cy="3382733"/>
+          </a:xfrm>
+          <a:prstGeom prst="rect">
+            <a:avLst/>
+          </a:prstGeom>
+        </p:spPr>
+      </p:pic>
+      <p:pic>
+        <p:nvPicPr>
+          <p:cNvPr id="5" name="Imagen 4"/>
+          <p:cNvPicPr>
+            <a:picLocks noChangeAspect="1"/>
+          </p:cNvPicPr>
+          <p:nvPr/>
+        </p:nvPicPr>
+        <p:blipFill rotWithShape="1">
+          <a:blip r:embed="rId6">
+            <a:extLst>
+              <a:ext uri="{28A0092B-C50C-407E-A947-70E740481C1C}">
+                <a14:useLocalDpi xmlns:a14="http://schemas.microsoft.com/office/drawing/2010/main" val="0"/>
+              </a:ext>
+            </a:extLst>
+          </a:blip>
+          <a:srcRect t="73575" r="34562"/>
+          <a:stretch/>
+        </p:blipFill>
+        <p:spPr>
+          <a:xfrm>
+            <a:off x="4710107" y="2263344"/>
+            <a:ext cx="4271723" cy="493796"/>
+          </a:xfrm>
+          <a:prstGeom prst="rect">
+            <a:avLst/>
+          </a:prstGeom>
+        </p:spPr>
+      </p:pic>
     </p:spTree>
     <p:extLst>
       <p:ext uri="{BB962C8B-B14F-4D97-AF65-F5344CB8AC3E}">
@@ -8575,46 +9184,36 @@
           </a:p>
         </p:txBody>
       </p:sp>
-      <p:sp>
-        <p:nvSpPr>
-          <p:cNvPr id="40" name="CuadroTexto 39"/>
-          <p:cNvSpPr txBox="1"/>
-          <p:nvPr/>
-        </p:nvSpPr>
-        <p:spPr>
-          <a:xfrm>
-            <a:off x="581594" y="3775680"/>
-            <a:ext cx="7960834" cy="553998"/>
-          </a:xfrm>
-          <a:prstGeom prst="rect">
-            <a:avLst/>
-          </a:prstGeom>
-          <a:noFill/>
-        </p:spPr>
-        <p:txBody>
-          <a:bodyPr wrap="none" rtlCol="0">
-            <a:spAutoFit/>
-          </a:bodyPr>
-          <a:lstStyle/>
-          <a:p>
-            <a:r>
-              <a:rPr lang="es-ES" sz="3000" b="1" dirty="0" smtClean="0">
-                <a:latin typeface="Century Gothic" panose="020B0502020202020204" pitchFamily="34" charset="0"/>
-              </a:rPr>
-              <a:t>Instrucción de ejecución de </a:t>
-            </a:r>
-            <a:r>
-              <a:rPr lang="es-ES" sz="3000" b="1" dirty="0" err="1" smtClean="0">
-                <a:latin typeface="Century Gothic" panose="020B0502020202020204" pitchFamily="34" charset="0"/>
-              </a:rPr>
-              <a:t>bundle-audit</a:t>
-            </a:r>
-            <a:endParaRPr lang="es-ES" sz="3000" b="1" dirty="0">
-              <a:latin typeface="Century Gothic" panose="020B0502020202020204" pitchFamily="34" charset="0"/>
-            </a:endParaRPr>
-          </a:p>
-        </p:txBody>
-      </p:sp>
+      <p:pic>
+        <p:nvPicPr>
+          <p:cNvPr id="2" name="Imagen 1"/>
+          <p:cNvPicPr>
+            <a:picLocks noChangeAspect="1"/>
+          </p:cNvPicPr>
+          <p:nvPr/>
+        </p:nvPicPr>
+        <p:blipFill>
+          <a:blip r:embed="rId3">
+            <a:extLst>
+              <a:ext uri="{28A0092B-C50C-407E-A947-70E740481C1C}">
+                <a14:useLocalDpi xmlns:a14="http://schemas.microsoft.com/office/drawing/2010/main" val="0"/>
+              </a:ext>
+            </a:extLst>
+          </a:blip>
+          <a:stretch>
+            <a:fillRect/>
+          </a:stretch>
+        </p:blipFill>
+        <p:spPr>
+          <a:xfrm>
+            <a:off x="0" y="1729937"/>
+            <a:ext cx="9144000" cy="4910430"/>
+          </a:xfrm>
+          <a:prstGeom prst="rect">
+            <a:avLst/>
+          </a:prstGeom>
+        </p:spPr>
+      </p:pic>
     </p:spTree>
     <p:extLst>
       <p:ext uri="{BB962C8B-B14F-4D97-AF65-F5344CB8AC3E}">
@@ -8894,18 +9493,6 @@
               </a:spcBef>
             </a:pPr>
             <a:r>
-              <a:rPr lang="en" sz="2000" b="1" dirty="0">
-                <a:solidFill>
-                  <a:srgbClr val="FFFFFF"/>
-                </a:solidFill>
-                <a:latin typeface="Century Gothic" panose="020B0502020202020204" pitchFamily="34" charset="0"/>
-                <a:ea typeface="Quicksand"/>
-                <a:cs typeface="Quicksand"/>
-                <a:sym typeface="Quicksand"/>
-              </a:rPr>
-              <a:t>Dependencias </a:t>
-            </a:r>
-            <a:r>
               <a:rPr lang="en" sz="2000" b="1" dirty="0" smtClean="0">
                 <a:solidFill>
                   <a:srgbClr val="FFFFFF"/>
@@ -8915,31 +9502,7 @@
                 <a:cs typeface="Quicksand"/>
                 <a:sym typeface="Quicksand"/>
               </a:rPr>
-              <a:t>Node JS </a:t>
-            </a:r>
-            <a:r>
-              <a:rPr lang="en" sz="2000" b="1" dirty="0">
-                <a:solidFill>
-                  <a:srgbClr val="FFFFFF"/>
-                </a:solidFill>
-                <a:latin typeface="Century Gothic" panose="020B0502020202020204" pitchFamily="34" charset="0"/>
-                <a:ea typeface="Quicksand"/>
-                <a:cs typeface="Quicksand"/>
-                <a:sym typeface="Quicksand"/>
-              </a:rPr>
-              <a:t>– </a:t>
-            </a:r>
-            <a:r>
-              <a:rPr lang="en" sz="2000" b="1" dirty="0" smtClean="0">
-                <a:solidFill>
-                  <a:srgbClr val="FFFFFF"/>
-                </a:solidFill>
-                <a:latin typeface="Century Gothic" panose="020B0502020202020204" pitchFamily="34" charset="0"/>
-                <a:ea typeface="Quicksand"/>
-                <a:cs typeface="Quicksand"/>
-                <a:sym typeface="Quicksand"/>
-              </a:rPr>
-              <a:t>package.json</a:t>
+              <a:t>Dependencias Ruby – Gemfile.lock</a:t>
             </a:r>
             <a:endParaRPr lang="en" sz="2000" b="1" dirty="0">
               <a:solidFill>
@@ -8953,50 +9516,99 @@
           </a:p>
         </p:txBody>
       </p:sp>
-      <p:sp>
-        <p:nvSpPr>
-          <p:cNvPr id="8" name="CuadroTexto 7"/>
-          <p:cNvSpPr txBox="1"/>
-          <p:nvPr/>
-        </p:nvSpPr>
-        <p:spPr>
-          <a:xfrm>
-            <a:off x="1462444" y="3586494"/>
-            <a:ext cx="6199133" cy="553998"/>
-          </a:xfrm>
-          <a:prstGeom prst="rect">
-            <a:avLst/>
-          </a:prstGeom>
-          <a:noFill/>
-        </p:spPr>
-        <p:txBody>
-          <a:bodyPr wrap="none" rtlCol="0">
-            <a:spAutoFit/>
-          </a:bodyPr>
-          <a:lstStyle/>
-          <a:p>
-            <a:r>
-              <a:rPr lang="es-ES" sz="3000" b="1" dirty="0" smtClean="0">
-                <a:latin typeface="Century Gothic" panose="020B0502020202020204" pitchFamily="34" charset="0"/>
-              </a:rPr>
-              <a:t>Instrucción de ejecución de </a:t>
-            </a:r>
-            <a:r>
-              <a:rPr lang="es-ES" sz="3000" b="1" dirty="0" err="1" smtClean="0">
-                <a:latin typeface="Century Gothic" panose="020B0502020202020204" pitchFamily="34" charset="0"/>
-              </a:rPr>
-              <a:t>nsp</a:t>
-            </a:r>
-            <a:endParaRPr lang="es-ES" sz="3000" b="1" dirty="0">
-              <a:latin typeface="Century Gothic" panose="020B0502020202020204" pitchFamily="34" charset="0"/>
-            </a:endParaRPr>
-          </a:p>
-        </p:txBody>
-      </p:sp>
+      <p:pic>
+        <p:nvPicPr>
+          <p:cNvPr id="3" name="Imagen 2"/>
+          <p:cNvPicPr>
+            <a:picLocks noChangeAspect="1"/>
+          </p:cNvPicPr>
+          <p:nvPr/>
+        </p:nvPicPr>
+        <p:blipFill>
+          <a:blip r:embed="rId3">
+            <a:extLst>
+              <a:ext uri="{28A0092B-C50C-407E-A947-70E740481C1C}">
+                <a14:useLocalDpi xmlns:a14="http://schemas.microsoft.com/office/drawing/2010/main" val="0"/>
+              </a:ext>
+            </a:extLst>
+          </a:blip>
+          <a:stretch>
+            <a:fillRect/>
+          </a:stretch>
+        </p:blipFill>
+        <p:spPr>
+          <a:xfrm>
+            <a:off x="385554" y="4749032"/>
+            <a:ext cx="8343774" cy="1699898"/>
+          </a:xfrm>
+          <a:prstGeom prst="rect">
+            <a:avLst/>
+          </a:prstGeom>
+        </p:spPr>
+      </p:pic>
+      <p:pic>
+        <p:nvPicPr>
+          <p:cNvPr id="4" name="Imagen 3"/>
+          <p:cNvPicPr>
+            <a:picLocks noChangeAspect="1"/>
+          </p:cNvPicPr>
+          <p:nvPr/>
+        </p:nvPicPr>
+        <p:blipFill>
+          <a:blip r:embed="rId4">
+            <a:extLst>
+              <a:ext uri="{28A0092B-C50C-407E-A947-70E740481C1C}">
+                <a14:useLocalDpi xmlns:a14="http://schemas.microsoft.com/office/drawing/2010/main" val="0"/>
+              </a:ext>
+            </a:extLst>
+          </a:blip>
+          <a:stretch>
+            <a:fillRect/>
+          </a:stretch>
+        </p:blipFill>
+        <p:spPr>
+          <a:xfrm>
+            <a:off x="385554" y="3863540"/>
+            <a:ext cx="8357393" cy="700775"/>
+          </a:xfrm>
+          <a:prstGeom prst="rect">
+            <a:avLst/>
+          </a:prstGeom>
+        </p:spPr>
+      </p:pic>
+      <p:pic>
+        <p:nvPicPr>
+          <p:cNvPr id="5" name="Imagen 4"/>
+          <p:cNvPicPr>
+            <a:picLocks noChangeAspect="1"/>
+          </p:cNvPicPr>
+          <p:nvPr/>
+        </p:nvPicPr>
+        <p:blipFill rotWithShape="1">
+          <a:blip r:embed="rId5">
+            <a:extLst>
+              <a:ext uri="{28A0092B-C50C-407E-A947-70E740481C1C}">
+                <a14:useLocalDpi xmlns:a14="http://schemas.microsoft.com/office/drawing/2010/main" val="0"/>
+              </a:ext>
+            </a:extLst>
+          </a:blip>
+          <a:srcRect b="46903"/>
+          <a:stretch/>
+        </p:blipFill>
+        <p:spPr>
+          <a:xfrm>
+            <a:off x="385554" y="1762590"/>
+            <a:ext cx="8343774" cy="1991264"/>
+          </a:xfrm>
+          <a:prstGeom prst="rect">
+            <a:avLst/>
+          </a:prstGeom>
+        </p:spPr>
+      </p:pic>
     </p:spTree>
     <p:extLst>
       <p:ext uri="{BB962C8B-B14F-4D97-AF65-F5344CB8AC3E}">
-        <p14:creationId xmlns:p14="http://schemas.microsoft.com/office/powerpoint/2010/main" val="992472818"/>
+        <p14:creationId xmlns:p14="http://schemas.microsoft.com/office/powerpoint/2010/main" val="2356824084"/>
       </p:ext>
     </p:extLst>
   </p:cSld>
@@ -9281,7 +9893,7 @@
                 <a:cs typeface="Quicksand"/>
                 <a:sym typeface="Quicksand"/>
               </a:rPr>
-              <a:t>Clair y Clairctl</a:t>
+              <a:t>Dependencias Ruby – Gemfile.lock</a:t>
             </a:r>
             <a:endParaRPr lang="en" sz="2000" b="1" dirty="0">
               <a:solidFill>
@@ -9295,50 +9907,40 @@
           </a:p>
         </p:txBody>
       </p:sp>
-      <p:sp>
-        <p:nvSpPr>
-          <p:cNvPr id="8" name="CuadroTexto 7"/>
-          <p:cNvSpPr txBox="1"/>
-          <p:nvPr/>
-        </p:nvSpPr>
-        <p:spPr>
-          <a:xfrm>
-            <a:off x="1167061" y="3649555"/>
-            <a:ext cx="6809878" cy="553998"/>
-          </a:xfrm>
-          <a:prstGeom prst="rect">
-            <a:avLst/>
-          </a:prstGeom>
-          <a:noFill/>
-        </p:spPr>
-        <p:txBody>
-          <a:bodyPr wrap="none" rtlCol="0">
-            <a:spAutoFit/>
-          </a:bodyPr>
-          <a:lstStyle/>
-          <a:p>
-            <a:r>
-              <a:rPr lang="es-ES" sz="3000" b="1" dirty="0" smtClean="0">
-                <a:latin typeface="Century Gothic" panose="020B0502020202020204" pitchFamily="34" charset="0"/>
-              </a:rPr>
-              <a:t>Instrucción de ejecución de </a:t>
-            </a:r>
-            <a:r>
-              <a:rPr lang="es-ES" sz="3000" b="1" dirty="0" err="1" smtClean="0">
-                <a:latin typeface="Century Gothic" panose="020B0502020202020204" pitchFamily="34" charset="0"/>
-              </a:rPr>
-              <a:t>clairctl</a:t>
-            </a:r>
-            <a:endParaRPr lang="es-ES" sz="3000" b="1" dirty="0">
-              <a:latin typeface="Century Gothic" panose="020B0502020202020204" pitchFamily="34" charset="0"/>
-            </a:endParaRPr>
-          </a:p>
-        </p:txBody>
-      </p:sp>
+      <p:pic>
+        <p:nvPicPr>
+          <p:cNvPr id="6" name="Imagen 5"/>
+          <p:cNvPicPr>
+            <a:picLocks noChangeAspect="1"/>
+          </p:cNvPicPr>
+          <p:nvPr/>
+        </p:nvPicPr>
+        <p:blipFill>
+          <a:blip r:embed="rId3">
+            <a:extLst>
+              <a:ext uri="{28A0092B-C50C-407E-A947-70E740481C1C}">
+                <a14:useLocalDpi xmlns:a14="http://schemas.microsoft.com/office/drawing/2010/main" val="0"/>
+              </a:ext>
+            </a:extLst>
+          </a:blip>
+          <a:stretch>
+            <a:fillRect/>
+          </a:stretch>
+        </p:blipFill>
+        <p:spPr>
+          <a:xfrm>
+            <a:off x="0" y="1504413"/>
+            <a:ext cx="9144000" cy="5295418"/>
+          </a:xfrm>
+          <a:prstGeom prst="rect">
+            <a:avLst/>
+          </a:prstGeom>
+        </p:spPr>
+      </p:pic>
     </p:spTree>
     <p:extLst>
       <p:ext uri="{BB962C8B-B14F-4D97-AF65-F5344CB8AC3E}">
-        <p14:creationId xmlns:p14="http://schemas.microsoft.com/office/powerpoint/2010/main" val="2711185006"/>
+        <p14:creationId xmlns:p14="http://schemas.microsoft.com/office/powerpoint/2010/main" val="78661258"/>
       </p:ext>
     </p:extLst>
   </p:cSld>
@@ -9623,7 +10225,7 @@
                 <a:cs typeface="Quicksand"/>
                 <a:sym typeface="Quicksand"/>
               </a:rPr>
-              <a:t>Evaluación de la solución</a:t>
+              <a:t>Dependencias Ruby – Gemfile.lock</a:t>
             </a:r>
             <a:endParaRPr lang="en" sz="2000" b="1" dirty="0">
               <a:solidFill>
@@ -9637,44 +10239,100 @@
           </a:p>
         </p:txBody>
       </p:sp>
-      <p:sp>
-        <p:nvSpPr>
-          <p:cNvPr id="8" name="CuadroTexto 7"/>
-          <p:cNvSpPr txBox="1"/>
-          <p:nvPr/>
-        </p:nvSpPr>
-        <p:spPr>
-          <a:xfrm>
-            <a:off x="1167061" y="3649555"/>
-            <a:ext cx="6664004" cy="553998"/>
-          </a:xfrm>
-          <a:prstGeom prst="rect">
-            <a:avLst/>
-          </a:prstGeom>
-          <a:noFill/>
-        </p:spPr>
-        <p:txBody>
-          <a:bodyPr wrap="none" rtlCol="0">
-            <a:spAutoFit/>
-          </a:bodyPr>
-          <a:lstStyle/>
-          <a:p>
-            <a:r>
-              <a:rPr lang="es-ES" sz="3000" b="1" dirty="0" smtClean="0">
-                <a:latin typeface="Century Gothic" panose="020B0502020202020204" pitchFamily="34" charset="0"/>
-              </a:rPr>
-              <a:t>Solución de la vulnerabilidad Ruby</a:t>
-            </a:r>
-            <a:endParaRPr lang="es-ES" sz="3000" b="1" dirty="0">
-              <a:latin typeface="Century Gothic" panose="020B0502020202020204" pitchFamily="34" charset="0"/>
-            </a:endParaRPr>
-          </a:p>
-        </p:txBody>
-      </p:sp>
+      <p:pic>
+        <p:nvPicPr>
+          <p:cNvPr id="2" name="Imagen 1"/>
+          <p:cNvPicPr>
+            <a:picLocks noChangeAspect="1"/>
+          </p:cNvPicPr>
+          <p:nvPr/>
+        </p:nvPicPr>
+        <p:blipFill>
+          <a:blip r:embed="rId3">
+            <a:extLst>
+              <a:ext uri="{28A0092B-C50C-407E-A947-70E740481C1C}">
+                <a14:useLocalDpi xmlns:a14="http://schemas.microsoft.com/office/drawing/2010/main" val="0"/>
+              </a:ext>
+            </a:extLst>
+          </a:blip>
+          <a:stretch>
+            <a:fillRect/>
+          </a:stretch>
+        </p:blipFill>
+        <p:spPr>
+          <a:xfrm>
+            <a:off x="-19977" y="1541983"/>
+            <a:ext cx="5249703" cy="2917753"/>
+          </a:xfrm>
+          <a:prstGeom prst="rect">
+            <a:avLst/>
+          </a:prstGeom>
+        </p:spPr>
+      </p:pic>
+      <p:pic>
+        <p:nvPicPr>
+          <p:cNvPr id="3" name="Imagen 2"/>
+          <p:cNvPicPr>
+            <a:picLocks noChangeAspect="1"/>
+          </p:cNvPicPr>
+          <p:nvPr/>
+        </p:nvPicPr>
+        <p:blipFill>
+          <a:blip r:embed="rId4">
+            <a:extLst>
+              <a:ext uri="{28A0092B-C50C-407E-A947-70E740481C1C}">
+                <a14:useLocalDpi xmlns:a14="http://schemas.microsoft.com/office/drawing/2010/main" val="0"/>
+              </a:ext>
+            </a:extLst>
+          </a:blip>
+          <a:stretch>
+            <a:fillRect/>
+          </a:stretch>
+        </p:blipFill>
+        <p:spPr>
+          <a:xfrm>
+            <a:off x="0" y="4459736"/>
+            <a:ext cx="9144000" cy="2398264"/>
+          </a:xfrm>
+          <a:prstGeom prst="rect">
+            <a:avLst/>
+          </a:prstGeom>
+        </p:spPr>
+      </p:pic>
+      <p:pic>
+        <p:nvPicPr>
+          <p:cNvPr id="4" name="Imagen 3"/>
+          <p:cNvPicPr>
+            <a:picLocks noChangeAspect="1"/>
+          </p:cNvPicPr>
+          <p:nvPr/>
+        </p:nvPicPr>
+        <p:blipFill>
+          <a:blip r:embed="rId5">
+            <a:extLst>
+              <a:ext uri="{28A0092B-C50C-407E-A947-70E740481C1C}">
+                <a14:useLocalDpi xmlns:a14="http://schemas.microsoft.com/office/drawing/2010/main" val="0"/>
+              </a:ext>
+            </a:extLst>
+          </a:blip>
+          <a:stretch>
+            <a:fillRect/>
+          </a:stretch>
+        </p:blipFill>
+        <p:spPr>
+          <a:xfrm>
+            <a:off x="6117557" y="2140465"/>
+            <a:ext cx="1657350" cy="1724025"/>
+          </a:xfrm>
+          <a:prstGeom prst="rect">
+            <a:avLst/>
+          </a:prstGeom>
+        </p:spPr>
+      </p:pic>
     </p:spTree>
     <p:extLst>
       <p:ext uri="{BB962C8B-B14F-4D97-AF65-F5344CB8AC3E}">
-        <p14:creationId xmlns:p14="http://schemas.microsoft.com/office/powerpoint/2010/main" val="1814699273"/>
+        <p14:creationId xmlns:p14="http://schemas.microsoft.com/office/powerpoint/2010/main" val="3617921382"/>
       </p:ext>
     </p:extLst>
   </p:cSld>
@@ -9710,7 +10368,7 @@
       </p:grpSpPr>
       <p:sp>
         <p:nvSpPr>
-          <p:cNvPr id="20" name="Rectángulo 19"/>
+          <p:cNvPr id="36" name="Rectángulo 35"/>
           <p:cNvSpPr/>
           <p:nvPr/>
         </p:nvSpPr>
@@ -9762,14 +10420,14 @@
       </p:sp>
       <p:sp>
         <p:nvSpPr>
-          <p:cNvPr id="47" name="Shape 102"/>
+          <p:cNvPr id="25" name="Shape 102"/>
           <p:cNvSpPr/>
           <p:nvPr/>
         </p:nvSpPr>
         <p:spPr>
           <a:xfrm>
             <a:off x="0" y="825219"/>
-            <a:ext cx="9143999" cy="3337348"/>
+            <a:ext cx="9144000" cy="720000"/>
           </a:xfrm>
           <a:prstGeom prst="rect">
             <a:avLst/>
@@ -9778,12 +10436,6 @@
             <a:srgbClr val="424242"/>
           </a:solidFill>
           <a:ln w="12700">
-            <a:solidFill>
-              <a:schemeClr val="tx1">
-                <a:lumMod val="75000"/>
-                <a:lumOff val="25000"/>
-              </a:schemeClr>
-            </a:solidFill>
             <a:miter lim="400000"/>
           </a:ln>
         </p:spPr>
@@ -9842,7 +10494,7 @@
                 <a:cs typeface="Quicksand"/>
                 <a:sym typeface="Quicksand"/>
               </a:rPr>
-              <a:t>Conclusión</a:t>
+              <a:t>Desarrollo de la aplicación</a:t>
             </a:r>
             <a:endParaRPr lang="en" sz="2400" b="1" dirty="0">
               <a:solidFill>
@@ -9920,7 +10572,7 @@
               <a:rPr lang="es-ES" b="1" dirty="0">
                 <a:latin typeface="Century Gothic" panose="020B0502020202020204" pitchFamily="34" charset="0"/>
               </a:rPr>
-              <a:t>5</a:t>
+              <a:t>4</a:t>
             </a:r>
           </a:p>
         </p:txBody>
@@ -9933,8 +10585,8 @@
         </p:nvSpPr>
         <p:spPr>
           <a:xfrm>
-            <a:off x="2965221" y="1021118"/>
-            <a:ext cx="3193578" cy="452312"/>
+            <a:off x="801361" y="961787"/>
+            <a:ext cx="7521300" cy="452312"/>
           </a:xfrm>
           <a:prstGeom prst="rect">
             <a:avLst/>
@@ -9955,6 +10607,18 @@
                 <a:spcPts val="600"/>
               </a:spcBef>
             </a:pPr>
+            <a:r>
+              <a:rPr lang="en" sz="2000" b="1" dirty="0">
+                <a:solidFill>
+                  <a:srgbClr val="FFFFFF"/>
+                </a:solidFill>
+                <a:latin typeface="Century Gothic" panose="020B0502020202020204" pitchFamily="34" charset="0"/>
+                <a:ea typeface="Quicksand"/>
+                <a:cs typeface="Quicksand"/>
+                <a:sym typeface="Quicksand"/>
+              </a:rPr>
+              <a:t>Dependencias </a:t>
+            </a:r>
             <a:r>
               <a:rPr lang="en" sz="2000" b="1" dirty="0" smtClean="0">
                 <a:solidFill>
@@ -9965,7 +10629,31 @@
                 <a:cs typeface="Quicksand"/>
                 <a:sym typeface="Quicksand"/>
               </a:rPr>
-              <a:t>Objetivos cumplidos</a:t>
+              <a:t>Node JS </a:t>
+            </a:r>
+            <a:r>
+              <a:rPr lang="en" sz="2000" b="1" dirty="0">
+                <a:solidFill>
+                  <a:srgbClr val="FFFFFF"/>
+                </a:solidFill>
+                <a:latin typeface="Century Gothic" panose="020B0502020202020204" pitchFamily="34" charset="0"/>
+                <a:ea typeface="Quicksand"/>
+                <a:cs typeface="Quicksand"/>
+                <a:sym typeface="Quicksand"/>
+              </a:rPr>
+              <a:t>– </a:t>
+            </a:r>
+            <a:r>
+              <a:rPr lang="en" sz="2000" b="1" dirty="0" smtClean="0">
+                <a:solidFill>
+                  <a:srgbClr val="FFFFFF"/>
+                </a:solidFill>
+                <a:latin typeface="Century Gothic" panose="020B0502020202020204" pitchFamily="34" charset="0"/>
+                <a:ea typeface="Quicksand"/>
+                <a:cs typeface="Quicksand"/>
+                <a:sym typeface="Quicksand"/>
+              </a:rPr>
+              <a:t>package.json</a:t>
             </a:r>
             <a:endParaRPr lang="en" sz="2000" b="1" dirty="0">
               <a:solidFill>
@@ -9979,142 +10667,74 @@
           </a:p>
         </p:txBody>
       </p:sp>
-      <p:sp>
-        <p:nvSpPr>
-          <p:cNvPr id="49" name="Shape 63"/>
-          <p:cNvSpPr txBox="1"/>
-          <p:nvPr/>
-        </p:nvSpPr>
-        <p:spPr>
-          <a:xfrm>
-            <a:off x="2729552" y="4274946"/>
-            <a:ext cx="3664918" cy="452312"/>
-          </a:xfrm>
-          <a:prstGeom prst="rect">
-            <a:avLst/>
-          </a:prstGeom>
-          <a:noFill/>
-          <a:ln>
-            <a:noFill/>
-          </a:ln>
-        </p:spPr>
-        <p:txBody>
-          <a:bodyPr lIns="91425" tIns="91425" rIns="91425" bIns="91425" anchor="ctr" anchorCtr="0">
-            <a:noAutofit/>
-          </a:bodyPr>
-          <a:lstStyle/>
-          <a:p>
-            <a:pPr algn="ctr">
-              <a:spcBef>
-                <a:spcPts val="600"/>
-              </a:spcBef>
-            </a:pPr>
-            <a:r>
-              <a:rPr lang="en" sz="2000" b="1" dirty="0" smtClean="0">
-                <a:latin typeface="Century Gothic" panose="020B0502020202020204" pitchFamily="34" charset="0"/>
-                <a:ea typeface="Quicksand"/>
-                <a:cs typeface="Quicksand"/>
-                <a:sym typeface="Quicksand"/>
-              </a:rPr>
-              <a:t>Línea futura de trabajo</a:t>
-            </a:r>
-            <a:endParaRPr lang="en" sz="2000" b="1" dirty="0">
-              <a:latin typeface="Century Gothic" panose="020B0502020202020204" pitchFamily="34" charset="0"/>
-              <a:ea typeface="Quicksand"/>
-              <a:cs typeface="Quicksand"/>
-              <a:sym typeface="Quicksand"/>
-            </a:endParaRPr>
-          </a:p>
-        </p:txBody>
-      </p:sp>
-      <p:sp>
-        <p:nvSpPr>
-          <p:cNvPr id="5" name="Rectángulo 4"/>
-          <p:cNvSpPr/>
-          <p:nvPr/>
-        </p:nvSpPr>
-        <p:spPr>
-          <a:xfrm>
-            <a:off x="3282588" y="6090114"/>
-            <a:ext cx="2551369" cy="646331"/>
-          </a:xfrm>
-          <a:prstGeom prst="rect">
-            <a:avLst/>
-          </a:prstGeom>
-        </p:spPr>
-        <p:txBody>
-          <a:bodyPr wrap="square">
-            <a:spAutoFit/>
-          </a:bodyPr>
-          <a:lstStyle/>
-          <a:p>
-            <a:pPr algn="ctr"/>
-            <a:r>
-              <a:rPr lang="es-ES" spc="-20" dirty="0" smtClean="0">
-                <a:ea typeface="Calibri" panose="020F0502020204030204" pitchFamily="34" charset="0"/>
-                <a:cs typeface="Times New Roman" panose="02020603050405020304" pitchFamily="18" charset="0"/>
-              </a:rPr>
-              <a:t>Preparación del entorno para producci</a:t>
-            </a:r>
-            <a:r>
-              <a:rPr lang="es-ES" spc="-20" dirty="0" smtClean="0">
-                <a:ea typeface="Calibri" panose="020F0502020204030204" pitchFamily="34" charset="0"/>
-                <a:cs typeface="Times New Roman" panose="02020603050405020304" pitchFamily="18" charset="0"/>
-              </a:rPr>
-              <a:t>ón</a:t>
-            </a:r>
-            <a:endParaRPr lang="es-ES" dirty="0">
-              <a:cs typeface="Times New Roman" panose="02020603050405020304" pitchFamily="18" charset="0"/>
-            </a:endParaRPr>
-          </a:p>
-        </p:txBody>
-      </p:sp>
-      <p:sp>
-        <p:nvSpPr>
-          <p:cNvPr id="6" name="Rectángulo 5"/>
-          <p:cNvSpPr/>
-          <p:nvPr/>
-        </p:nvSpPr>
-        <p:spPr>
-          <a:xfrm>
-            <a:off x="6097657" y="5923969"/>
-            <a:ext cx="2763425" cy="646331"/>
-          </a:xfrm>
-          <a:prstGeom prst="rect">
-            <a:avLst/>
-          </a:prstGeom>
-        </p:spPr>
-        <p:txBody>
-          <a:bodyPr wrap="square">
-            <a:spAutoFit/>
-          </a:bodyPr>
-          <a:lstStyle/>
-          <a:p>
-            <a:pPr algn="ctr"/>
-            <a:r>
-              <a:rPr lang="es-ES" spc="-20" dirty="0" smtClean="0">
-                <a:ea typeface="Calibri" panose="020F0502020204030204" pitchFamily="34" charset="0"/>
-                <a:cs typeface="Times New Roman" panose="02020603050405020304" pitchFamily="18" charset="0"/>
-              </a:rPr>
-              <a:t>Ampliar la cantidad de repositorios alcanzados</a:t>
-            </a:r>
-            <a:endParaRPr lang="es-ES" spc="-20" dirty="0" smtClean="0">
-              <a:ea typeface="Calibri" panose="020F0502020204030204" pitchFamily="34" charset="0"/>
-              <a:cs typeface="Times New Roman" panose="02020603050405020304" pitchFamily="18" charset="0"/>
-            </a:endParaRPr>
-          </a:p>
-        </p:txBody>
-      </p:sp>
       <p:pic>
         <p:nvPicPr>
-          <p:cNvPr id="9" name="Imagen 8"/>
+          <p:cNvPr id="3" name="Imagen 2"/>
           <p:cNvPicPr>
             <a:picLocks noChangeAspect="1"/>
           </p:cNvPicPr>
           <p:nvPr/>
         </p:nvPicPr>
+        <p:blipFill rotWithShape="1">
+          <a:blip r:embed="rId3">
+            <a:extLst>
+              <a:ext uri="{28A0092B-C50C-407E-A947-70E740481C1C}">
+                <a14:useLocalDpi xmlns:a14="http://schemas.microsoft.com/office/drawing/2010/main" val="0"/>
+              </a:ext>
+            </a:extLst>
+          </a:blip>
+          <a:srcRect l="2" r="-17479"/>
+          <a:stretch/>
+        </p:blipFill>
+        <p:spPr>
+          <a:xfrm>
+            <a:off x="0" y="1539486"/>
+            <a:ext cx="9127958" cy="2375886"/>
+          </a:xfrm>
+          <a:prstGeom prst="rect">
+            <a:avLst/>
+          </a:prstGeom>
+        </p:spPr>
+      </p:pic>
+      <p:pic>
+        <p:nvPicPr>
+          <p:cNvPr id="4" name="Imagen 3"/>
+          <p:cNvPicPr>
+            <a:picLocks noChangeAspect="1"/>
+          </p:cNvPicPr>
+          <p:nvPr/>
+        </p:nvPicPr>
+        <p:blipFill rotWithShape="1">
+          <a:blip r:embed="rId4">
+            <a:extLst>
+              <a:ext uri="{28A0092B-C50C-407E-A947-70E740481C1C}">
+                <a14:useLocalDpi xmlns:a14="http://schemas.microsoft.com/office/drawing/2010/main" val="0"/>
+              </a:ext>
+            </a:extLst>
+          </a:blip>
+          <a:srcRect r="50877"/>
+          <a:stretch/>
+        </p:blipFill>
+        <p:spPr>
+          <a:xfrm>
+            <a:off x="4997116" y="1944234"/>
+            <a:ext cx="4154905" cy="2068672"/>
+          </a:xfrm>
+          <a:prstGeom prst="rect">
+            <a:avLst/>
+          </a:prstGeom>
+        </p:spPr>
+      </p:pic>
+      <p:pic>
+        <p:nvPicPr>
+          <p:cNvPr id="2" name="Imagen 1"/>
+          <p:cNvPicPr>
+            <a:picLocks noChangeAspect="1"/>
+          </p:cNvPicPr>
+          <p:nvPr/>
+        </p:nvPicPr>
         <p:blipFill>
-          <a:blip r:embed="rId3" cstate="print">
+          <a:blip r:embed="rId5">
             <a:extLst>
               <a:ext uri="{28A0092B-C50C-407E-A947-70E740481C1C}">
                 <a14:useLocalDpi xmlns:a14="http://schemas.microsoft.com/office/drawing/2010/main" val="0"/>
@@ -10127,211 +10747,18 @@
         </p:blipFill>
         <p:spPr>
           <a:xfrm>
-            <a:off x="4137043" y="4802448"/>
-            <a:ext cx="807216" cy="1196710"/>
+            <a:off x="-1" y="3883288"/>
+            <a:ext cx="9144001" cy="2978952"/>
           </a:xfrm>
           <a:prstGeom prst="rect">
             <a:avLst/>
           </a:prstGeom>
         </p:spPr>
       </p:pic>
-      <p:sp>
-        <p:nvSpPr>
-          <p:cNvPr id="51" name="Rectángulo 50"/>
-          <p:cNvSpPr/>
-          <p:nvPr/>
-        </p:nvSpPr>
-        <p:spPr>
-          <a:xfrm>
-            <a:off x="278047" y="3125355"/>
-            <a:ext cx="2763425" cy="646331"/>
-          </a:xfrm>
-          <a:prstGeom prst="rect">
-            <a:avLst/>
-          </a:prstGeom>
-        </p:spPr>
-        <p:txBody>
-          <a:bodyPr wrap="square">
-            <a:spAutoFit/>
-          </a:bodyPr>
-          <a:lstStyle/>
-          <a:p>
-            <a:pPr algn="ctr"/>
-            <a:r>
-              <a:rPr lang="es-ES" spc="-20" dirty="0" smtClean="0">
-                <a:solidFill>
-                  <a:schemeClr val="bg1"/>
-                </a:solidFill>
-                <a:ea typeface="Calibri" panose="020F0502020204030204" pitchFamily="34" charset="0"/>
-                <a:cs typeface="Times New Roman" panose="02020603050405020304" pitchFamily="18" charset="0"/>
-              </a:rPr>
-              <a:t>Análisis estático de </a:t>
-            </a:r>
-          </a:p>
-          <a:p>
-            <a:pPr algn="ctr"/>
-            <a:r>
-              <a:rPr lang="es-ES" spc="-20" dirty="0" smtClean="0">
-                <a:solidFill>
-                  <a:schemeClr val="bg1"/>
-                </a:solidFill>
-                <a:ea typeface="Calibri" panose="020F0502020204030204" pitchFamily="34" charset="0"/>
-                <a:cs typeface="Times New Roman" panose="02020603050405020304" pitchFamily="18" charset="0"/>
-              </a:rPr>
-              <a:t>forma pasiva</a:t>
-            </a:r>
-            <a:endParaRPr lang="es-ES" spc="-20" dirty="0" smtClean="0">
-              <a:solidFill>
-                <a:schemeClr val="bg1"/>
-              </a:solidFill>
-              <a:ea typeface="Calibri" panose="020F0502020204030204" pitchFamily="34" charset="0"/>
-              <a:cs typeface="Times New Roman" panose="02020603050405020304" pitchFamily="18" charset="0"/>
-            </a:endParaRPr>
-          </a:p>
-        </p:txBody>
-      </p:sp>
-      <p:sp>
-        <p:nvSpPr>
-          <p:cNvPr id="52" name="Rectángulo 51"/>
-          <p:cNvSpPr/>
-          <p:nvPr/>
-        </p:nvSpPr>
-        <p:spPr>
-          <a:xfrm>
-            <a:off x="2829723" y="1603662"/>
-            <a:ext cx="3457101" cy="646331"/>
-          </a:xfrm>
-          <a:prstGeom prst="rect">
-            <a:avLst/>
-          </a:prstGeom>
-        </p:spPr>
-        <p:txBody>
-          <a:bodyPr wrap="square">
-            <a:spAutoFit/>
-          </a:bodyPr>
-          <a:lstStyle/>
-          <a:p>
-            <a:pPr algn="ctr"/>
-            <a:r>
-              <a:rPr lang="es-ES" spc="-20" dirty="0" smtClean="0">
-                <a:solidFill>
-                  <a:schemeClr val="bg1"/>
-                </a:solidFill>
-                <a:ea typeface="Calibri" panose="020F0502020204030204" pitchFamily="34" charset="0"/>
-                <a:cs typeface="Times New Roman" panose="02020603050405020304" pitchFamily="18" charset="0"/>
-              </a:rPr>
-              <a:t>Incluido en el propio </a:t>
-            </a:r>
-            <a:br>
-              <a:rPr lang="es-ES" spc="-20" dirty="0" smtClean="0">
-                <a:solidFill>
-                  <a:schemeClr val="bg1"/>
-                </a:solidFill>
-                <a:ea typeface="Calibri" panose="020F0502020204030204" pitchFamily="34" charset="0"/>
-                <a:cs typeface="Times New Roman" panose="02020603050405020304" pitchFamily="18" charset="0"/>
-              </a:rPr>
-            </a:br>
-            <a:r>
-              <a:rPr lang="es-ES" spc="-20" dirty="0" smtClean="0">
-                <a:solidFill>
-                  <a:schemeClr val="bg1"/>
-                </a:solidFill>
-                <a:ea typeface="Calibri" panose="020F0502020204030204" pitchFamily="34" charset="0"/>
-                <a:cs typeface="Times New Roman" panose="02020603050405020304" pitchFamily="18" charset="0"/>
-              </a:rPr>
-              <a:t>proceso de desarrollo</a:t>
-            </a:r>
-            <a:endParaRPr lang="es-ES" spc="-20" dirty="0" smtClean="0">
-              <a:solidFill>
-                <a:schemeClr val="bg1"/>
-              </a:solidFill>
-              <a:ea typeface="Calibri" panose="020F0502020204030204" pitchFamily="34" charset="0"/>
-              <a:cs typeface="Times New Roman" panose="02020603050405020304" pitchFamily="18" charset="0"/>
-            </a:endParaRPr>
-          </a:p>
-        </p:txBody>
-      </p:sp>
-      <p:sp>
-        <p:nvSpPr>
-          <p:cNvPr id="55" name="Rectángulo 54"/>
-          <p:cNvSpPr/>
-          <p:nvPr/>
-        </p:nvSpPr>
-        <p:spPr>
-          <a:xfrm>
-            <a:off x="6097657" y="3125355"/>
-            <a:ext cx="2763425" cy="646331"/>
-          </a:xfrm>
-          <a:prstGeom prst="rect">
-            <a:avLst/>
-          </a:prstGeom>
-        </p:spPr>
-        <p:txBody>
-          <a:bodyPr wrap="square">
-            <a:spAutoFit/>
-          </a:bodyPr>
-          <a:lstStyle/>
-          <a:p>
-            <a:pPr algn="ctr"/>
-            <a:r>
-              <a:rPr lang="es-ES" spc="-20" dirty="0" smtClean="0">
-                <a:solidFill>
-                  <a:schemeClr val="bg1"/>
-                </a:solidFill>
-                <a:ea typeface="Calibri" panose="020F0502020204030204" pitchFamily="34" charset="0"/>
-                <a:cs typeface="Times New Roman" panose="02020603050405020304" pitchFamily="18" charset="0"/>
-              </a:rPr>
-              <a:t>Utilizando contenedores de imágenes</a:t>
-            </a:r>
-            <a:endParaRPr lang="es-ES" spc="-20" dirty="0" smtClean="0">
-              <a:solidFill>
-                <a:schemeClr val="bg1"/>
-              </a:solidFill>
-              <a:ea typeface="Calibri" panose="020F0502020204030204" pitchFamily="34" charset="0"/>
-              <a:cs typeface="Times New Roman" panose="02020603050405020304" pitchFamily="18" charset="0"/>
-            </a:endParaRPr>
-          </a:p>
-        </p:txBody>
-      </p:sp>
-      <p:sp>
-        <p:nvSpPr>
-          <p:cNvPr id="23" name="Rectángulo 22"/>
-          <p:cNvSpPr/>
-          <p:nvPr/>
-        </p:nvSpPr>
-        <p:spPr>
-          <a:xfrm>
-            <a:off x="171430" y="6017968"/>
-            <a:ext cx="2610904" cy="646331"/>
-          </a:xfrm>
-          <a:prstGeom prst="rect">
-            <a:avLst/>
-          </a:prstGeom>
-        </p:spPr>
-        <p:txBody>
-          <a:bodyPr wrap="square">
-            <a:spAutoFit/>
-          </a:bodyPr>
-          <a:lstStyle/>
-          <a:p>
-            <a:pPr algn="ctr"/>
-            <a:r>
-              <a:rPr lang="es-ES" spc="-20" dirty="0" smtClean="0">
-                <a:ea typeface="Calibri" panose="020F0502020204030204" pitchFamily="34" charset="0"/>
-                <a:cs typeface="Times New Roman" panose="02020603050405020304" pitchFamily="18" charset="0"/>
-              </a:rPr>
-              <a:t>Lenguajes de programación examinados</a:t>
-            </a:r>
-            <a:endParaRPr lang="es-ES" dirty="0">
-              <a:cs typeface="Times New Roman" panose="02020603050405020304" pitchFamily="18" charset="0"/>
-            </a:endParaRPr>
-          </a:p>
-        </p:txBody>
-      </p:sp>
     </p:spTree>
     <p:extLst>
       <p:ext uri="{BB962C8B-B14F-4D97-AF65-F5344CB8AC3E}">
-        <p14:creationId xmlns:p14="http://schemas.microsoft.com/office/powerpoint/2010/main" val="3053281417"/>
+        <p14:creationId xmlns:p14="http://schemas.microsoft.com/office/powerpoint/2010/main" val="992472818"/>
       </p:ext>
     </p:extLst>
   </p:cSld>
@@ -11139,6 +11566,2254 @@
 </file>
 
 <file path=ppt/slides/slide20.xml><?xml version="1.0" encoding="utf-8"?>
+<p:sld xmlns:a="http://schemas.openxmlformats.org/drawingml/2006/main" xmlns:r="http://schemas.openxmlformats.org/officeDocument/2006/relationships" xmlns:p="http://schemas.openxmlformats.org/presentationml/2006/main">
+  <p:cSld>
+    <p:spTree>
+      <p:nvGrpSpPr>
+        <p:cNvPr id="1" name=""/>
+        <p:cNvGrpSpPr/>
+        <p:nvPr/>
+      </p:nvGrpSpPr>
+      <p:grpSpPr>
+        <a:xfrm>
+          <a:off x="0" y="0"/>
+          <a:ext cx="0" cy="0"/>
+          <a:chOff x="0" y="0"/>
+          <a:chExt cx="0" cy="0"/>
+        </a:xfrm>
+      </p:grpSpPr>
+      <p:sp>
+        <p:nvSpPr>
+          <p:cNvPr id="36" name="Rectángulo 35"/>
+          <p:cNvSpPr/>
+          <p:nvPr/>
+        </p:nvSpPr>
+        <p:spPr>
+          <a:xfrm>
+            <a:off x="-19977" y="0"/>
+            <a:ext cx="9163977" cy="836400"/>
+          </a:xfrm>
+          <a:prstGeom prst="rect">
+            <a:avLst/>
+          </a:prstGeom>
+          <a:solidFill>
+            <a:srgbClr val="002F7D">
+              <a:alpha val="75000"/>
+            </a:srgbClr>
+          </a:solidFill>
+          <a:ln>
+            <a:solidFill>
+              <a:srgbClr val="002F7D">
+                <a:alpha val="75000"/>
+              </a:srgbClr>
+            </a:solidFill>
+          </a:ln>
+        </p:spPr>
+        <p:style>
+          <a:lnRef idx="2">
+            <a:schemeClr val="accent1">
+              <a:shade val="50000"/>
+            </a:schemeClr>
+          </a:lnRef>
+          <a:fillRef idx="1">
+            <a:schemeClr val="accent1"/>
+          </a:fillRef>
+          <a:effectRef idx="0">
+            <a:schemeClr val="accent1"/>
+          </a:effectRef>
+          <a:fontRef idx="minor">
+            <a:schemeClr val="lt1"/>
+          </a:fontRef>
+        </p:style>
+        <p:txBody>
+          <a:bodyPr rtlCol="0" anchor="ctr"/>
+          <a:lstStyle/>
+          <a:p>
+            <a:pPr algn="ctr"/>
+            <a:endParaRPr lang="es-ES"/>
+          </a:p>
+        </p:txBody>
+      </p:sp>
+      <p:sp>
+        <p:nvSpPr>
+          <p:cNvPr id="25" name="Shape 102"/>
+          <p:cNvSpPr/>
+          <p:nvPr/>
+        </p:nvSpPr>
+        <p:spPr>
+          <a:xfrm>
+            <a:off x="0" y="825219"/>
+            <a:ext cx="9144000" cy="720000"/>
+          </a:xfrm>
+          <a:prstGeom prst="rect">
+            <a:avLst/>
+          </a:prstGeom>
+          <a:solidFill>
+            <a:srgbClr val="424242"/>
+          </a:solidFill>
+          <a:ln w="12700">
+            <a:miter lim="400000"/>
+          </a:ln>
+        </p:spPr>
+        <p:txBody>
+          <a:bodyPr lIns="0" tIns="0" rIns="0" bIns="0" anchor="ctr"/>
+          <a:lstStyle/>
+          <a:p>
+            <a:pPr lvl="0">
+              <a:defRPr sz="2400">
+                <a:solidFill>
+                  <a:srgbClr val="FFFFFF"/>
+                </a:solidFill>
+              </a:defRPr>
+            </a:pPr>
+            <a:endParaRPr sz="3200"/>
+          </a:p>
+        </p:txBody>
+      </p:sp>
+      <p:sp>
+        <p:nvSpPr>
+          <p:cNvPr id="27" name="Shape 63"/>
+          <p:cNvSpPr txBox="1"/>
+          <p:nvPr/>
+        </p:nvSpPr>
+        <p:spPr>
+          <a:xfrm>
+            <a:off x="1543977" y="186901"/>
+            <a:ext cx="7521300" cy="453600"/>
+          </a:xfrm>
+          <a:prstGeom prst="rect">
+            <a:avLst/>
+          </a:prstGeom>
+          <a:noFill/>
+          <a:ln>
+            <a:noFill/>
+          </a:ln>
+        </p:spPr>
+        <p:txBody>
+          <a:bodyPr lIns="91425" tIns="91425" rIns="91425" bIns="91425" anchor="ctr" anchorCtr="0">
+            <a:noAutofit/>
+          </a:bodyPr>
+          <a:lstStyle/>
+          <a:p>
+            <a:pPr>
+              <a:spcBef>
+                <a:spcPts val="600"/>
+              </a:spcBef>
+            </a:pPr>
+            <a:r>
+              <a:rPr lang="en" sz="2400" b="1" dirty="0" smtClean="0">
+                <a:solidFill>
+                  <a:srgbClr val="FFFFFF"/>
+                </a:solidFill>
+                <a:latin typeface="Century Gothic" panose="020B0502020202020204" pitchFamily="34" charset="0"/>
+                <a:ea typeface="Quicksand"/>
+                <a:cs typeface="Quicksand"/>
+                <a:sym typeface="Quicksand"/>
+              </a:rPr>
+              <a:t>Desarrollo de la aplicación</a:t>
+            </a:r>
+            <a:endParaRPr lang="en" sz="2400" b="1" dirty="0">
+              <a:solidFill>
+                <a:srgbClr val="FFFFFF"/>
+              </a:solidFill>
+              <a:latin typeface="Century Gothic" panose="020B0502020202020204" pitchFamily="34" charset="0"/>
+              <a:ea typeface="Quicksand"/>
+              <a:cs typeface="Quicksand"/>
+              <a:sym typeface="Quicksand"/>
+            </a:endParaRPr>
+          </a:p>
+        </p:txBody>
+      </p:sp>
+      <p:sp>
+        <p:nvSpPr>
+          <p:cNvPr id="28" name="Shape 33"/>
+          <p:cNvSpPr/>
+          <p:nvPr/>
+        </p:nvSpPr>
+        <p:spPr>
+          <a:xfrm>
+            <a:off x="385555" y="146927"/>
+            <a:ext cx="532267" cy="532267"/>
+          </a:xfrm>
+          <a:prstGeom prst="ellipse">
+            <a:avLst/>
+          </a:prstGeom>
+          <a:solidFill>
+            <a:schemeClr val="bg1"/>
+          </a:solidFill>
+          <a:ln w="9525" cap="flat" cmpd="sng">
+            <a:solidFill>
+              <a:srgbClr val="999FA9"/>
+            </a:solidFill>
+            <a:prstDash val="solid"/>
+            <a:round/>
+            <a:headEnd type="none" w="med" len="med"/>
+            <a:tailEnd type="none" w="med" len="med"/>
+          </a:ln>
+        </p:spPr>
+        <p:txBody>
+          <a:bodyPr lIns="91425" tIns="91425" rIns="91425" bIns="91425" anchor="ctr" anchorCtr="0">
+            <a:noAutofit/>
+          </a:bodyPr>
+          <a:lstStyle/>
+          <a:p>
+            <a:endParaRPr/>
+          </a:p>
+        </p:txBody>
+      </p:sp>
+      <p:sp>
+        <p:nvSpPr>
+          <p:cNvPr id="29" name="CuadroTexto 28"/>
+          <p:cNvSpPr txBox="1"/>
+          <p:nvPr/>
+        </p:nvSpPr>
+        <p:spPr>
+          <a:xfrm>
+            <a:off x="494432" y="228391"/>
+            <a:ext cx="314510" cy="369332"/>
+          </a:xfrm>
+          <a:prstGeom prst="rect">
+            <a:avLst/>
+          </a:prstGeom>
+          <a:noFill/>
+        </p:spPr>
+        <p:txBody>
+          <a:bodyPr wrap="none" rtlCol="0" anchor="ctr">
+            <a:spAutoFit/>
+          </a:bodyPr>
+          <a:lstStyle/>
+          <a:p>
+            <a:pPr algn="ctr"/>
+            <a:r>
+              <a:rPr lang="es-ES" b="1" dirty="0">
+                <a:latin typeface="Century Gothic" panose="020B0502020202020204" pitchFamily="34" charset="0"/>
+              </a:rPr>
+              <a:t>4</a:t>
+            </a:r>
+          </a:p>
+        </p:txBody>
+      </p:sp>
+      <p:sp>
+        <p:nvSpPr>
+          <p:cNvPr id="30" name="Shape 63"/>
+          <p:cNvSpPr txBox="1"/>
+          <p:nvPr/>
+        </p:nvSpPr>
+        <p:spPr>
+          <a:xfrm>
+            <a:off x="801361" y="961787"/>
+            <a:ext cx="7521300" cy="452312"/>
+          </a:xfrm>
+          <a:prstGeom prst="rect">
+            <a:avLst/>
+          </a:prstGeom>
+          <a:noFill/>
+          <a:ln>
+            <a:noFill/>
+          </a:ln>
+        </p:spPr>
+        <p:txBody>
+          <a:bodyPr lIns="91425" tIns="91425" rIns="91425" bIns="91425" anchor="ctr" anchorCtr="0">
+            <a:noAutofit/>
+          </a:bodyPr>
+          <a:lstStyle/>
+          <a:p>
+            <a:pPr algn="ctr">
+              <a:spcBef>
+                <a:spcPts val="600"/>
+              </a:spcBef>
+            </a:pPr>
+            <a:r>
+              <a:rPr lang="en" sz="2000" b="1" dirty="0" smtClean="0">
+                <a:solidFill>
+                  <a:srgbClr val="FFFFFF"/>
+                </a:solidFill>
+                <a:latin typeface="Century Gothic" panose="020B0502020202020204" pitchFamily="34" charset="0"/>
+                <a:ea typeface="Quicksand"/>
+                <a:cs typeface="Quicksand"/>
+                <a:sym typeface="Quicksand"/>
+              </a:rPr>
+              <a:t>Clair y Clairctl</a:t>
+            </a:r>
+            <a:endParaRPr lang="en" sz="2000" b="1" dirty="0">
+              <a:solidFill>
+                <a:srgbClr val="FFFFFF"/>
+              </a:solidFill>
+              <a:latin typeface="Century Gothic" panose="020B0502020202020204" pitchFamily="34" charset="0"/>
+              <a:ea typeface="Quicksand"/>
+              <a:cs typeface="Quicksand"/>
+              <a:sym typeface="Quicksand"/>
+            </a:endParaRPr>
+          </a:p>
+        </p:txBody>
+      </p:sp>
+      <p:pic>
+        <p:nvPicPr>
+          <p:cNvPr id="3" name="Imagen 2"/>
+          <p:cNvPicPr>
+            <a:picLocks noChangeAspect="1"/>
+          </p:cNvPicPr>
+          <p:nvPr/>
+        </p:nvPicPr>
+        <p:blipFill>
+          <a:blip r:embed="rId3">
+            <a:extLst>
+              <a:ext uri="{28A0092B-C50C-407E-A947-70E740481C1C}">
+                <a14:useLocalDpi xmlns:a14="http://schemas.microsoft.com/office/drawing/2010/main" val="0"/>
+              </a:ext>
+            </a:extLst>
+          </a:blip>
+          <a:stretch>
+            <a:fillRect/>
+          </a:stretch>
+        </p:blipFill>
+        <p:spPr>
+          <a:xfrm>
+            <a:off x="385555" y="4991431"/>
+            <a:ext cx="8316085" cy="1670989"/>
+          </a:xfrm>
+          <a:prstGeom prst="rect">
+            <a:avLst/>
+          </a:prstGeom>
+        </p:spPr>
+      </p:pic>
+      <p:pic>
+        <p:nvPicPr>
+          <p:cNvPr id="5" name="Imagen 4"/>
+          <p:cNvPicPr>
+            <a:picLocks noChangeAspect="1"/>
+          </p:cNvPicPr>
+          <p:nvPr/>
+        </p:nvPicPr>
+        <p:blipFill>
+          <a:blip r:embed="rId4">
+            <a:extLst>
+              <a:ext uri="{28A0092B-C50C-407E-A947-70E740481C1C}">
+                <a14:useLocalDpi xmlns:a14="http://schemas.microsoft.com/office/drawing/2010/main" val="0"/>
+              </a:ext>
+            </a:extLst>
+          </a:blip>
+          <a:stretch>
+            <a:fillRect/>
+          </a:stretch>
+        </p:blipFill>
+        <p:spPr>
+          <a:xfrm>
+            <a:off x="385555" y="1729937"/>
+            <a:ext cx="8316086" cy="3076776"/>
+          </a:xfrm>
+          <a:prstGeom prst="rect">
+            <a:avLst/>
+          </a:prstGeom>
+        </p:spPr>
+      </p:pic>
+    </p:spTree>
+    <p:extLst>
+      <p:ext uri="{BB962C8B-B14F-4D97-AF65-F5344CB8AC3E}">
+        <p14:creationId xmlns:p14="http://schemas.microsoft.com/office/powerpoint/2010/main" val="2711185006"/>
+      </p:ext>
+    </p:extLst>
+  </p:cSld>
+  <p:clrMapOvr>
+    <a:masterClrMapping/>
+  </p:clrMapOvr>
+  <p:timing>
+    <p:tnLst>
+      <p:par>
+        <p:cTn id="1" dur="indefinite" restart="never" nodeType="tmRoot"/>
+      </p:par>
+    </p:tnLst>
+  </p:timing>
+</p:sld>
+</file>
+
+<file path=ppt/slides/slide21.xml><?xml version="1.0" encoding="utf-8"?>
+<p:sld xmlns:a="http://schemas.openxmlformats.org/drawingml/2006/main" xmlns:r="http://schemas.openxmlformats.org/officeDocument/2006/relationships" xmlns:p="http://schemas.openxmlformats.org/presentationml/2006/main">
+  <p:cSld>
+    <p:spTree>
+      <p:nvGrpSpPr>
+        <p:cNvPr id="1" name=""/>
+        <p:cNvGrpSpPr/>
+        <p:nvPr/>
+      </p:nvGrpSpPr>
+      <p:grpSpPr>
+        <a:xfrm>
+          <a:off x="0" y="0"/>
+          <a:ext cx="0" cy="0"/>
+          <a:chOff x="0" y="0"/>
+          <a:chExt cx="0" cy="0"/>
+        </a:xfrm>
+      </p:grpSpPr>
+      <p:sp>
+        <p:nvSpPr>
+          <p:cNvPr id="36" name="Rectángulo 35"/>
+          <p:cNvSpPr/>
+          <p:nvPr/>
+        </p:nvSpPr>
+        <p:spPr>
+          <a:xfrm>
+            <a:off x="-19977" y="0"/>
+            <a:ext cx="9163977" cy="836400"/>
+          </a:xfrm>
+          <a:prstGeom prst="rect">
+            <a:avLst/>
+          </a:prstGeom>
+          <a:solidFill>
+            <a:srgbClr val="002F7D">
+              <a:alpha val="75000"/>
+            </a:srgbClr>
+          </a:solidFill>
+          <a:ln>
+            <a:solidFill>
+              <a:srgbClr val="002F7D">
+                <a:alpha val="75000"/>
+              </a:srgbClr>
+            </a:solidFill>
+          </a:ln>
+        </p:spPr>
+        <p:style>
+          <a:lnRef idx="2">
+            <a:schemeClr val="accent1">
+              <a:shade val="50000"/>
+            </a:schemeClr>
+          </a:lnRef>
+          <a:fillRef idx="1">
+            <a:schemeClr val="accent1"/>
+          </a:fillRef>
+          <a:effectRef idx="0">
+            <a:schemeClr val="accent1"/>
+          </a:effectRef>
+          <a:fontRef idx="minor">
+            <a:schemeClr val="lt1"/>
+          </a:fontRef>
+        </p:style>
+        <p:txBody>
+          <a:bodyPr rtlCol="0" anchor="ctr"/>
+          <a:lstStyle/>
+          <a:p>
+            <a:pPr algn="ctr"/>
+            <a:endParaRPr lang="es-ES"/>
+          </a:p>
+        </p:txBody>
+      </p:sp>
+      <p:sp>
+        <p:nvSpPr>
+          <p:cNvPr id="25" name="Shape 102"/>
+          <p:cNvSpPr/>
+          <p:nvPr/>
+        </p:nvSpPr>
+        <p:spPr>
+          <a:xfrm>
+            <a:off x="0" y="825219"/>
+            <a:ext cx="9144000" cy="720000"/>
+          </a:xfrm>
+          <a:prstGeom prst="rect">
+            <a:avLst/>
+          </a:prstGeom>
+          <a:solidFill>
+            <a:srgbClr val="424242"/>
+          </a:solidFill>
+          <a:ln w="12700">
+            <a:miter lim="400000"/>
+          </a:ln>
+        </p:spPr>
+        <p:txBody>
+          <a:bodyPr lIns="0" tIns="0" rIns="0" bIns="0" anchor="ctr"/>
+          <a:lstStyle/>
+          <a:p>
+            <a:pPr lvl="0">
+              <a:defRPr sz="2400">
+                <a:solidFill>
+                  <a:srgbClr val="FFFFFF"/>
+                </a:solidFill>
+              </a:defRPr>
+            </a:pPr>
+            <a:endParaRPr sz="3200"/>
+          </a:p>
+        </p:txBody>
+      </p:sp>
+      <p:sp>
+        <p:nvSpPr>
+          <p:cNvPr id="27" name="Shape 63"/>
+          <p:cNvSpPr txBox="1"/>
+          <p:nvPr/>
+        </p:nvSpPr>
+        <p:spPr>
+          <a:xfrm>
+            <a:off x="1543977" y="186901"/>
+            <a:ext cx="7521300" cy="453600"/>
+          </a:xfrm>
+          <a:prstGeom prst="rect">
+            <a:avLst/>
+          </a:prstGeom>
+          <a:noFill/>
+          <a:ln>
+            <a:noFill/>
+          </a:ln>
+        </p:spPr>
+        <p:txBody>
+          <a:bodyPr lIns="91425" tIns="91425" rIns="91425" bIns="91425" anchor="ctr" anchorCtr="0">
+            <a:noAutofit/>
+          </a:bodyPr>
+          <a:lstStyle/>
+          <a:p>
+            <a:pPr>
+              <a:spcBef>
+                <a:spcPts val="600"/>
+              </a:spcBef>
+            </a:pPr>
+            <a:r>
+              <a:rPr lang="en" sz="2400" b="1" dirty="0" smtClean="0">
+                <a:solidFill>
+                  <a:srgbClr val="FFFFFF"/>
+                </a:solidFill>
+                <a:latin typeface="Century Gothic" panose="020B0502020202020204" pitchFamily="34" charset="0"/>
+                <a:ea typeface="Quicksand"/>
+                <a:cs typeface="Quicksand"/>
+                <a:sym typeface="Quicksand"/>
+              </a:rPr>
+              <a:t>Desarrollo de la aplicación</a:t>
+            </a:r>
+            <a:endParaRPr lang="en" sz="2400" b="1" dirty="0">
+              <a:solidFill>
+                <a:srgbClr val="FFFFFF"/>
+              </a:solidFill>
+              <a:latin typeface="Century Gothic" panose="020B0502020202020204" pitchFamily="34" charset="0"/>
+              <a:ea typeface="Quicksand"/>
+              <a:cs typeface="Quicksand"/>
+              <a:sym typeface="Quicksand"/>
+            </a:endParaRPr>
+          </a:p>
+        </p:txBody>
+      </p:sp>
+      <p:sp>
+        <p:nvSpPr>
+          <p:cNvPr id="28" name="Shape 33"/>
+          <p:cNvSpPr/>
+          <p:nvPr/>
+        </p:nvSpPr>
+        <p:spPr>
+          <a:xfrm>
+            <a:off x="385555" y="146927"/>
+            <a:ext cx="532267" cy="532267"/>
+          </a:xfrm>
+          <a:prstGeom prst="ellipse">
+            <a:avLst/>
+          </a:prstGeom>
+          <a:solidFill>
+            <a:schemeClr val="bg1"/>
+          </a:solidFill>
+          <a:ln w="9525" cap="flat" cmpd="sng">
+            <a:solidFill>
+              <a:srgbClr val="999FA9"/>
+            </a:solidFill>
+            <a:prstDash val="solid"/>
+            <a:round/>
+            <a:headEnd type="none" w="med" len="med"/>
+            <a:tailEnd type="none" w="med" len="med"/>
+          </a:ln>
+        </p:spPr>
+        <p:txBody>
+          <a:bodyPr lIns="91425" tIns="91425" rIns="91425" bIns="91425" anchor="ctr" anchorCtr="0">
+            <a:noAutofit/>
+          </a:bodyPr>
+          <a:lstStyle/>
+          <a:p>
+            <a:endParaRPr/>
+          </a:p>
+        </p:txBody>
+      </p:sp>
+      <p:sp>
+        <p:nvSpPr>
+          <p:cNvPr id="29" name="CuadroTexto 28"/>
+          <p:cNvSpPr txBox="1"/>
+          <p:nvPr/>
+        </p:nvSpPr>
+        <p:spPr>
+          <a:xfrm>
+            <a:off x="494432" y="228391"/>
+            <a:ext cx="314510" cy="369332"/>
+          </a:xfrm>
+          <a:prstGeom prst="rect">
+            <a:avLst/>
+          </a:prstGeom>
+          <a:noFill/>
+        </p:spPr>
+        <p:txBody>
+          <a:bodyPr wrap="none" rtlCol="0" anchor="ctr">
+            <a:spAutoFit/>
+          </a:bodyPr>
+          <a:lstStyle/>
+          <a:p>
+            <a:pPr algn="ctr"/>
+            <a:r>
+              <a:rPr lang="es-ES" b="1" dirty="0">
+                <a:latin typeface="Century Gothic" panose="020B0502020202020204" pitchFamily="34" charset="0"/>
+              </a:rPr>
+              <a:t>4</a:t>
+            </a:r>
+          </a:p>
+        </p:txBody>
+      </p:sp>
+      <p:sp>
+        <p:nvSpPr>
+          <p:cNvPr id="30" name="Shape 63"/>
+          <p:cNvSpPr txBox="1"/>
+          <p:nvPr/>
+        </p:nvSpPr>
+        <p:spPr>
+          <a:xfrm>
+            <a:off x="801361" y="961787"/>
+            <a:ext cx="7521300" cy="452312"/>
+          </a:xfrm>
+          <a:prstGeom prst="rect">
+            <a:avLst/>
+          </a:prstGeom>
+          <a:noFill/>
+          <a:ln>
+            <a:noFill/>
+          </a:ln>
+        </p:spPr>
+        <p:txBody>
+          <a:bodyPr lIns="91425" tIns="91425" rIns="91425" bIns="91425" anchor="ctr" anchorCtr="0">
+            <a:noAutofit/>
+          </a:bodyPr>
+          <a:lstStyle/>
+          <a:p>
+            <a:pPr algn="ctr">
+              <a:spcBef>
+                <a:spcPts val="600"/>
+              </a:spcBef>
+            </a:pPr>
+            <a:r>
+              <a:rPr lang="en" sz="2000" b="1" dirty="0" smtClean="0">
+                <a:solidFill>
+                  <a:srgbClr val="FFFFFF"/>
+                </a:solidFill>
+                <a:latin typeface="Century Gothic" panose="020B0502020202020204" pitchFamily="34" charset="0"/>
+                <a:ea typeface="Quicksand"/>
+                <a:cs typeface="Quicksand"/>
+                <a:sym typeface="Quicksand"/>
+              </a:rPr>
+              <a:t>Clair y Clairctl</a:t>
+            </a:r>
+            <a:endParaRPr lang="en" sz="2000" b="1" dirty="0">
+              <a:solidFill>
+                <a:srgbClr val="FFFFFF"/>
+              </a:solidFill>
+              <a:latin typeface="Century Gothic" panose="020B0502020202020204" pitchFamily="34" charset="0"/>
+              <a:ea typeface="Quicksand"/>
+              <a:cs typeface="Quicksand"/>
+              <a:sym typeface="Quicksand"/>
+            </a:endParaRPr>
+          </a:p>
+        </p:txBody>
+      </p:sp>
+      <p:pic>
+        <p:nvPicPr>
+          <p:cNvPr id="6" name="Imagen 5"/>
+          <p:cNvPicPr>
+            <a:picLocks noChangeAspect="1"/>
+          </p:cNvPicPr>
+          <p:nvPr/>
+        </p:nvPicPr>
+        <p:blipFill>
+          <a:blip r:embed="rId3">
+            <a:extLst>
+              <a:ext uri="{28A0092B-C50C-407E-A947-70E740481C1C}">
+                <a14:useLocalDpi xmlns:a14="http://schemas.microsoft.com/office/drawing/2010/main" val="0"/>
+              </a:ext>
+            </a:extLst>
+          </a:blip>
+          <a:stretch>
+            <a:fillRect/>
+          </a:stretch>
+        </p:blipFill>
+        <p:spPr>
+          <a:xfrm>
+            <a:off x="0" y="3025221"/>
+            <a:ext cx="9144000" cy="4009668"/>
+          </a:xfrm>
+          <a:prstGeom prst="rect">
+            <a:avLst/>
+          </a:prstGeom>
+        </p:spPr>
+      </p:pic>
+      <p:pic>
+        <p:nvPicPr>
+          <p:cNvPr id="4" name="Imagen 3"/>
+          <p:cNvPicPr>
+            <a:picLocks noChangeAspect="1"/>
+          </p:cNvPicPr>
+          <p:nvPr/>
+        </p:nvPicPr>
+        <p:blipFill>
+          <a:blip r:embed="rId4">
+            <a:extLst>
+              <a:ext uri="{28A0092B-C50C-407E-A947-70E740481C1C}">
+                <a14:useLocalDpi xmlns:a14="http://schemas.microsoft.com/office/drawing/2010/main" val="0"/>
+              </a:ext>
+            </a:extLst>
+          </a:blip>
+          <a:stretch>
+            <a:fillRect/>
+          </a:stretch>
+        </p:blipFill>
+        <p:spPr>
+          <a:xfrm>
+            <a:off x="4118885" y="413057"/>
+            <a:ext cx="8859177" cy="4419344"/>
+          </a:xfrm>
+          <a:prstGeom prst="rect">
+            <a:avLst/>
+          </a:prstGeom>
+        </p:spPr>
+      </p:pic>
+    </p:spTree>
+    <p:extLst>
+      <p:ext uri="{BB962C8B-B14F-4D97-AF65-F5344CB8AC3E}">
+        <p14:creationId xmlns:p14="http://schemas.microsoft.com/office/powerpoint/2010/main" val="859824628"/>
+      </p:ext>
+    </p:extLst>
+  </p:cSld>
+  <p:clrMapOvr>
+    <a:masterClrMapping/>
+  </p:clrMapOvr>
+  <p:timing>
+    <p:tnLst>
+      <p:par>
+        <p:cTn id="1" dur="indefinite" restart="never" nodeType="tmRoot"/>
+      </p:par>
+    </p:tnLst>
+  </p:timing>
+</p:sld>
+</file>
+
+<file path=ppt/slides/slide22.xml><?xml version="1.0" encoding="utf-8"?>
+<p:sld xmlns:a="http://schemas.openxmlformats.org/drawingml/2006/main" xmlns:r="http://schemas.openxmlformats.org/officeDocument/2006/relationships" xmlns:p="http://schemas.openxmlformats.org/presentationml/2006/main">
+  <p:cSld>
+    <p:spTree>
+      <p:nvGrpSpPr>
+        <p:cNvPr id="1" name=""/>
+        <p:cNvGrpSpPr/>
+        <p:nvPr/>
+      </p:nvGrpSpPr>
+      <p:grpSpPr>
+        <a:xfrm>
+          <a:off x="0" y="0"/>
+          <a:ext cx="0" cy="0"/>
+          <a:chOff x="0" y="0"/>
+          <a:chExt cx="0" cy="0"/>
+        </a:xfrm>
+      </p:grpSpPr>
+      <p:sp>
+        <p:nvSpPr>
+          <p:cNvPr id="36" name="Rectángulo 35"/>
+          <p:cNvSpPr/>
+          <p:nvPr/>
+        </p:nvSpPr>
+        <p:spPr>
+          <a:xfrm>
+            <a:off x="-19977" y="0"/>
+            <a:ext cx="9163977" cy="836400"/>
+          </a:xfrm>
+          <a:prstGeom prst="rect">
+            <a:avLst/>
+          </a:prstGeom>
+          <a:solidFill>
+            <a:srgbClr val="002F7D">
+              <a:alpha val="75000"/>
+            </a:srgbClr>
+          </a:solidFill>
+          <a:ln>
+            <a:solidFill>
+              <a:srgbClr val="002F7D">
+                <a:alpha val="75000"/>
+              </a:srgbClr>
+            </a:solidFill>
+          </a:ln>
+        </p:spPr>
+        <p:style>
+          <a:lnRef idx="2">
+            <a:schemeClr val="accent1">
+              <a:shade val="50000"/>
+            </a:schemeClr>
+          </a:lnRef>
+          <a:fillRef idx="1">
+            <a:schemeClr val="accent1"/>
+          </a:fillRef>
+          <a:effectRef idx="0">
+            <a:schemeClr val="accent1"/>
+          </a:effectRef>
+          <a:fontRef idx="minor">
+            <a:schemeClr val="lt1"/>
+          </a:fontRef>
+        </p:style>
+        <p:txBody>
+          <a:bodyPr rtlCol="0" anchor="ctr"/>
+          <a:lstStyle/>
+          <a:p>
+            <a:pPr algn="ctr"/>
+            <a:endParaRPr lang="es-ES"/>
+          </a:p>
+        </p:txBody>
+      </p:sp>
+      <p:sp>
+        <p:nvSpPr>
+          <p:cNvPr id="25" name="Shape 102"/>
+          <p:cNvSpPr/>
+          <p:nvPr/>
+        </p:nvSpPr>
+        <p:spPr>
+          <a:xfrm>
+            <a:off x="0" y="825219"/>
+            <a:ext cx="9144000" cy="720000"/>
+          </a:xfrm>
+          <a:prstGeom prst="rect">
+            <a:avLst/>
+          </a:prstGeom>
+          <a:solidFill>
+            <a:srgbClr val="424242"/>
+          </a:solidFill>
+          <a:ln w="12700">
+            <a:miter lim="400000"/>
+          </a:ln>
+        </p:spPr>
+        <p:txBody>
+          <a:bodyPr lIns="0" tIns="0" rIns="0" bIns="0" anchor="ctr"/>
+          <a:lstStyle/>
+          <a:p>
+            <a:pPr lvl="0">
+              <a:defRPr sz="2400">
+                <a:solidFill>
+                  <a:srgbClr val="FFFFFF"/>
+                </a:solidFill>
+              </a:defRPr>
+            </a:pPr>
+            <a:endParaRPr sz="3200"/>
+          </a:p>
+        </p:txBody>
+      </p:sp>
+      <p:sp>
+        <p:nvSpPr>
+          <p:cNvPr id="27" name="Shape 63"/>
+          <p:cNvSpPr txBox="1"/>
+          <p:nvPr/>
+        </p:nvSpPr>
+        <p:spPr>
+          <a:xfrm>
+            <a:off x="1543977" y="186901"/>
+            <a:ext cx="7521300" cy="453600"/>
+          </a:xfrm>
+          <a:prstGeom prst="rect">
+            <a:avLst/>
+          </a:prstGeom>
+          <a:noFill/>
+          <a:ln>
+            <a:noFill/>
+          </a:ln>
+        </p:spPr>
+        <p:txBody>
+          <a:bodyPr lIns="91425" tIns="91425" rIns="91425" bIns="91425" anchor="ctr" anchorCtr="0">
+            <a:noAutofit/>
+          </a:bodyPr>
+          <a:lstStyle/>
+          <a:p>
+            <a:pPr>
+              <a:spcBef>
+                <a:spcPts val="600"/>
+              </a:spcBef>
+            </a:pPr>
+            <a:r>
+              <a:rPr lang="en" sz="2400" b="1" dirty="0" smtClean="0">
+                <a:solidFill>
+                  <a:srgbClr val="FFFFFF"/>
+                </a:solidFill>
+                <a:latin typeface="Century Gothic" panose="020B0502020202020204" pitchFamily="34" charset="0"/>
+                <a:ea typeface="Quicksand"/>
+                <a:cs typeface="Quicksand"/>
+                <a:sym typeface="Quicksand"/>
+              </a:rPr>
+              <a:t>Desarrollo de la aplicación</a:t>
+            </a:r>
+            <a:endParaRPr lang="en" sz="2400" b="1" dirty="0">
+              <a:solidFill>
+                <a:srgbClr val="FFFFFF"/>
+              </a:solidFill>
+              <a:latin typeface="Century Gothic" panose="020B0502020202020204" pitchFamily="34" charset="0"/>
+              <a:ea typeface="Quicksand"/>
+              <a:cs typeface="Quicksand"/>
+              <a:sym typeface="Quicksand"/>
+            </a:endParaRPr>
+          </a:p>
+        </p:txBody>
+      </p:sp>
+      <p:sp>
+        <p:nvSpPr>
+          <p:cNvPr id="28" name="Shape 33"/>
+          <p:cNvSpPr/>
+          <p:nvPr/>
+        </p:nvSpPr>
+        <p:spPr>
+          <a:xfrm>
+            <a:off x="385555" y="146927"/>
+            <a:ext cx="532267" cy="532267"/>
+          </a:xfrm>
+          <a:prstGeom prst="ellipse">
+            <a:avLst/>
+          </a:prstGeom>
+          <a:solidFill>
+            <a:schemeClr val="bg1"/>
+          </a:solidFill>
+          <a:ln w="9525" cap="flat" cmpd="sng">
+            <a:solidFill>
+              <a:srgbClr val="999FA9"/>
+            </a:solidFill>
+            <a:prstDash val="solid"/>
+            <a:round/>
+            <a:headEnd type="none" w="med" len="med"/>
+            <a:tailEnd type="none" w="med" len="med"/>
+          </a:ln>
+        </p:spPr>
+        <p:txBody>
+          <a:bodyPr lIns="91425" tIns="91425" rIns="91425" bIns="91425" anchor="ctr" anchorCtr="0">
+            <a:noAutofit/>
+          </a:bodyPr>
+          <a:lstStyle/>
+          <a:p>
+            <a:endParaRPr/>
+          </a:p>
+        </p:txBody>
+      </p:sp>
+      <p:sp>
+        <p:nvSpPr>
+          <p:cNvPr id="29" name="CuadroTexto 28"/>
+          <p:cNvSpPr txBox="1"/>
+          <p:nvPr/>
+        </p:nvSpPr>
+        <p:spPr>
+          <a:xfrm>
+            <a:off x="494432" y="228391"/>
+            <a:ext cx="314510" cy="369332"/>
+          </a:xfrm>
+          <a:prstGeom prst="rect">
+            <a:avLst/>
+          </a:prstGeom>
+          <a:noFill/>
+        </p:spPr>
+        <p:txBody>
+          <a:bodyPr wrap="none" rtlCol="0" anchor="ctr">
+            <a:spAutoFit/>
+          </a:bodyPr>
+          <a:lstStyle/>
+          <a:p>
+            <a:pPr algn="ctr"/>
+            <a:r>
+              <a:rPr lang="es-ES" b="1" dirty="0">
+                <a:latin typeface="Century Gothic" panose="020B0502020202020204" pitchFamily="34" charset="0"/>
+              </a:rPr>
+              <a:t>4</a:t>
+            </a:r>
+          </a:p>
+        </p:txBody>
+      </p:sp>
+      <p:sp>
+        <p:nvSpPr>
+          <p:cNvPr id="30" name="Shape 63"/>
+          <p:cNvSpPr txBox="1"/>
+          <p:nvPr/>
+        </p:nvSpPr>
+        <p:spPr>
+          <a:xfrm>
+            <a:off x="801361" y="961787"/>
+            <a:ext cx="7521300" cy="452312"/>
+          </a:xfrm>
+          <a:prstGeom prst="rect">
+            <a:avLst/>
+          </a:prstGeom>
+          <a:noFill/>
+          <a:ln>
+            <a:noFill/>
+          </a:ln>
+        </p:spPr>
+        <p:txBody>
+          <a:bodyPr lIns="91425" tIns="91425" rIns="91425" bIns="91425" anchor="ctr" anchorCtr="0">
+            <a:noAutofit/>
+          </a:bodyPr>
+          <a:lstStyle/>
+          <a:p>
+            <a:pPr algn="ctr">
+              <a:spcBef>
+                <a:spcPts val="600"/>
+              </a:spcBef>
+            </a:pPr>
+            <a:r>
+              <a:rPr lang="en" sz="2000" b="1" dirty="0" smtClean="0">
+                <a:solidFill>
+                  <a:srgbClr val="FFFFFF"/>
+                </a:solidFill>
+                <a:latin typeface="Century Gothic" panose="020B0502020202020204" pitchFamily="34" charset="0"/>
+                <a:ea typeface="Quicksand"/>
+                <a:cs typeface="Quicksand"/>
+                <a:sym typeface="Quicksand"/>
+              </a:rPr>
+              <a:t>Evaluación de la solución</a:t>
+            </a:r>
+            <a:endParaRPr lang="en" sz="2000" b="1" dirty="0">
+              <a:solidFill>
+                <a:srgbClr val="FFFFFF"/>
+              </a:solidFill>
+              <a:latin typeface="Century Gothic" panose="020B0502020202020204" pitchFamily="34" charset="0"/>
+              <a:ea typeface="Quicksand"/>
+              <a:cs typeface="Quicksand"/>
+              <a:sym typeface="Quicksand"/>
+            </a:endParaRPr>
+          </a:p>
+        </p:txBody>
+      </p:sp>
+      <p:pic>
+        <p:nvPicPr>
+          <p:cNvPr id="2" name="Imagen 1"/>
+          <p:cNvPicPr>
+            <a:picLocks noChangeAspect="1"/>
+          </p:cNvPicPr>
+          <p:nvPr/>
+        </p:nvPicPr>
+        <p:blipFill>
+          <a:blip r:embed="rId3">
+            <a:extLst>
+              <a:ext uri="{28A0092B-C50C-407E-A947-70E740481C1C}">
+                <a14:useLocalDpi xmlns:a14="http://schemas.microsoft.com/office/drawing/2010/main" val="0"/>
+              </a:ext>
+            </a:extLst>
+          </a:blip>
+          <a:stretch>
+            <a:fillRect/>
+          </a:stretch>
+        </p:blipFill>
+        <p:spPr>
+          <a:xfrm>
+            <a:off x="1836136" y="2539499"/>
+            <a:ext cx="6486525" cy="847725"/>
+          </a:xfrm>
+          <a:prstGeom prst="rect">
+            <a:avLst/>
+          </a:prstGeom>
+        </p:spPr>
+      </p:pic>
+      <p:pic>
+        <p:nvPicPr>
+          <p:cNvPr id="3" name="Imagen 2"/>
+          <p:cNvPicPr>
+            <a:picLocks noChangeAspect="1"/>
+          </p:cNvPicPr>
+          <p:nvPr/>
+        </p:nvPicPr>
+        <p:blipFill>
+          <a:blip r:embed="rId4">
+            <a:extLst>
+              <a:ext uri="{28A0092B-C50C-407E-A947-70E740481C1C}">
+                <a14:useLocalDpi xmlns:a14="http://schemas.microsoft.com/office/drawing/2010/main" val="0"/>
+              </a:ext>
+            </a:extLst>
+          </a:blip>
+          <a:stretch>
+            <a:fillRect/>
+          </a:stretch>
+        </p:blipFill>
+        <p:spPr>
+          <a:xfrm>
+            <a:off x="0" y="3440097"/>
+            <a:ext cx="9144000" cy="3417903"/>
+          </a:xfrm>
+          <a:prstGeom prst="rect">
+            <a:avLst/>
+          </a:prstGeom>
+        </p:spPr>
+      </p:pic>
+      <p:pic>
+        <p:nvPicPr>
+          <p:cNvPr id="4" name="Imagen 3"/>
+          <p:cNvPicPr>
+            <a:picLocks noChangeAspect="1"/>
+          </p:cNvPicPr>
+          <p:nvPr/>
+        </p:nvPicPr>
+        <p:blipFill>
+          <a:blip r:embed="rId5">
+            <a:extLst>
+              <a:ext uri="{28A0092B-C50C-407E-A947-70E740481C1C}">
+                <a14:useLocalDpi xmlns:a14="http://schemas.microsoft.com/office/drawing/2010/main" val="0"/>
+              </a:ext>
+            </a:extLst>
+          </a:blip>
+          <a:stretch>
+            <a:fillRect/>
+          </a:stretch>
+        </p:blipFill>
+        <p:spPr>
+          <a:xfrm>
+            <a:off x="242386" y="1545561"/>
+            <a:ext cx="6124575" cy="1028700"/>
+          </a:xfrm>
+          <a:prstGeom prst="rect">
+            <a:avLst/>
+          </a:prstGeom>
+        </p:spPr>
+      </p:pic>
+    </p:spTree>
+    <p:extLst>
+      <p:ext uri="{BB962C8B-B14F-4D97-AF65-F5344CB8AC3E}">
+        <p14:creationId xmlns:p14="http://schemas.microsoft.com/office/powerpoint/2010/main" val="1814699273"/>
+      </p:ext>
+    </p:extLst>
+  </p:cSld>
+  <p:clrMapOvr>
+    <a:masterClrMapping/>
+  </p:clrMapOvr>
+  <p:timing>
+    <p:tnLst>
+      <p:par>
+        <p:cTn id="1" dur="indefinite" restart="never" nodeType="tmRoot"/>
+      </p:par>
+    </p:tnLst>
+  </p:timing>
+</p:sld>
+</file>
+
+<file path=ppt/slides/slide23.xml><?xml version="1.0" encoding="utf-8"?>
+<p:sld xmlns:a="http://schemas.openxmlformats.org/drawingml/2006/main" xmlns:r="http://schemas.openxmlformats.org/officeDocument/2006/relationships" xmlns:p="http://schemas.openxmlformats.org/presentationml/2006/main">
+  <p:cSld>
+    <p:spTree>
+      <p:nvGrpSpPr>
+        <p:cNvPr id="1" name=""/>
+        <p:cNvGrpSpPr/>
+        <p:nvPr/>
+      </p:nvGrpSpPr>
+      <p:grpSpPr>
+        <a:xfrm>
+          <a:off x="0" y="0"/>
+          <a:ext cx="0" cy="0"/>
+          <a:chOff x="0" y="0"/>
+          <a:chExt cx="0" cy="0"/>
+        </a:xfrm>
+      </p:grpSpPr>
+      <p:sp>
+        <p:nvSpPr>
+          <p:cNvPr id="20" name="Rectángulo 19"/>
+          <p:cNvSpPr/>
+          <p:nvPr/>
+        </p:nvSpPr>
+        <p:spPr>
+          <a:xfrm>
+            <a:off x="-19977" y="0"/>
+            <a:ext cx="9163977" cy="836400"/>
+          </a:xfrm>
+          <a:prstGeom prst="rect">
+            <a:avLst/>
+          </a:prstGeom>
+          <a:solidFill>
+            <a:srgbClr val="002F7D">
+              <a:alpha val="75000"/>
+            </a:srgbClr>
+          </a:solidFill>
+          <a:ln>
+            <a:solidFill>
+              <a:srgbClr val="002F7D">
+                <a:alpha val="75000"/>
+              </a:srgbClr>
+            </a:solidFill>
+          </a:ln>
+        </p:spPr>
+        <p:style>
+          <a:lnRef idx="2">
+            <a:schemeClr val="accent1">
+              <a:shade val="50000"/>
+            </a:schemeClr>
+          </a:lnRef>
+          <a:fillRef idx="1">
+            <a:schemeClr val="accent1"/>
+          </a:fillRef>
+          <a:effectRef idx="0">
+            <a:schemeClr val="accent1"/>
+          </a:effectRef>
+          <a:fontRef idx="minor">
+            <a:schemeClr val="lt1"/>
+          </a:fontRef>
+        </p:style>
+        <p:txBody>
+          <a:bodyPr rtlCol="0" anchor="ctr"/>
+          <a:lstStyle/>
+          <a:p>
+            <a:pPr algn="ctr"/>
+            <a:endParaRPr lang="es-ES"/>
+          </a:p>
+        </p:txBody>
+      </p:sp>
+      <p:sp>
+        <p:nvSpPr>
+          <p:cNvPr id="47" name="Shape 102"/>
+          <p:cNvSpPr/>
+          <p:nvPr/>
+        </p:nvSpPr>
+        <p:spPr>
+          <a:xfrm>
+            <a:off x="0" y="825219"/>
+            <a:ext cx="9143999" cy="3337348"/>
+          </a:xfrm>
+          <a:prstGeom prst="rect">
+            <a:avLst/>
+          </a:prstGeom>
+          <a:solidFill>
+            <a:srgbClr val="424242"/>
+          </a:solidFill>
+          <a:ln w="12700">
+            <a:solidFill>
+              <a:schemeClr val="tx1">
+                <a:lumMod val="75000"/>
+                <a:lumOff val="25000"/>
+              </a:schemeClr>
+            </a:solidFill>
+            <a:miter lim="400000"/>
+          </a:ln>
+        </p:spPr>
+        <p:txBody>
+          <a:bodyPr lIns="0" tIns="0" rIns="0" bIns="0" anchor="ctr"/>
+          <a:lstStyle/>
+          <a:p>
+            <a:pPr lvl="0">
+              <a:defRPr sz="2400">
+                <a:solidFill>
+                  <a:srgbClr val="FFFFFF"/>
+                </a:solidFill>
+              </a:defRPr>
+            </a:pPr>
+            <a:endParaRPr sz="3200"/>
+          </a:p>
+        </p:txBody>
+      </p:sp>
+      <p:sp>
+        <p:nvSpPr>
+          <p:cNvPr id="27" name="Shape 63"/>
+          <p:cNvSpPr txBox="1"/>
+          <p:nvPr/>
+        </p:nvSpPr>
+        <p:spPr>
+          <a:xfrm>
+            <a:off x="1543977" y="186901"/>
+            <a:ext cx="7521300" cy="453600"/>
+          </a:xfrm>
+          <a:prstGeom prst="rect">
+            <a:avLst/>
+          </a:prstGeom>
+          <a:noFill/>
+          <a:ln>
+            <a:noFill/>
+          </a:ln>
+        </p:spPr>
+        <p:txBody>
+          <a:bodyPr lIns="91425" tIns="91425" rIns="91425" bIns="91425" anchor="ctr" anchorCtr="0">
+            <a:noAutofit/>
+          </a:bodyPr>
+          <a:lstStyle/>
+          <a:p>
+            <a:pPr>
+              <a:spcBef>
+                <a:spcPts val="600"/>
+              </a:spcBef>
+            </a:pPr>
+            <a:r>
+              <a:rPr lang="en" sz="2400" b="1" dirty="0" smtClean="0">
+                <a:solidFill>
+                  <a:srgbClr val="FFFFFF"/>
+                </a:solidFill>
+                <a:latin typeface="Century Gothic" panose="020B0502020202020204" pitchFamily="34" charset="0"/>
+                <a:ea typeface="Quicksand"/>
+                <a:cs typeface="Quicksand"/>
+                <a:sym typeface="Quicksand"/>
+              </a:rPr>
+              <a:t>Conclusión</a:t>
+            </a:r>
+            <a:endParaRPr lang="en" sz="2400" b="1" dirty="0">
+              <a:solidFill>
+                <a:srgbClr val="FFFFFF"/>
+              </a:solidFill>
+              <a:latin typeface="Century Gothic" panose="020B0502020202020204" pitchFamily="34" charset="0"/>
+              <a:ea typeface="Quicksand"/>
+              <a:cs typeface="Quicksand"/>
+              <a:sym typeface="Quicksand"/>
+            </a:endParaRPr>
+          </a:p>
+        </p:txBody>
+      </p:sp>
+      <p:sp>
+        <p:nvSpPr>
+          <p:cNvPr id="28" name="Shape 33"/>
+          <p:cNvSpPr/>
+          <p:nvPr/>
+        </p:nvSpPr>
+        <p:spPr>
+          <a:xfrm>
+            <a:off x="385555" y="146927"/>
+            <a:ext cx="532267" cy="532267"/>
+          </a:xfrm>
+          <a:prstGeom prst="ellipse">
+            <a:avLst/>
+          </a:prstGeom>
+          <a:solidFill>
+            <a:schemeClr val="bg1"/>
+          </a:solidFill>
+          <a:ln w="9525" cap="flat" cmpd="sng">
+            <a:solidFill>
+              <a:srgbClr val="999FA9"/>
+            </a:solidFill>
+            <a:prstDash val="solid"/>
+            <a:round/>
+            <a:headEnd type="none" w="med" len="med"/>
+            <a:tailEnd type="none" w="med" len="med"/>
+          </a:ln>
+        </p:spPr>
+        <p:txBody>
+          <a:bodyPr lIns="91425" tIns="91425" rIns="91425" bIns="91425" anchor="ctr" anchorCtr="0">
+            <a:noAutofit/>
+          </a:bodyPr>
+          <a:lstStyle/>
+          <a:p>
+            <a:endParaRPr/>
+          </a:p>
+        </p:txBody>
+      </p:sp>
+      <p:sp>
+        <p:nvSpPr>
+          <p:cNvPr id="29" name="CuadroTexto 28"/>
+          <p:cNvSpPr txBox="1"/>
+          <p:nvPr/>
+        </p:nvSpPr>
+        <p:spPr>
+          <a:xfrm>
+            <a:off x="494432" y="228391"/>
+            <a:ext cx="314510" cy="369332"/>
+          </a:xfrm>
+          <a:prstGeom prst="rect">
+            <a:avLst/>
+          </a:prstGeom>
+          <a:noFill/>
+        </p:spPr>
+        <p:txBody>
+          <a:bodyPr wrap="none" rtlCol="0" anchor="ctr">
+            <a:spAutoFit/>
+          </a:bodyPr>
+          <a:lstStyle/>
+          <a:p>
+            <a:pPr algn="ctr"/>
+            <a:r>
+              <a:rPr lang="es-ES" b="1" dirty="0">
+                <a:latin typeface="Century Gothic" panose="020B0502020202020204" pitchFamily="34" charset="0"/>
+              </a:rPr>
+              <a:t>5</a:t>
+            </a:r>
+          </a:p>
+        </p:txBody>
+      </p:sp>
+      <p:sp>
+        <p:nvSpPr>
+          <p:cNvPr id="30" name="Shape 63"/>
+          <p:cNvSpPr txBox="1"/>
+          <p:nvPr/>
+        </p:nvSpPr>
+        <p:spPr>
+          <a:xfrm>
+            <a:off x="2965221" y="1021118"/>
+            <a:ext cx="3193578" cy="452312"/>
+          </a:xfrm>
+          <a:prstGeom prst="rect">
+            <a:avLst/>
+          </a:prstGeom>
+          <a:noFill/>
+          <a:ln>
+            <a:noFill/>
+          </a:ln>
+        </p:spPr>
+        <p:txBody>
+          <a:bodyPr lIns="91425" tIns="91425" rIns="91425" bIns="91425" anchor="ctr" anchorCtr="0">
+            <a:noAutofit/>
+          </a:bodyPr>
+          <a:lstStyle/>
+          <a:p>
+            <a:pPr algn="ctr">
+              <a:spcBef>
+                <a:spcPts val="600"/>
+              </a:spcBef>
+            </a:pPr>
+            <a:r>
+              <a:rPr lang="en" sz="2000" b="1" dirty="0" smtClean="0">
+                <a:solidFill>
+                  <a:srgbClr val="FFFFFF"/>
+                </a:solidFill>
+                <a:latin typeface="Century Gothic" panose="020B0502020202020204" pitchFamily="34" charset="0"/>
+                <a:ea typeface="Quicksand"/>
+                <a:cs typeface="Quicksand"/>
+                <a:sym typeface="Quicksand"/>
+              </a:rPr>
+              <a:t>Objetivos cumplidos</a:t>
+            </a:r>
+            <a:endParaRPr lang="en" sz="2000" b="1" dirty="0">
+              <a:solidFill>
+                <a:srgbClr val="FFFFFF"/>
+              </a:solidFill>
+              <a:latin typeface="Century Gothic" panose="020B0502020202020204" pitchFamily="34" charset="0"/>
+              <a:ea typeface="Quicksand"/>
+              <a:cs typeface="Quicksand"/>
+              <a:sym typeface="Quicksand"/>
+            </a:endParaRPr>
+          </a:p>
+        </p:txBody>
+      </p:sp>
+      <p:sp>
+        <p:nvSpPr>
+          <p:cNvPr id="49" name="Shape 63"/>
+          <p:cNvSpPr txBox="1"/>
+          <p:nvPr/>
+        </p:nvSpPr>
+        <p:spPr>
+          <a:xfrm>
+            <a:off x="2729552" y="4274946"/>
+            <a:ext cx="3664918" cy="452312"/>
+          </a:xfrm>
+          <a:prstGeom prst="rect">
+            <a:avLst/>
+          </a:prstGeom>
+          <a:noFill/>
+          <a:ln>
+            <a:noFill/>
+          </a:ln>
+        </p:spPr>
+        <p:txBody>
+          <a:bodyPr lIns="91425" tIns="91425" rIns="91425" bIns="91425" anchor="ctr" anchorCtr="0">
+            <a:noAutofit/>
+          </a:bodyPr>
+          <a:lstStyle/>
+          <a:p>
+            <a:pPr algn="ctr">
+              <a:spcBef>
+                <a:spcPts val="600"/>
+              </a:spcBef>
+            </a:pPr>
+            <a:r>
+              <a:rPr lang="en" sz="2000" b="1" dirty="0" smtClean="0">
+                <a:latin typeface="Century Gothic" panose="020B0502020202020204" pitchFamily="34" charset="0"/>
+                <a:ea typeface="Quicksand"/>
+                <a:cs typeface="Quicksand"/>
+                <a:sym typeface="Quicksand"/>
+              </a:rPr>
+              <a:t>Línea futura de trabajo</a:t>
+            </a:r>
+            <a:endParaRPr lang="en" sz="2000" b="1" dirty="0">
+              <a:latin typeface="Century Gothic" panose="020B0502020202020204" pitchFamily="34" charset="0"/>
+              <a:ea typeface="Quicksand"/>
+              <a:cs typeface="Quicksand"/>
+              <a:sym typeface="Quicksand"/>
+            </a:endParaRPr>
+          </a:p>
+        </p:txBody>
+      </p:sp>
+      <p:sp>
+        <p:nvSpPr>
+          <p:cNvPr id="5" name="Rectángulo 4"/>
+          <p:cNvSpPr/>
+          <p:nvPr/>
+        </p:nvSpPr>
+        <p:spPr>
+          <a:xfrm>
+            <a:off x="3282588" y="6090114"/>
+            <a:ext cx="2551369" cy="646331"/>
+          </a:xfrm>
+          <a:prstGeom prst="rect">
+            <a:avLst/>
+          </a:prstGeom>
+        </p:spPr>
+        <p:txBody>
+          <a:bodyPr wrap="square">
+            <a:spAutoFit/>
+          </a:bodyPr>
+          <a:lstStyle/>
+          <a:p>
+            <a:pPr algn="ctr"/>
+            <a:r>
+              <a:rPr lang="es-ES" spc="-20" dirty="0" smtClean="0">
+                <a:ea typeface="Calibri" panose="020F0502020204030204" pitchFamily="34" charset="0"/>
+                <a:cs typeface="Times New Roman" panose="02020603050405020304" pitchFamily="18" charset="0"/>
+              </a:rPr>
+              <a:t>Preparación del entorno para producción</a:t>
+            </a:r>
+            <a:endParaRPr lang="es-ES" dirty="0">
+              <a:cs typeface="Times New Roman" panose="02020603050405020304" pitchFamily="18" charset="0"/>
+            </a:endParaRPr>
+          </a:p>
+        </p:txBody>
+      </p:sp>
+      <p:sp>
+        <p:nvSpPr>
+          <p:cNvPr id="6" name="Rectángulo 5"/>
+          <p:cNvSpPr/>
+          <p:nvPr/>
+        </p:nvSpPr>
+        <p:spPr>
+          <a:xfrm>
+            <a:off x="6097657" y="5923969"/>
+            <a:ext cx="2763425" cy="646331"/>
+          </a:xfrm>
+          <a:prstGeom prst="rect">
+            <a:avLst/>
+          </a:prstGeom>
+        </p:spPr>
+        <p:txBody>
+          <a:bodyPr wrap="square">
+            <a:spAutoFit/>
+          </a:bodyPr>
+          <a:lstStyle/>
+          <a:p>
+            <a:pPr algn="ctr"/>
+            <a:r>
+              <a:rPr lang="es-ES" spc="-20" dirty="0" smtClean="0">
+                <a:ea typeface="Calibri" panose="020F0502020204030204" pitchFamily="34" charset="0"/>
+                <a:cs typeface="Times New Roman" panose="02020603050405020304" pitchFamily="18" charset="0"/>
+              </a:rPr>
+              <a:t>Ampliar la cantidad de repositorios alcanzados</a:t>
+            </a:r>
+          </a:p>
+        </p:txBody>
+      </p:sp>
+      <p:pic>
+        <p:nvPicPr>
+          <p:cNvPr id="9" name="Imagen 8"/>
+          <p:cNvPicPr>
+            <a:picLocks noChangeAspect="1"/>
+          </p:cNvPicPr>
+          <p:nvPr/>
+        </p:nvPicPr>
+        <p:blipFill>
+          <a:blip r:embed="rId3" cstate="print">
+            <a:extLst>
+              <a:ext uri="{28A0092B-C50C-407E-A947-70E740481C1C}">
+                <a14:useLocalDpi xmlns:a14="http://schemas.microsoft.com/office/drawing/2010/main" val="0"/>
+              </a:ext>
+            </a:extLst>
+          </a:blip>
+          <a:stretch>
+            <a:fillRect/>
+          </a:stretch>
+        </p:blipFill>
+        <p:spPr>
+          <a:xfrm>
+            <a:off x="4137043" y="4802448"/>
+            <a:ext cx="807216" cy="1196710"/>
+          </a:xfrm>
+          <a:prstGeom prst="rect">
+            <a:avLst/>
+          </a:prstGeom>
+        </p:spPr>
+      </p:pic>
+      <p:sp>
+        <p:nvSpPr>
+          <p:cNvPr id="51" name="Rectángulo 50"/>
+          <p:cNvSpPr/>
+          <p:nvPr/>
+        </p:nvSpPr>
+        <p:spPr>
+          <a:xfrm>
+            <a:off x="278047" y="3125355"/>
+            <a:ext cx="2763425" cy="646331"/>
+          </a:xfrm>
+          <a:prstGeom prst="rect">
+            <a:avLst/>
+          </a:prstGeom>
+        </p:spPr>
+        <p:txBody>
+          <a:bodyPr wrap="square">
+            <a:spAutoFit/>
+          </a:bodyPr>
+          <a:lstStyle/>
+          <a:p>
+            <a:pPr algn="ctr"/>
+            <a:r>
+              <a:rPr lang="es-ES" spc="-20" dirty="0" smtClean="0">
+                <a:solidFill>
+                  <a:schemeClr val="bg1"/>
+                </a:solidFill>
+                <a:ea typeface="Calibri" panose="020F0502020204030204" pitchFamily="34" charset="0"/>
+                <a:cs typeface="Times New Roman" panose="02020603050405020304" pitchFamily="18" charset="0"/>
+              </a:rPr>
+              <a:t>Análisis estático de </a:t>
+            </a:r>
+          </a:p>
+          <a:p>
+            <a:pPr algn="ctr"/>
+            <a:r>
+              <a:rPr lang="es-ES" spc="-20" dirty="0" smtClean="0">
+                <a:solidFill>
+                  <a:schemeClr val="bg1"/>
+                </a:solidFill>
+                <a:ea typeface="Calibri" panose="020F0502020204030204" pitchFamily="34" charset="0"/>
+                <a:cs typeface="Times New Roman" panose="02020603050405020304" pitchFamily="18" charset="0"/>
+              </a:rPr>
+              <a:t>forma pasiva</a:t>
+            </a:r>
+          </a:p>
+        </p:txBody>
+      </p:sp>
+      <p:sp>
+        <p:nvSpPr>
+          <p:cNvPr id="52" name="Rectángulo 51"/>
+          <p:cNvSpPr/>
+          <p:nvPr/>
+        </p:nvSpPr>
+        <p:spPr>
+          <a:xfrm>
+            <a:off x="2829723" y="1603662"/>
+            <a:ext cx="3457101" cy="646331"/>
+          </a:xfrm>
+          <a:prstGeom prst="rect">
+            <a:avLst/>
+          </a:prstGeom>
+        </p:spPr>
+        <p:txBody>
+          <a:bodyPr wrap="square">
+            <a:spAutoFit/>
+          </a:bodyPr>
+          <a:lstStyle/>
+          <a:p>
+            <a:pPr algn="ctr"/>
+            <a:r>
+              <a:rPr lang="es-ES" spc="-20" dirty="0" smtClean="0">
+                <a:solidFill>
+                  <a:schemeClr val="bg1"/>
+                </a:solidFill>
+                <a:ea typeface="Calibri" panose="020F0502020204030204" pitchFamily="34" charset="0"/>
+                <a:cs typeface="Times New Roman" panose="02020603050405020304" pitchFamily="18" charset="0"/>
+              </a:rPr>
+              <a:t>Incluido en el propio </a:t>
+            </a:r>
+            <a:br>
+              <a:rPr lang="es-ES" spc="-20" dirty="0" smtClean="0">
+                <a:solidFill>
+                  <a:schemeClr val="bg1"/>
+                </a:solidFill>
+                <a:ea typeface="Calibri" panose="020F0502020204030204" pitchFamily="34" charset="0"/>
+                <a:cs typeface="Times New Roman" panose="02020603050405020304" pitchFamily="18" charset="0"/>
+              </a:rPr>
+            </a:br>
+            <a:r>
+              <a:rPr lang="es-ES" spc="-20" dirty="0" smtClean="0">
+                <a:solidFill>
+                  <a:schemeClr val="bg1"/>
+                </a:solidFill>
+                <a:ea typeface="Calibri" panose="020F0502020204030204" pitchFamily="34" charset="0"/>
+                <a:cs typeface="Times New Roman" panose="02020603050405020304" pitchFamily="18" charset="0"/>
+              </a:rPr>
+              <a:t>proceso de desarrollo</a:t>
+            </a:r>
+          </a:p>
+        </p:txBody>
+      </p:sp>
+      <p:sp>
+        <p:nvSpPr>
+          <p:cNvPr id="55" name="Rectángulo 54"/>
+          <p:cNvSpPr/>
+          <p:nvPr/>
+        </p:nvSpPr>
+        <p:spPr>
+          <a:xfrm>
+            <a:off x="6097657" y="3125355"/>
+            <a:ext cx="2763425" cy="646331"/>
+          </a:xfrm>
+          <a:prstGeom prst="rect">
+            <a:avLst/>
+          </a:prstGeom>
+        </p:spPr>
+        <p:txBody>
+          <a:bodyPr wrap="square">
+            <a:spAutoFit/>
+          </a:bodyPr>
+          <a:lstStyle/>
+          <a:p>
+            <a:pPr algn="ctr"/>
+            <a:r>
+              <a:rPr lang="es-ES" spc="-20" dirty="0" smtClean="0">
+                <a:solidFill>
+                  <a:schemeClr val="bg1"/>
+                </a:solidFill>
+                <a:ea typeface="Calibri" panose="020F0502020204030204" pitchFamily="34" charset="0"/>
+                <a:cs typeface="Times New Roman" panose="02020603050405020304" pitchFamily="18" charset="0"/>
+              </a:rPr>
+              <a:t>Utilizando contenedores de imágenes</a:t>
+            </a:r>
+          </a:p>
+        </p:txBody>
+      </p:sp>
+      <p:sp>
+        <p:nvSpPr>
+          <p:cNvPr id="23" name="Rectángulo 22"/>
+          <p:cNvSpPr/>
+          <p:nvPr/>
+        </p:nvSpPr>
+        <p:spPr>
+          <a:xfrm>
+            <a:off x="171430" y="6017968"/>
+            <a:ext cx="2610904" cy="646331"/>
+          </a:xfrm>
+          <a:prstGeom prst="rect">
+            <a:avLst/>
+          </a:prstGeom>
+        </p:spPr>
+        <p:txBody>
+          <a:bodyPr wrap="square">
+            <a:spAutoFit/>
+          </a:bodyPr>
+          <a:lstStyle/>
+          <a:p>
+            <a:pPr algn="ctr"/>
+            <a:r>
+              <a:rPr lang="es-ES" spc="-20" dirty="0" smtClean="0">
+                <a:ea typeface="Calibri" panose="020F0502020204030204" pitchFamily="34" charset="0"/>
+                <a:cs typeface="Times New Roman" panose="02020603050405020304" pitchFamily="18" charset="0"/>
+              </a:rPr>
+              <a:t>Lenguajes de programación examinados</a:t>
+            </a:r>
+            <a:endParaRPr lang="es-ES" dirty="0">
+              <a:cs typeface="Times New Roman" panose="02020603050405020304" pitchFamily="18" charset="0"/>
+            </a:endParaRPr>
+          </a:p>
+        </p:txBody>
+      </p:sp>
+      <p:pic>
+        <p:nvPicPr>
+          <p:cNvPr id="2" name="Imagen 1"/>
+          <p:cNvPicPr>
+            <a:picLocks noChangeAspect="1"/>
+          </p:cNvPicPr>
+          <p:nvPr/>
+        </p:nvPicPr>
+        <p:blipFill>
+          <a:blip r:embed="rId4" cstate="print">
+            <a:extLst>
+              <a:ext uri="{28A0092B-C50C-407E-A947-70E740481C1C}">
+                <a14:useLocalDpi xmlns:a14="http://schemas.microsoft.com/office/drawing/2010/main" val="0"/>
+              </a:ext>
+            </a:extLst>
+          </a:blip>
+          <a:stretch>
+            <a:fillRect/>
+          </a:stretch>
+        </p:blipFill>
+        <p:spPr>
+          <a:xfrm>
+            <a:off x="879282" y="4802448"/>
+            <a:ext cx="1195200" cy="1195200"/>
+          </a:xfrm>
+          <a:prstGeom prst="rect">
+            <a:avLst/>
+          </a:prstGeom>
+        </p:spPr>
+      </p:pic>
+      <p:pic>
+        <p:nvPicPr>
+          <p:cNvPr id="3" name="Imagen 2"/>
+          <p:cNvPicPr>
+            <a:picLocks noChangeAspect="1"/>
+          </p:cNvPicPr>
+          <p:nvPr/>
+        </p:nvPicPr>
+        <p:blipFill>
+          <a:blip r:embed="rId5" cstate="print">
+            <a:extLst>
+              <a:ext uri="{28A0092B-C50C-407E-A947-70E740481C1C}">
+                <a14:useLocalDpi xmlns:a14="http://schemas.microsoft.com/office/drawing/2010/main" val="0"/>
+              </a:ext>
+            </a:extLst>
+          </a:blip>
+          <a:stretch>
+            <a:fillRect/>
+          </a:stretch>
+        </p:blipFill>
+        <p:spPr>
+          <a:xfrm>
+            <a:off x="6585908" y="4727258"/>
+            <a:ext cx="1786922" cy="1195200"/>
+          </a:xfrm>
+          <a:prstGeom prst="rect">
+            <a:avLst/>
+          </a:prstGeom>
+        </p:spPr>
+      </p:pic>
+      <p:pic>
+        <p:nvPicPr>
+          <p:cNvPr id="7" name="Imagen 6"/>
+          <p:cNvPicPr>
+            <a:picLocks noChangeAspect="1"/>
+          </p:cNvPicPr>
+          <p:nvPr/>
+        </p:nvPicPr>
+        <p:blipFill>
+          <a:blip r:embed="rId6" cstate="print">
+            <a:extLst>
+              <a:ext uri="{28A0092B-C50C-407E-A947-70E740481C1C}">
+                <a14:useLocalDpi xmlns:a14="http://schemas.microsoft.com/office/drawing/2010/main" val="0"/>
+              </a:ext>
+            </a:extLst>
+          </a:blip>
+          <a:stretch>
+            <a:fillRect/>
+          </a:stretch>
+        </p:blipFill>
+        <p:spPr>
+          <a:xfrm>
+            <a:off x="6641322" y="1813444"/>
+            <a:ext cx="1676093" cy="1310400"/>
+          </a:xfrm>
+          <a:prstGeom prst="ellipse">
+            <a:avLst/>
+          </a:prstGeom>
+          <a:ln w="63500" cap="rnd">
+            <a:noFill/>
+          </a:ln>
+          <a:effectLst>
+            <a:outerShdw blurRad="381000" dist="292100" dir="5400000" sx="-80000" sy="-18000" rotWithShape="0">
+              <a:srgbClr val="000000">
+                <a:alpha val="22000"/>
+              </a:srgbClr>
+            </a:outerShdw>
+          </a:effectLst>
+          <a:scene3d>
+            <a:camera prst="orthographicFront"/>
+            <a:lightRig rig="contrasting" dir="t">
+              <a:rot lat="0" lon="0" rev="3000000"/>
+            </a:lightRig>
+          </a:scene3d>
+          <a:sp3d contourW="7620">
+            <a:bevelT w="95250" h="31750"/>
+            <a:contourClr>
+              <a:srgbClr val="333333"/>
+            </a:contourClr>
+          </a:sp3d>
+        </p:spPr>
+      </p:pic>
+      <p:pic>
+        <p:nvPicPr>
+          <p:cNvPr id="10" name="Imagen 9"/>
+          <p:cNvPicPr>
+            <a:picLocks noChangeAspect="1"/>
+          </p:cNvPicPr>
+          <p:nvPr/>
+        </p:nvPicPr>
+        <p:blipFill>
+          <a:blip r:embed="rId7" cstate="print">
+            <a:extLst>
+              <a:ext uri="{28A0092B-C50C-407E-A947-70E740481C1C}">
+                <a14:useLocalDpi xmlns:a14="http://schemas.microsoft.com/office/drawing/2010/main" val="0"/>
+              </a:ext>
+            </a:extLst>
+          </a:blip>
+          <a:stretch>
+            <a:fillRect/>
+          </a:stretch>
+        </p:blipFill>
+        <p:spPr>
+          <a:xfrm>
+            <a:off x="3888500" y="2380225"/>
+            <a:ext cx="1308899" cy="1308899"/>
+          </a:xfrm>
+          <a:prstGeom prst="rect">
+            <a:avLst/>
+          </a:prstGeom>
+        </p:spPr>
+      </p:pic>
+      <p:pic>
+        <p:nvPicPr>
+          <p:cNvPr id="11" name="Imagen 10"/>
+          <p:cNvPicPr>
+            <a:picLocks noChangeAspect="1"/>
+          </p:cNvPicPr>
+          <p:nvPr/>
+        </p:nvPicPr>
+        <p:blipFill>
+          <a:blip r:embed="rId8" cstate="print">
+            <a:extLst>
+              <a:ext uri="{28A0092B-C50C-407E-A947-70E740481C1C}">
+                <a14:useLocalDpi xmlns:a14="http://schemas.microsoft.com/office/drawing/2010/main" val="0"/>
+              </a:ext>
+            </a:extLst>
+          </a:blip>
+          <a:stretch>
+            <a:fillRect/>
+          </a:stretch>
+        </p:blipFill>
+        <p:spPr>
+          <a:xfrm>
+            <a:off x="1002976" y="1813444"/>
+            <a:ext cx="1313565" cy="1310400"/>
+          </a:xfrm>
+          <a:prstGeom prst="rect">
+            <a:avLst/>
+          </a:prstGeom>
+        </p:spPr>
+      </p:pic>
+    </p:spTree>
+    <p:extLst>
+      <p:ext uri="{BB962C8B-B14F-4D97-AF65-F5344CB8AC3E}">
+        <p14:creationId xmlns:p14="http://schemas.microsoft.com/office/powerpoint/2010/main" val="3053281417"/>
+      </p:ext>
+    </p:extLst>
+  </p:cSld>
+  <p:clrMapOvr>
+    <a:masterClrMapping/>
+  </p:clrMapOvr>
+  <p:timing>
+    <p:tnLst>
+      <p:par>
+        <p:cTn id="1" dur="indefinite" restart="never" nodeType="tmRoot"/>
+      </p:par>
+    </p:tnLst>
+  </p:timing>
+</p:sld>
+</file>
+
+<file path=ppt/slides/slide24.xml><?xml version="1.0" encoding="utf-8"?>
+<p:sld xmlns:a="http://schemas.openxmlformats.org/drawingml/2006/main" xmlns:r="http://schemas.openxmlformats.org/officeDocument/2006/relationships" xmlns:p="http://schemas.openxmlformats.org/presentationml/2006/main">
+  <p:cSld>
+    <p:spTree>
+      <p:nvGrpSpPr>
+        <p:cNvPr id="1" name=""/>
+        <p:cNvGrpSpPr/>
+        <p:nvPr/>
+      </p:nvGrpSpPr>
+      <p:grpSpPr>
+        <a:xfrm>
+          <a:off x="0" y="0"/>
+          <a:ext cx="0" cy="0"/>
+          <a:chOff x="0" y="0"/>
+          <a:chExt cx="0" cy="0"/>
+        </a:xfrm>
+      </p:grpSpPr>
+      <p:sp>
+        <p:nvSpPr>
+          <p:cNvPr id="36" name="Rectángulo 35"/>
+          <p:cNvSpPr/>
+          <p:nvPr/>
+        </p:nvSpPr>
+        <p:spPr>
+          <a:xfrm>
+            <a:off x="-19977" y="0"/>
+            <a:ext cx="9163977" cy="836400"/>
+          </a:xfrm>
+          <a:prstGeom prst="rect">
+            <a:avLst/>
+          </a:prstGeom>
+          <a:solidFill>
+            <a:srgbClr val="002F7D">
+              <a:alpha val="75000"/>
+            </a:srgbClr>
+          </a:solidFill>
+          <a:ln>
+            <a:solidFill>
+              <a:srgbClr val="002F7D">
+                <a:alpha val="75000"/>
+              </a:srgbClr>
+            </a:solidFill>
+          </a:ln>
+        </p:spPr>
+        <p:style>
+          <a:lnRef idx="2">
+            <a:schemeClr val="accent1">
+              <a:shade val="50000"/>
+            </a:schemeClr>
+          </a:lnRef>
+          <a:fillRef idx="1">
+            <a:schemeClr val="accent1"/>
+          </a:fillRef>
+          <a:effectRef idx="0">
+            <a:schemeClr val="accent1"/>
+          </a:effectRef>
+          <a:fontRef idx="minor">
+            <a:schemeClr val="lt1"/>
+          </a:fontRef>
+        </p:style>
+        <p:txBody>
+          <a:bodyPr rtlCol="0" anchor="ctr"/>
+          <a:lstStyle/>
+          <a:p>
+            <a:pPr algn="ctr"/>
+            <a:endParaRPr lang="es-ES"/>
+          </a:p>
+        </p:txBody>
+      </p:sp>
+      <p:sp>
+        <p:nvSpPr>
+          <p:cNvPr id="25" name="Shape 102"/>
+          <p:cNvSpPr/>
+          <p:nvPr/>
+        </p:nvSpPr>
+        <p:spPr>
+          <a:xfrm>
+            <a:off x="0" y="825219"/>
+            <a:ext cx="9144000" cy="720000"/>
+          </a:xfrm>
+          <a:prstGeom prst="rect">
+            <a:avLst/>
+          </a:prstGeom>
+          <a:solidFill>
+            <a:srgbClr val="424242"/>
+          </a:solidFill>
+          <a:ln w="12700">
+            <a:miter lim="400000"/>
+          </a:ln>
+        </p:spPr>
+        <p:txBody>
+          <a:bodyPr lIns="0" tIns="0" rIns="0" bIns="0" anchor="ctr"/>
+          <a:lstStyle/>
+          <a:p>
+            <a:pPr lvl="0">
+              <a:defRPr sz="2400">
+                <a:solidFill>
+                  <a:srgbClr val="FFFFFF"/>
+                </a:solidFill>
+              </a:defRPr>
+            </a:pPr>
+            <a:endParaRPr sz="3200"/>
+          </a:p>
+        </p:txBody>
+      </p:sp>
+      <p:sp>
+        <p:nvSpPr>
+          <p:cNvPr id="27" name="Shape 63"/>
+          <p:cNvSpPr txBox="1"/>
+          <p:nvPr/>
+        </p:nvSpPr>
+        <p:spPr>
+          <a:xfrm>
+            <a:off x="1543977" y="186901"/>
+            <a:ext cx="7521300" cy="453600"/>
+          </a:xfrm>
+          <a:prstGeom prst="rect">
+            <a:avLst/>
+          </a:prstGeom>
+          <a:noFill/>
+          <a:ln>
+            <a:noFill/>
+          </a:ln>
+        </p:spPr>
+        <p:txBody>
+          <a:bodyPr lIns="91425" tIns="91425" rIns="91425" bIns="91425" anchor="ctr" anchorCtr="0">
+            <a:noAutofit/>
+          </a:bodyPr>
+          <a:lstStyle/>
+          <a:p>
+            <a:pPr>
+              <a:spcBef>
+                <a:spcPts val="600"/>
+              </a:spcBef>
+            </a:pPr>
+            <a:r>
+              <a:rPr lang="en" sz="2400" b="1" dirty="0" smtClean="0">
+                <a:solidFill>
+                  <a:srgbClr val="FFFFFF"/>
+                </a:solidFill>
+                <a:latin typeface="Century Gothic" panose="020B0502020202020204" pitchFamily="34" charset="0"/>
+                <a:ea typeface="Quicksand"/>
+                <a:cs typeface="Quicksand"/>
+                <a:sym typeface="Quicksand"/>
+              </a:rPr>
+              <a:t>GitHub</a:t>
+            </a:r>
+            <a:endParaRPr lang="en" sz="2400" b="1" dirty="0">
+              <a:solidFill>
+                <a:srgbClr val="FFFFFF"/>
+              </a:solidFill>
+              <a:latin typeface="Century Gothic" panose="020B0502020202020204" pitchFamily="34" charset="0"/>
+              <a:ea typeface="Quicksand"/>
+              <a:cs typeface="Quicksand"/>
+              <a:sym typeface="Quicksand"/>
+            </a:endParaRPr>
+          </a:p>
+        </p:txBody>
+      </p:sp>
+      <p:sp>
+        <p:nvSpPr>
+          <p:cNvPr id="28" name="Shape 33"/>
+          <p:cNvSpPr/>
+          <p:nvPr/>
+        </p:nvSpPr>
+        <p:spPr>
+          <a:xfrm>
+            <a:off x="385555" y="146927"/>
+            <a:ext cx="532267" cy="532267"/>
+          </a:xfrm>
+          <a:prstGeom prst="ellipse">
+            <a:avLst/>
+          </a:prstGeom>
+          <a:solidFill>
+            <a:schemeClr val="bg1"/>
+          </a:solidFill>
+          <a:ln w="9525" cap="flat" cmpd="sng">
+            <a:solidFill>
+              <a:srgbClr val="999FA9"/>
+            </a:solidFill>
+            <a:prstDash val="solid"/>
+            <a:round/>
+            <a:headEnd type="none" w="med" len="med"/>
+            <a:tailEnd type="none" w="med" len="med"/>
+          </a:ln>
+        </p:spPr>
+        <p:txBody>
+          <a:bodyPr lIns="91425" tIns="91425" rIns="91425" bIns="91425" anchor="ctr" anchorCtr="0">
+            <a:noAutofit/>
+          </a:bodyPr>
+          <a:lstStyle/>
+          <a:p>
+            <a:endParaRPr/>
+          </a:p>
+        </p:txBody>
+      </p:sp>
+      <p:sp>
+        <p:nvSpPr>
+          <p:cNvPr id="29" name="CuadroTexto 28"/>
+          <p:cNvSpPr txBox="1"/>
+          <p:nvPr/>
+        </p:nvSpPr>
+        <p:spPr>
+          <a:xfrm>
+            <a:off x="494432" y="228391"/>
+            <a:ext cx="314510" cy="369332"/>
+          </a:xfrm>
+          <a:prstGeom prst="rect">
+            <a:avLst/>
+          </a:prstGeom>
+          <a:noFill/>
+        </p:spPr>
+        <p:txBody>
+          <a:bodyPr wrap="none" rtlCol="0" anchor="ctr">
+            <a:spAutoFit/>
+          </a:bodyPr>
+          <a:lstStyle/>
+          <a:p>
+            <a:pPr algn="ctr"/>
+            <a:r>
+              <a:rPr lang="es-ES" b="1" dirty="0" smtClean="0">
+                <a:latin typeface="Century Gothic" panose="020B0502020202020204" pitchFamily="34" charset="0"/>
+              </a:rPr>
+              <a:t>6</a:t>
+            </a:r>
+            <a:endParaRPr lang="es-ES" b="1" dirty="0">
+              <a:latin typeface="Century Gothic" panose="020B0502020202020204" pitchFamily="34" charset="0"/>
+            </a:endParaRPr>
+          </a:p>
+        </p:txBody>
+      </p:sp>
+      <p:sp>
+        <p:nvSpPr>
+          <p:cNvPr id="30" name="Shape 63"/>
+          <p:cNvSpPr txBox="1"/>
+          <p:nvPr/>
+        </p:nvSpPr>
+        <p:spPr>
+          <a:xfrm>
+            <a:off x="801361" y="961787"/>
+            <a:ext cx="7521300" cy="452312"/>
+          </a:xfrm>
+          <a:prstGeom prst="rect">
+            <a:avLst/>
+          </a:prstGeom>
+          <a:noFill/>
+          <a:ln>
+            <a:noFill/>
+          </a:ln>
+        </p:spPr>
+        <p:txBody>
+          <a:bodyPr lIns="91425" tIns="91425" rIns="91425" bIns="91425" anchor="ctr" anchorCtr="0">
+            <a:noAutofit/>
+          </a:bodyPr>
+          <a:lstStyle/>
+          <a:p>
+            <a:pPr algn="ctr">
+              <a:spcBef>
+                <a:spcPts val="600"/>
+              </a:spcBef>
+            </a:pPr>
+            <a:r>
+              <a:rPr lang="en" sz="2000" b="1" dirty="0" smtClean="0">
+                <a:solidFill>
+                  <a:srgbClr val="FFFFFF"/>
+                </a:solidFill>
+                <a:latin typeface="Century Gothic" panose="020B0502020202020204" pitchFamily="34" charset="0"/>
+                <a:ea typeface="Quicksand"/>
+                <a:cs typeface="Quicksand"/>
+                <a:sym typeface="Quicksand"/>
+              </a:rPr>
+              <a:t>Esto no acaba aquí</a:t>
+            </a:r>
+            <a:endParaRPr lang="en" sz="2000" b="1" dirty="0">
+              <a:solidFill>
+                <a:srgbClr val="FFFFFF"/>
+              </a:solidFill>
+              <a:latin typeface="Century Gothic" panose="020B0502020202020204" pitchFamily="34" charset="0"/>
+              <a:ea typeface="Quicksand"/>
+              <a:cs typeface="Quicksand"/>
+              <a:sym typeface="Quicksand"/>
+            </a:endParaRPr>
+          </a:p>
+        </p:txBody>
+      </p:sp>
+      <p:pic>
+        <p:nvPicPr>
+          <p:cNvPr id="5" name="Imagen 4"/>
+          <p:cNvPicPr>
+            <a:picLocks noChangeAspect="1"/>
+          </p:cNvPicPr>
+          <p:nvPr/>
+        </p:nvPicPr>
+        <p:blipFill>
+          <a:blip r:embed="rId3">
+            <a:extLst>
+              <a:ext uri="{28A0092B-C50C-407E-A947-70E740481C1C}">
+                <a14:useLocalDpi xmlns:a14="http://schemas.microsoft.com/office/drawing/2010/main" val="0"/>
+              </a:ext>
+            </a:extLst>
+          </a:blip>
+          <a:stretch>
+            <a:fillRect/>
+          </a:stretch>
+        </p:blipFill>
+        <p:spPr>
+          <a:xfrm>
+            <a:off x="0" y="1539487"/>
+            <a:ext cx="10408438" cy="5318514"/>
+          </a:xfrm>
+          <a:prstGeom prst="rect">
+            <a:avLst/>
+          </a:prstGeom>
+        </p:spPr>
+      </p:pic>
+    </p:spTree>
+    <p:extLst>
+      <p:ext uri="{BB962C8B-B14F-4D97-AF65-F5344CB8AC3E}">
+        <p14:creationId xmlns:p14="http://schemas.microsoft.com/office/powerpoint/2010/main" val="2296889630"/>
+      </p:ext>
+    </p:extLst>
+  </p:cSld>
+  <p:clrMapOvr>
+    <a:masterClrMapping/>
+  </p:clrMapOvr>
+  <p:timing>
+    <p:tnLst>
+      <p:par>
+        <p:cTn id="1" dur="indefinite" restart="never" nodeType="tmRoot"/>
+      </p:par>
+    </p:tnLst>
+  </p:timing>
+</p:sld>
+</file>
+
+<file path=ppt/slides/slide25.xml><?xml version="1.0" encoding="utf-8"?>
 <p:sld xmlns:a="http://schemas.openxmlformats.org/drawingml/2006/main" xmlns:r="http://schemas.openxmlformats.org/officeDocument/2006/relationships" xmlns:p="http://schemas.openxmlformats.org/presentationml/2006/main">
   <p:cSld>
     <p:spTree>
@@ -11484,7 +14159,7 @@
           <a:graphicData uri="http://schemas.openxmlformats.org/presentationml/2006/ole">
             <mc:AlternateContent xmlns:mc="http://schemas.openxmlformats.org/markup-compatibility/2006">
               <mc:Choice xmlns:v="urn:schemas-microsoft-com:vml" Requires="v">
-                <p:oleObj spid="_x0000_s2094" name="Acrobat Document" r:id="rId5" imgW="1904818" imgH="1904835" progId="AcroExch.Document.DC">
+                <p:oleObj spid="_x0000_s2120" name="Acrobat Document" r:id="rId5" imgW="1904818" imgH="1904835" progId="AcroExch.Document.DC">
                   <p:embed/>
                 </p:oleObj>
               </mc:Choice>
@@ -11991,6 +14666,66 @@
           <a:chExt cx="0" cy="0"/>
         </a:xfrm>
       </p:grpSpPr>
+      <p:pic>
+        <p:nvPicPr>
+          <p:cNvPr id="6" name="Imagen 5"/>
+          <p:cNvPicPr>
+            <a:picLocks noChangeAspect="1"/>
+          </p:cNvPicPr>
+          <p:nvPr/>
+        </p:nvPicPr>
+        <p:blipFill>
+          <a:blip r:embed="rId3" cstate="print">
+            <a:extLst>
+              <a:ext uri="{28A0092B-C50C-407E-A947-70E740481C1C}">
+                <a14:useLocalDpi xmlns:a14="http://schemas.microsoft.com/office/drawing/2010/main" val="0"/>
+              </a:ext>
+            </a:extLst>
+          </a:blip>
+          <a:stretch>
+            <a:fillRect/>
+          </a:stretch>
+        </p:blipFill>
+        <p:spPr>
+          <a:xfrm>
+            <a:off x="1007987" y="4864797"/>
+            <a:ext cx="1212847" cy="1209925"/>
+          </a:xfrm>
+          <a:prstGeom prst="rect">
+            <a:avLst/>
+          </a:prstGeom>
+        </p:spPr>
+      </p:pic>
+      <p:pic>
+        <p:nvPicPr>
+          <p:cNvPr id="2" name="Imagen 1"/>
+          <p:cNvPicPr>
+            <a:picLocks noChangeAspect="1"/>
+          </p:cNvPicPr>
+          <p:nvPr/>
+        </p:nvPicPr>
+        <p:blipFill>
+          <a:blip r:embed="rId4">
+            <a:extLst>
+              <a:ext uri="{28A0092B-C50C-407E-A947-70E740481C1C}">
+                <a14:useLocalDpi xmlns:a14="http://schemas.microsoft.com/office/drawing/2010/main" val="0"/>
+              </a:ext>
+            </a:extLst>
+          </a:blip>
+          <a:stretch>
+            <a:fillRect/>
+          </a:stretch>
+        </p:blipFill>
+        <p:spPr>
+          <a:xfrm>
+            <a:off x="987026" y="1761938"/>
+            <a:ext cx="1105010" cy="1105010"/>
+          </a:xfrm>
+          <a:prstGeom prst="rect">
+            <a:avLst/>
+          </a:prstGeom>
+        </p:spPr>
+      </p:pic>
       <p:sp>
         <p:nvSpPr>
           <p:cNvPr id="20" name="Rectángulo 19"/>
@@ -12174,7 +14909,7 @@
         </p:nvSpPr>
         <p:spPr>
           <a:xfrm>
-            <a:off x="385555" y="1850663"/>
+            <a:off x="239674" y="2861427"/>
             <a:ext cx="2749471" cy="646331"/>
           </a:xfrm>
           <a:prstGeom prst="rect">
@@ -12229,7 +14964,7 @@
         </p:nvSpPr>
         <p:spPr>
           <a:xfrm>
-            <a:off x="5421119" y="1863840"/>
+            <a:off x="5655545" y="2868072"/>
             <a:ext cx="3406702" cy="369332"/>
           </a:xfrm>
           <a:prstGeom prst="rect">
@@ -12263,7 +14998,7 @@
         </p:nvSpPr>
         <p:spPr>
           <a:xfrm>
-            <a:off x="3393961" y="4558154"/>
+            <a:off x="422417" y="6136905"/>
             <a:ext cx="2383986" cy="369332"/>
           </a:xfrm>
           <a:prstGeom prst="rect">
@@ -12297,8 +15032,8 @@
         </p:nvSpPr>
         <p:spPr>
           <a:xfrm>
-            <a:off x="2047439" y="5965294"/>
-            <a:ext cx="5077031" cy="523220"/>
+            <a:off x="5737298" y="6136898"/>
+            <a:ext cx="3324949" cy="369332"/>
           </a:xfrm>
           <a:prstGeom prst="rect">
             <a:avLst/>
@@ -12312,12 +15047,12 @@
           <a:lstStyle/>
           <a:p>
             <a:r>
-              <a:rPr lang="es-ES" sz="2800" b="1" dirty="0" smtClean="0">
+              <a:rPr lang="es-ES" b="1" dirty="0" smtClean="0">
                 <a:latin typeface="Century Gothic" panose="020B0502020202020204" pitchFamily="34" charset="0"/>
               </a:rPr>
               <a:t>Informe de vulnerabilidades</a:t>
             </a:r>
-            <a:endParaRPr lang="es-ES" sz="2800" b="1" dirty="0">
+            <a:endParaRPr lang="es-ES" b="1" dirty="0">
               <a:latin typeface="Century Gothic" panose="020B0502020202020204" pitchFamily="34" charset="0"/>
             </a:endParaRPr>
           </a:p>
@@ -12413,62 +15148,187 @@
           </a:p>
         </p:txBody>
       </p:sp>
-      <p:sp>
-        <p:nvSpPr>
-          <p:cNvPr id="26" name="CuadroTexto 25"/>
-          <p:cNvSpPr txBox="1"/>
-          <p:nvPr/>
-        </p:nvSpPr>
-        <p:spPr>
-          <a:xfrm>
-            <a:off x="3729238" y="2966348"/>
-            <a:ext cx="1662635" cy="553998"/>
-          </a:xfrm>
-          <a:prstGeom prst="rect">
-            <a:avLst/>
-          </a:prstGeom>
-          <a:noFill/>
-        </p:spPr>
-        <p:txBody>
-          <a:bodyPr wrap="none" rtlCol="0">
-            <a:spAutoFit/>
-          </a:bodyPr>
-          <a:lstStyle/>
-          <a:p>
-            <a:r>
-              <a:rPr lang="es-ES" sz="3000" b="1" dirty="0" err="1" smtClean="0">
-                <a:latin typeface="Century Gothic" panose="020B0502020202020204" pitchFamily="34" charset="0"/>
-              </a:rPr>
-              <a:t>DevOps</a:t>
-            </a:r>
-            <a:endParaRPr lang="es-ES" sz="3000" b="1" dirty="0">
-              <a:latin typeface="Century Gothic" panose="020B0502020202020204" pitchFamily="34" charset="0"/>
-            </a:endParaRPr>
-          </a:p>
-        </p:txBody>
-      </p:sp>
+      <p:pic>
+        <p:nvPicPr>
+          <p:cNvPr id="8" name="Imagen 7"/>
+          <p:cNvPicPr>
+            <a:picLocks noChangeAspect="1"/>
+          </p:cNvPicPr>
+          <p:nvPr/>
+        </p:nvPicPr>
+        <p:blipFill>
+          <a:blip r:embed="rId5" cstate="print">
+            <a:extLst>
+              <a:ext uri="{28A0092B-C50C-407E-A947-70E740481C1C}">
+                <a14:useLocalDpi xmlns:a14="http://schemas.microsoft.com/office/drawing/2010/main" val="0"/>
+              </a:ext>
+            </a:extLst>
+          </a:blip>
+          <a:stretch>
+            <a:fillRect/>
+          </a:stretch>
+        </p:blipFill>
+        <p:spPr>
+          <a:xfrm>
+            <a:off x="6616003" y="1793668"/>
+            <a:ext cx="1485786" cy="951603"/>
+          </a:xfrm>
+          <a:prstGeom prst="rect">
+            <a:avLst/>
+          </a:prstGeom>
+        </p:spPr>
+      </p:pic>
+      <p:pic>
+        <p:nvPicPr>
+          <p:cNvPr id="9" name="Imagen 8"/>
+          <p:cNvPicPr>
+            <a:picLocks noChangeAspect="1"/>
+          </p:cNvPicPr>
+          <p:nvPr/>
+        </p:nvPicPr>
+        <p:blipFill>
+          <a:blip r:embed="rId6">
+            <a:extLst>
+              <a:ext uri="{28A0092B-C50C-407E-A947-70E740481C1C}">
+                <a14:useLocalDpi xmlns:a14="http://schemas.microsoft.com/office/drawing/2010/main" val="0"/>
+              </a:ext>
+            </a:extLst>
+          </a:blip>
+          <a:stretch>
+            <a:fillRect/>
+          </a:stretch>
+        </p:blipFill>
+        <p:spPr>
+          <a:xfrm>
+            <a:off x="2880405" y="3450608"/>
+            <a:ext cx="3363212" cy="1709264"/>
+          </a:xfrm>
+          <a:prstGeom prst="rect">
+            <a:avLst/>
+          </a:prstGeom>
+        </p:spPr>
+      </p:pic>
+      <p:pic>
+        <p:nvPicPr>
+          <p:cNvPr id="11" name="Imagen 10"/>
+          <p:cNvPicPr>
+            <a:picLocks noChangeAspect="1"/>
+          </p:cNvPicPr>
+          <p:nvPr/>
+        </p:nvPicPr>
+        <p:blipFill>
+          <a:blip r:embed="rId7" cstate="print">
+            <a:extLst>
+              <a:ext uri="{28A0092B-C50C-407E-A947-70E740481C1C}">
+                <a14:useLocalDpi xmlns:a14="http://schemas.microsoft.com/office/drawing/2010/main" val="0"/>
+              </a:ext>
+            </a:extLst>
+          </a:blip>
+          <a:stretch>
+            <a:fillRect/>
+          </a:stretch>
+        </p:blipFill>
+        <p:spPr>
+          <a:xfrm>
+            <a:off x="6597477" y="4704548"/>
+            <a:ext cx="1522838" cy="1522838"/>
+          </a:xfrm>
+          <a:prstGeom prst="rect">
+            <a:avLst/>
+          </a:prstGeom>
+        </p:spPr>
+      </p:pic>
       <p:cxnSp>
         <p:nvCxnSpPr>
-          <p:cNvPr id="19" name="Conector recto de flecha 18"/>
+          <p:cNvPr id="7" name="Conector recto 6"/>
+          <p:cNvCxnSpPr/>
+          <p:nvPr/>
+        </p:nvCxnSpPr>
+        <p:spPr>
+          <a:xfrm>
+            <a:off x="2508891" y="2314443"/>
+            <a:ext cx="3734727" cy="0"/>
+          </a:xfrm>
+          <a:prstGeom prst="line">
+            <a:avLst/>
+          </a:prstGeom>
+          <a:ln w="76200">
+            <a:solidFill>
+              <a:schemeClr val="tx1"/>
+            </a:solidFill>
+          </a:ln>
+        </p:spPr>
+        <p:style>
+          <a:lnRef idx="1">
+            <a:schemeClr val="accent1"/>
+          </a:lnRef>
+          <a:fillRef idx="0">
+            <a:schemeClr val="accent1"/>
+          </a:fillRef>
+          <a:effectRef idx="0">
+            <a:schemeClr val="accent1"/>
+          </a:effectRef>
+          <a:fontRef idx="minor">
+            <a:schemeClr val="tx1"/>
+          </a:fontRef>
+        </p:style>
+      </p:cxnSp>
+      <p:cxnSp>
+        <p:nvCxnSpPr>
+          <p:cNvPr id="13" name="Conector recto de flecha 12"/>
           <p:cNvCxnSpPr>
-            <a:stCxn id="4" idx="2"/>
-            <a:endCxn id="26" idx="1"/>
+            <a:endCxn id="9" idx="0"/>
           </p:cNvCxnSpPr>
           <p:nvPr/>
         </p:nvCxnSpPr>
         <p:spPr>
           <a:xfrm>
-            <a:off x="1760291" y="2496994"/>
-            <a:ext cx="1968947" cy="746353"/>
+            <a:off x="4556234" y="2257293"/>
+            <a:ext cx="5777" cy="1193315"/>
           </a:xfrm>
           <a:prstGeom prst="straightConnector1">
             <a:avLst/>
           </a:prstGeom>
-          <a:ln w="57150">
+          <a:ln w="76200">
             <a:solidFill>
-              <a:srgbClr val="40639E"/>
+              <a:schemeClr val="tx1"/>
             </a:solidFill>
             <a:tailEnd type="triangle"/>
+          </a:ln>
+        </p:spPr>
+        <p:style>
+          <a:lnRef idx="1">
+            <a:schemeClr val="accent1"/>
+          </a:lnRef>
+          <a:fillRef idx="0">
+            <a:schemeClr val="accent1"/>
+          </a:fillRef>
+          <a:effectRef idx="0">
+            <a:schemeClr val="accent1"/>
+          </a:effectRef>
+          <a:fontRef idx="minor">
+            <a:schemeClr val="tx1"/>
+          </a:fontRef>
+        </p:style>
+      </p:cxnSp>
+      <p:cxnSp>
+        <p:nvCxnSpPr>
+          <p:cNvPr id="26" name="Conector recto 25"/>
+          <p:cNvCxnSpPr/>
+          <p:nvPr/>
+        </p:nvCxnSpPr>
+        <p:spPr>
+          <a:xfrm flipV="1">
+            <a:off x="1576401" y="4358706"/>
+            <a:ext cx="1059352" cy="3440"/>
+          </a:xfrm>
+          <a:prstGeom prst="line">
+            <a:avLst/>
+          </a:prstGeom>
+          <a:ln w="76200">
+            <a:solidFill>
+              <a:schemeClr val="tx1"/>
+            </a:solidFill>
           </a:ln>
         </p:spPr>
         <p:style>
@@ -12489,23 +15349,20 @@
       <p:cxnSp>
         <p:nvCxnSpPr>
           <p:cNvPr id="27" name="Conector recto de flecha 26"/>
-          <p:cNvCxnSpPr>
-            <a:stCxn id="10" idx="2"/>
-            <a:endCxn id="26" idx="3"/>
-          </p:cNvCxnSpPr>
+          <p:cNvCxnSpPr/>
           <p:nvPr/>
         </p:nvCxnSpPr>
         <p:spPr>
-          <a:xfrm flipH="1">
-            <a:off x="5391873" y="2233172"/>
-            <a:ext cx="1732597" cy="1010175"/>
+          <a:xfrm>
+            <a:off x="1614409" y="4325015"/>
+            <a:ext cx="2" cy="505614"/>
           </a:xfrm>
           <a:prstGeom prst="straightConnector1">
             <a:avLst/>
           </a:prstGeom>
-          <a:ln w="57150">
+          <a:ln w="76200">
             <a:solidFill>
-              <a:srgbClr val="40639E"/>
+              <a:schemeClr val="tx1"/>
             </a:solidFill>
             <a:tailEnd type="triangle"/>
           </a:ln>
@@ -12527,62 +15384,24 @@
       </p:cxnSp>
       <p:cxnSp>
         <p:nvCxnSpPr>
-          <p:cNvPr id="30" name="Conector recto de flecha 29"/>
+          <p:cNvPr id="31" name="Conector recto de flecha 30"/>
           <p:cNvCxnSpPr>
-            <a:stCxn id="26" idx="2"/>
-            <a:endCxn id="15" idx="0"/>
+            <a:stCxn id="6" idx="3"/>
+            <a:endCxn id="11" idx="1"/>
           </p:cNvCxnSpPr>
           <p:nvPr/>
         </p:nvCxnSpPr>
         <p:spPr>
-          <a:xfrm>
-            <a:off x="4560556" y="3520346"/>
-            <a:ext cx="25398" cy="1037808"/>
+          <a:xfrm flipV="1">
+            <a:off x="2508891" y="5465967"/>
+            <a:ext cx="4088586" cy="3793"/>
           </a:xfrm>
           <a:prstGeom prst="straightConnector1">
             <a:avLst/>
           </a:prstGeom>
-          <a:ln w="57150">
+          <a:ln w="76200">
             <a:solidFill>
-              <a:srgbClr val="40639E"/>
-            </a:solidFill>
-            <a:tailEnd type="triangle"/>
-          </a:ln>
-        </p:spPr>
-        <p:style>
-          <a:lnRef idx="1">
-            <a:schemeClr val="accent1"/>
-          </a:lnRef>
-          <a:fillRef idx="0">
-            <a:schemeClr val="accent1"/>
-          </a:fillRef>
-          <a:effectRef idx="0">
-            <a:schemeClr val="accent1"/>
-          </a:effectRef>
-          <a:fontRef idx="minor">
-            <a:schemeClr val="tx1"/>
-          </a:fontRef>
-        </p:style>
-      </p:cxnSp>
-      <p:cxnSp>
-        <p:nvCxnSpPr>
-          <p:cNvPr id="33" name="Conector recto de flecha 32"/>
-          <p:cNvCxnSpPr>
-            <a:stCxn id="15" idx="2"/>
-          </p:cNvCxnSpPr>
-          <p:nvPr/>
-        </p:nvCxnSpPr>
-        <p:spPr>
-          <a:xfrm>
-            <a:off x="4585954" y="4927486"/>
-            <a:ext cx="0" cy="945475"/>
-          </a:xfrm>
-          <a:prstGeom prst="straightConnector1">
-            <a:avLst/>
-          </a:prstGeom>
-          <a:ln w="57150">
-            <a:solidFill>
-              <a:srgbClr val="40639E"/>
+              <a:schemeClr val="tx1"/>
             </a:solidFill>
             <a:tailEnd type="triangle"/>
           </a:ln>

</xml_diff>

<commit_message>
Presentacion - Version Final
</commit_message>
<xml_diff>
--- a/Presentacion/Presentacion_TFM_Eleazar_Rubio.pptx
+++ b/Presentacion/Presentacion_TFM_Eleazar_Rubio.pptx
@@ -5,7 +5,7 @@
     <p:sldMasterId id="2147483661" r:id="rId1"/>
   </p:sldMasterIdLst>
   <p:notesMasterIdLst>
-    <p:notesMasterId r:id="rId27"/>
+    <p:notesMasterId r:id="rId26"/>
   </p:notesMasterIdLst>
   <p:sldIdLst>
     <p:sldId id="278" r:id="rId2"/>
@@ -26,13 +26,12 @@
     <p:sldId id="311" r:id="rId17"/>
     <p:sldId id="310" r:id="rId18"/>
     <p:sldId id="312" r:id="rId19"/>
-    <p:sldId id="309" r:id="rId20"/>
-    <p:sldId id="307" r:id="rId21"/>
-    <p:sldId id="313" r:id="rId22"/>
-    <p:sldId id="306" r:id="rId23"/>
-    <p:sldId id="299" r:id="rId24"/>
-    <p:sldId id="314" r:id="rId25"/>
-    <p:sldId id="300" r:id="rId26"/>
+    <p:sldId id="307" r:id="rId20"/>
+    <p:sldId id="313" r:id="rId21"/>
+    <p:sldId id="306" r:id="rId22"/>
+    <p:sldId id="299" r:id="rId23"/>
+    <p:sldId id="314" r:id="rId24"/>
+    <p:sldId id="300" r:id="rId25"/>
   </p:sldIdLst>
   <p:sldSz cx="9144000" cy="6858000" type="screen4x3"/>
   <p:notesSz cx="6858000" cy="9144000"/>
@@ -232,7 +231,7 @@
           <a:p>
             <a:fld id="{7861D7D9-7EAA-4F56-AF8E-F0CD985F94AB}" type="datetimeFigureOut">
               <a:rPr lang="es-ES" smtClean="0"/>
-              <a:t>18/09/2017</a:t>
+              <a:t>19/09/2017</a:t>
             </a:fld>
             <a:endParaRPr lang="es-ES"/>
           </a:p>
@@ -1435,7 +1434,7 @@
     </p:spTree>
     <p:extLst>
       <p:ext uri="{BB962C8B-B14F-4D97-AF65-F5344CB8AC3E}">
-        <p14:creationId xmlns:p14="http://schemas.microsoft.com/office/powerpoint/2010/main" val="2680127700"/>
+        <p14:creationId xmlns:p14="http://schemas.microsoft.com/office/powerpoint/2010/main" val="765425707"/>
       </p:ext>
     </p:extLst>
   </p:cSld>
@@ -1524,7 +1523,7 @@
     </p:spTree>
     <p:extLst>
       <p:ext uri="{BB962C8B-B14F-4D97-AF65-F5344CB8AC3E}">
-        <p14:creationId xmlns:p14="http://schemas.microsoft.com/office/powerpoint/2010/main" val="765425707"/>
+        <p14:creationId xmlns:p14="http://schemas.microsoft.com/office/powerpoint/2010/main" val="609960898"/>
       </p:ext>
     </p:extLst>
   </p:cSld>
@@ -1680,6 +1679,26 @@
           <a:bodyPr/>
           <a:lstStyle/>
           <a:p>
+            <a:r>
+              <a:rPr lang="es-ES" dirty="0" smtClean="0"/>
+              <a:t>Vuelvo</a:t>
+            </a:r>
+            <a:r>
+              <a:rPr lang="es-ES" baseline="0" dirty="0" smtClean="0"/>
+              <a:t> a mostrar el análisis malo?? </a:t>
+            </a:r>
+            <a:r>
+              <a:rPr lang="es-ES" baseline="0" dirty="0" err="1" smtClean="0"/>
+              <a:t>Deberia</a:t>
+            </a:r>
+            <a:r>
+              <a:rPr lang="es-ES" baseline="0" dirty="0" smtClean="0"/>
+              <a:t> poner la pipeline </a:t>
+            </a:r>
+            <a:r>
+              <a:rPr lang="es-ES" baseline="0" dirty="0" err="1" smtClean="0"/>
+              <a:t>tambien</a:t>
+            </a:r>
             <a:endParaRPr lang="es-ES" dirty="0"/>
           </a:p>
         </p:txBody>
@@ -1710,7 +1729,7 @@
     </p:spTree>
     <p:extLst>
       <p:ext uri="{BB962C8B-B14F-4D97-AF65-F5344CB8AC3E}">
-        <p14:creationId xmlns:p14="http://schemas.microsoft.com/office/powerpoint/2010/main" val="609960898"/>
+        <p14:creationId xmlns:p14="http://schemas.microsoft.com/office/powerpoint/2010/main" val="79280480"/>
       </p:ext>
     </p:extLst>
   </p:cSld>
@@ -1769,26 +1788,6 @@
           <a:bodyPr/>
           <a:lstStyle/>
           <a:p>
-            <a:r>
-              <a:rPr lang="es-ES" dirty="0" smtClean="0"/>
-              <a:t>Vuelvo</a:t>
-            </a:r>
-            <a:r>
-              <a:rPr lang="es-ES" baseline="0" dirty="0" smtClean="0"/>
-              <a:t> a mostrar el análisis malo?? </a:t>
-            </a:r>
-            <a:r>
-              <a:rPr lang="es-ES" baseline="0" dirty="0" err="1" smtClean="0"/>
-              <a:t>Deberia</a:t>
-            </a:r>
-            <a:r>
-              <a:rPr lang="es-ES" baseline="0" dirty="0" smtClean="0"/>
-              <a:t> poner la pipeline </a:t>
-            </a:r>
-            <a:r>
-              <a:rPr lang="es-ES" baseline="0" dirty="0" err="1" smtClean="0"/>
-              <a:t>tambien</a:t>
-            </a:r>
             <a:endParaRPr lang="es-ES" dirty="0"/>
           </a:p>
         </p:txBody>
@@ -1819,7 +1818,7 @@
     </p:spTree>
     <p:extLst>
       <p:ext uri="{BB962C8B-B14F-4D97-AF65-F5344CB8AC3E}">
-        <p14:creationId xmlns:p14="http://schemas.microsoft.com/office/powerpoint/2010/main" val="79280480"/>
+        <p14:creationId xmlns:p14="http://schemas.microsoft.com/office/powerpoint/2010/main" val="996630092"/>
       </p:ext>
     </p:extLst>
   </p:cSld>
@@ -1880,15 +1879,15 @@
           <a:p>
             <a:r>
               <a:rPr lang="es-ES" dirty="0" smtClean="0"/>
-              <a:t>Añadir los iconos</a:t>
+              <a:t>Cambias la</a:t>
             </a:r>
             <a:r>
               <a:rPr lang="es-ES" baseline="0" dirty="0" smtClean="0"/>
-              <a:t> y refinar </a:t>
+              <a:t> foto por una sin barra </a:t>
             </a:r>
             <a:r>
               <a:rPr lang="es-ES" baseline="0" smtClean="0"/>
-              <a:t>los objetivos</a:t>
+              <a:t>de marcadores</a:t>
             </a:r>
             <a:endParaRPr lang="es-ES" dirty="0"/>
           </a:p>
@@ -1912,107 +1911,6 @@
             <a:fld id="{A1DC9A57-F85E-4D53-A5E6-11962196CDE0}" type="slidenum">
               <a:rPr lang="es-ES" smtClean="0"/>
               <a:t>23</a:t>
-            </a:fld>
-            <a:endParaRPr lang="es-ES"/>
-          </a:p>
-        </p:txBody>
-      </p:sp>
-    </p:spTree>
-    <p:extLst>
-      <p:ext uri="{BB962C8B-B14F-4D97-AF65-F5344CB8AC3E}">
-        <p14:creationId xmlns:p14="http://schemas.microsoft.com/office/powerpoint/2010/main" val="996630092"/>
-      </p:ext>
-    </p:extLst>
-  </p:cSld>
-  <p:clrMapOvr>
-    <a:masterClrMapping/>
-  </p:clrMapOvr>
-</p:notes>
-</file>
-
-<file path=ppt/notesSlides/notesSlide23.xml><?xml version="1.0" encoding="utf-8"?>
-<p:notes xmlns:a="http://schemas.openxmlformats.org/drawingml/2006/main" xmlns:r="http://schemas.openxmlformats.org/officeDocument/2006/relationships" xmlns:p="http://schemas.openxmlformats.org/presentationml/2006/main">
-  <p:cSld>
-    <p:spTree>
-      <p:nvGrpSpPr>
-        <p:cNvPr id="1" name=""/>
-        <p:cNvGrpSpPr/>
-        <p:nvPr/>
-      </p:nvGrpSpPr>
-      <p:grpSpPr>
-        <a:xfrm>
-          <a:off x="0" y="0"/>
-          <a:ext cx="0" cy="0"/>
-          <a:chOff x="0" y="0"/>
-          <a:chExt cx="0" cy="0"/>
-        </a:xfrm>
-      </p:grpSpPr>
-      <p:sp>
-        <p:nvSpPr>
-          <p:cNvPr id="2" name="Marcador de imagen de diapositiva 1"/>
-          <p:cNvSpPr>
-            <a:spLocks noGrp="1" noRot="1" noChangeAspect="1"/>
-          </p:cNvSpPr>
-          <p:nvPr>
-            <p:ph type="sldImg"/>
-          </p:nvPr>
-        </p:nvSpPr>
-        <p:spPr>
-          <a:xfrm>
-            <a:off x="1371600" y="1143000"/>
-            <a:ext cx="4114800" cy="3086100"/>
-          </a:xfrm>
-        </p:spPr>
-      </p:sp>
-      <p:sp>
-        <p:nvSpPr>
-          <p:cNvPr id="3" name="Marcador de notas 2"/>
-          <p:cNvSpPr>
-            <a:spLocks noGrp="1"/>
-          </p:cNvSpPr>
-          <p:nvPr>
-            <p:ph type="body" idx="1"/>
-          </p:nvPr>
-        </p:nvSpPr>
-        <p:spPr/>
-        <p:txBody>
-          <a:bodyPr/>
-          <a:lstStyle/>
-          <a:p>
-            <a:r>
-              <a:rPr lang="es-ES" dirty="0" smtClean="0"/>
-              <a:t>Cambias la</a:t>
-            </a:r>
-            <a:r>
-              <a:rPr lang="es-ES" baseline="0" dirty="0" smtClean="0"/>
-              <a:t> foto por una sin barra </a:t>
-            </a:r>
-            <a:r>
-              <a:rPr lang="es-ES" baseline="0" smtClean="0"/>
-              <a:t>de marcadores</a:t>
-            </a:r>
-            <a:endParaRPr lang="es-ES" dirty="0"/>
-          </a:p>
-        </p:txBody>
-      </p:sp>
-      <p:sp>
-        <p:nvSpPr>
-          <p:cNvPr id="4" name="Marcador de número de diapositiva 3"/>
-          <p:cNvSpPr>
-            <a:spLocks noGrp="1"/>
-          </p:cNvSpPr>
-          <p:nvPr>
-            <p:ph type="sldNum" sz="quarter" idx="10"/>
-          </p:nvPr>
-        </p:nvSpPr>
-        <p:spPr/>
-        <p:txBody>
-          <a:bodyPr/>
-          <a:lstStyle/>
-          <a:p>
-            <a:fld id="{A1DC9A57-F85E-4D53-A5E6-11962196CDE0}" type="slidenum">
-              <a:rPr lang="es-ES" smtClean="0"/>
-              <a:t>24</a:t>
             </a:fld>
             <a:endParaRPr lang="es-ES"/>
           </a:p>
@@ -2781,7 +2679,7 @@
           <a:p>
             <a:fld id="{E902B559-1605-4DDA-9099-75E24B19782F}" type="datetimeFigureOut">
               <a:rPr lang="es-ES" smtClean="0"/>
-              <a:t>18/09/2017</a:t>
+              <a:t>19/09/2017</a:t>
             </a:fld>
             <a:endParaRPr lang="es-ES"/>
           </a:p>
@@ -2951,7 +2849,7 @@
           <a:p>
             <a:fld id="{E902B559-1605-4DDA-9099-75E24B19782F}" type="datetimeFigureOut">
               <a:rPr lang="es-ES" smtClean="0"/>
-              <a:t>18/09/2017</a:t>
+              <a:t>19/09/2017</a:t>
             </a:fld>
             <a:endParaRPr lang="es-ES"/>
           </a:p>
@@ -3131,7 +3029,7 @@
           <a:p>
             <a:fld id="{E902B559-1605-4DDA-9099-75E24B19782F}" type="datetimeFigureOut">
               <a:rPr lang="es-ES" smtClean="0"/>
-              <a:t>18/09/2017</a:t>
+              <a:t>19/09/2017</a:t>
             </a:fld>
             <a:endParaRPr lang="es-ES"/>
           </a:p>
@@ -3607,7 +3505,7 @@
           <a:p>
             <a:fld id="{E902B559-1605-4DDA-9099-75E24B19782F}" type="datetimeFigureOut">
               <a:rPr lang="es-ES" smtClean="0"/>
-              <a:t>18/09/2017</a:t>
+              <a:t>19/09/2017</a:t>
             </a:fld>
             <a:endParaRPr lang="es-ES"/>
           </a:p>
@@ -3851,7 +3749,7 @@
           <a:p>
             <a:fld id="{E902B559-1605-4DDA-9099-75E24B19782F}" type="datetimeFigureOut">
               <a:rPr lang="es-ES" smtClean="0"/>
-              <a:t>18/09/2017</a:t>
+              <a:t>19/09/2017</a:t>
             </a:fld>
             <a:endParaRPr lang="es-ES"/>
           </a:p>
@@ -4083,7 +3981,7 @@
           <a:p>
             <a:fld id="{E902B559-1605-4DDA-9099-75E24B19782F}" type="datetimeFigureOut">
               <a:rPr lang="es-ES" smtClean="0"/>
-              <a:t>18/09/2017</a:t>
+              <a:t>19/09/2017</a:t>
             </a:fld>
             <a:endParaRPr lang="es-ES"/>
           </a:p>
@@ -4450,7 +4348,7 @@
           <a:p>
             <a:fld id="{E902B559-1605-4DDA-9099-75E24B19782F}" type="datetimeFigureOut">
               <a:rPr lang="es-ES" smtClean="0"/>
-              <a:t>18/09/2017</a:t>
+              <a:t>19/09/2017</a:t>
             </a:fld>
             <a:endParaRPr lang="es-ES"/>
           </a:p>
@@ -4568,7 +4466,7 @@
           <a:p>
             <a:fld id="{E902B559-1605-4DDA-9099-75E24B19782F}" type="datetimeFigureOut">
               <a:rPr lang="es-ES" smtClean="0"/>
-              <a:t>18/09/2017</a:t>
+              <a:t>19/09/2017</a:t>
             </a:fld>
             <a:endParaRPr lang="es-ES"/>
           </a:p>
@@ -4663,7 +4561,7 @@
           <a:p>
             <a:fld id="{E902B559-1605-4DDA-9099-75E24B19782F}" type="datetimeFigureOut">
               <a:rPr lang="es-ES" smtClean="0"/>
-              <a:t>18/09/2017</a:t>
+              <a:t>19/09/2017</a:t>
             </a:fld>
             <a:endParaRPr lang="es-ES"/>
           </a:p>
@@ -4940,7 +4838,7 @@
           <a:p>
             <a:fld id="{E902B559-1605-4DDA-9099-75E24B19782F}" type="datetimeFigureOut">
               <a:rPr lang="es-ES" smtClean="0"/>
-              <a:t>18/09/2017</a:t>
+              <a:t>19/09/2017</a:t>
             </a:fld>
             <a:endParaRPr lang="es-ES"/>
           </a:p>
@@ -5197,7 +5095,7 @@
           <a:p>
             <a:fld id="{E902B559-1605-4DDA-9099-75E24B19782F}" type="datetimeFigureOut">
               <a:rPr lang="es-ES" smtClean="0"/>
-              <a:t>18/09/2017</a:t>
+              <a:t>19/09/2017</a:t>
             </a:fld>
             <a:endParaRPr lang="es-ES"/>
           </a:p>
@@ -5410,7 +5308,7 @@
           <a:p>
             <a:fld id="{E902B559-1605-4DDA-9099-75E24B19782F}" type="datetimeFigureOut">
               <a:rPr lang="es-ES" smtClean="0"/>
-              <a:t>18/09/2017</a:t>
+              <a:t>19/09/2017</a:t>
             </a:fld>
             <a:endParaRPr lang="es-ES"/>
           </a:p>
@@ -6145,7 +6043,7 @@
           <a:graphicData uri="http://schemas.openxmlformats.org/presentationml/2006/ole">
             <mc:AlternateContent xmlns:mc="http://schemas.openxmlformats.org/markup-compatibility/2006">
               <mc:Choice xmlns:v="urn:schemas-microsoft-com:vml" Requires="v">
-                <p:oleObj spid="_x0000_s1096" name="Acrobat Document" r:id="rId5" imgW="1904818" imgH="1904835" progId="AcroExch.Document.DC">
+                <p:oleObj spid="_x0000_s1122" name="Acrobat Document" r:id="rId5" imgW="1904818" imgH="1904835" progId="AcroExch.Document.DC">
                   <p:embed/>
                 </p:oleObj>
               </mc:Choice>
@@ -8204,7 +8102,7 @@
         </p:nvSpPr>
         <p:spPr>
           <a:xfrm>
-            <a:off x="4563290" y="1532659"/>
+            <a:off x="4563290" y="1542184"/>
             <a:ext cx="4580710" cy="2516827"/>
           </a:xfrm>
           <a:prstGeom prst="rect">
@@ -8708,14 +8606,14 @@
       </p:sp>
       <p:sp>
         <p:nvSpPr>
-          <p:cNvPr id="47" name="CuadroTexto 46"/>
+          <p:cNvPr id="48" name="CuadroTexto 47"/>
           <p:cNvSpPr txBox="1"/>
           <p:nvPr/>
         </p:nvSpPr>
         <p:spPr>
           <a:xfrm>
-            <a:off x="1007394" y="1785632"/>
-            <a:ext cx="3357415" cy="1938992"/>
+            <a:off x="6322772" y="3319600"/>
+            <a:ext cx="1576626" cy="553998"/>
           </a:xfrm>
           <a:prstGeom prst="rect">
             <a:avLst/>
@@ -8728,39 +8626,87 @@
           </a:bodyPr>
           <a:lstStyle/>
           <a:p>
+            <a:pPr algn="ctr"/>
             <a:r>
               <a:rPr lang="es-ES" sz="3000" b="1" dirty="0" smtClean="0">
                 <a:latin typeface="Century Gothic" panose="020B0502020202020204" pitchFamily="34" charset="0"/>
               </a:rPr>
-              <a:t>Obtener dependencia </a:t>
-            </a:r>
-          </a:p>
-          <a:p>
+              <a:t>Análisis</a:t>
+            </a:r>
+            <a:endParaRPr lang="es-ES" sz="3000" b="1" dirty="0">
+              <a:latin typeface="Century Gothic" panose="020B0502020202020204" pitchFamily="34" charset="0"/>
+            </a:endParaRPr>
+          </a:p>
+        </p:txBody>
+      </p:sp>
+      <p:sp>
+        <p:nvSpPr>
+          <p:cNvPr id="49" name="CuadroTexto 48"/>
+          <p:cNvSpPr txBox="1"/>
+          <p:nvPr/>
+        </p:nvSpPr>
+        <p:spPr>
+          <a:xfrm>
+            <a:off x="1130610" y="6088307"/>
+            <a:ext cx="2677996" cy="553998"/>
+          </a:xfrm>
+          <a:prstGeom prst="rect">
+            <a:avLst/>
+          </a:prstGeom>
+          <a:noFill/>
+        </p:spPr>
+        <p:txBody>
+          <a:bodyPr wrap="square" rtlCol="0">
+            <a:spAutoFit/>
+          </a:bodyPr>
+          <a:lstStyle/>
+          <a:p>
+            <a:pPr algn="ctr"/>
             <a:r>
               <a:rPr lang="es-ES" sz="3000" b="1" dirty="0" smtClean="0">
                 <a:latin typeface="Century Gothic" panose="020B0502020202020204" pitchFamily="34" charset="0"/>
               </a:rPr>
-              <a:t>de código</a:t>
-            </a:r>
-          </a:p>
-          <a:p>
+              <a:t>Informe </a:t>
+            </a:r>
             <a:r>
               <a:rPr lang="es-ES" sz="3000" b="1" dirty="0" smtClean="0">
                 <a:latin typeface="Century Gothic" panose="020B0502020202020204" pitchFamily="34" charset="0"/>
               </a:rPr>
-              <a:t>(Ruby y </a:t>
-            </a:r>
-            <a:r>
-              <a:rPr lang="es-ES" sz="3000" b="1" dirty="0" err="1" smtClean="0">
-                <a:latin typeface="Century Gothic" panose="020B0502020202020204" pitchFamily="34" charset="0"/>
-              </a:rPr>
-              <a:t>Node</a:t>
-            </a:r>
+              <a:t>HTML</a:t>
+            </a:r>
+            <a:endParaRPr lang="es-ES" sz="3000" b="1" dirty="0">
+              <a:latin typeface="Century Gothic" panose="020B0502020202020204" pitchFamily="34" charset="0"/>
+            </a:endParaRPr>
+          </a:p>
+        </p:txBody>
+      </p:sp>
+      <p:sp>
+        <p:nvSpPr>
+          <p:cNvPr id="50" name="CuadroTexto 49"/>
+          <p:cNvSpPr txBox="1"/>
+          <p:nvPr/>
+        </p:nvSpPr>
+        <p:spPr>
+          <a:xfrm>
+            <a:off x="5981607" y="6088307"/>
+            <a:ext cx="2564620" cy="553998"/>
+          </a:xfrm>
+          <a:prstGeom prst="rect">
+            <a:avLst/>
+          </a:prstGeom>
+          <a:noFill/>
+        </p:spPr>
+        <p:txBody>
+          <a:bodyPr wrap="square" rtlCol="0">
+            <a:spAutoFit/>
+          </a:bodyPr>
+          <a:lstStyle/>
+          <a:p>
             <a:r>
               <a:rPr lang="es-ES" sz="3000" b="1" dirty="0" smtClean="0">
                 <a:latin typeface="Century Gothic" panose="020B0502020202020204" pitchFamily="34" charset="0"/>
               </a:rPr>
-              <a:t> JS)</a:t>
+              <a:t>Notificación</a:t>
             </a:r>
             <a:endParaRPr lang="es-ES" sz="3000" b="1" dirty="0">
               <a:latin typeface="Century Gothic" panose="020B0502020202020204" pitchFamily="34" charset="0"/>
@@ -8768,16 +8714,45 @@
           </a:p>
         </p:txBody>
       </p:sp>
-      <p:sp>
-        <p:nvSpPr>
-          <p:cNvPr id="48" name="CuadroTexto 47"/>
+      <p:pic>
+        <p:nvPicPr>
+          <p:cNvPr id="3" name="Imagen 2"/>
+          <p:cNvPicPr>
+            <a:picLocks noChangeAspect="1"/>
+          </p:cNvPicPr>
+          <p:nvPr/>
+        </p:nvPicPr>
+        <p:blipFill rotWithShape="1">
+          <a:blip r:embed="rId3" cstate="print">
+            <a:extLst>
+              <a:ext uri="{28A0092B-C50C-407E-A947-70E740481C1C}">
+                <a14:useLocalDpi xmlns:a14="http://schemas.microsoft.com/office/drawing/2010/main" val="0"/>
+              </a:ext>
+            </a:extLst>
+          </a:blip>
+          <a:srcRect t="12904"/>
+          <a:stretch/>
+        </p:blipFill>
+        <p:spPr>
+          <a:xfrm>
+            <a:off x="1508134" y="1790700"/>
+            <a:ext cx="1804049" cy="1571243"/>
+          </a:xfrm>
+          <a:prstGeom prst="rect">
+            <a:avLst/>
+          </a:prstGeom>
+        </p:spPr>
+      </p:pic>
+      <p:sp>
+        <p:nvSpPr>
+          <p:cNvPr id="32" name="CuadroTexto 31"/>
           <p:cNvSpPr txBox="1"/>
           <p:nvPr/>
         </p:nvSpPr>
         <p:spPr>
           <a:xfrm>
-            <a:off x="5529024" y="1770566"/>
-            <a:ext cx="3357415" cy="1015663"/>
+            <a:off x="917407" y="3319600"/>
+            <a:ext cx="2985502" cy="553998"/>
           </a:xfrm>
           <a:prstGeom prst="rect">
             <a:avLst/>
@@ -8790,17 +8765,18 @@
           </a:bodyPr>
           <a:lstStyle/>
           <a:p>
+            <a:pPr algn="ctr"/>
+            <a:r>
+              <a:rPr lang="es-ES" sz="3000" b="1" dirty="0">
+                <a:latin typeface="Century Gothic" panose="020B0502020202020204" pitchFamily="34" charset="0"/>
+              </a:rPr>
+              <a:t>D</a:t>
+            </a:r>
             <a:r>
               <a:rPr lang="es-ES" sz="3000" b="1" dirty="0" smtClean="0">
                 <a:latin typeface="Century Gothic" panose="020B0502020202020204" pitchFamily="34" charset="0"/>
               </a:rPr>
-              <a:t>Análisis de </a:t>
-            </a:r>
-            <a:r>
-              <a:rPr lang="es-ES" sz="3000" b="1" dirty="0" err="1" smtClean="0">
-                <a:latin typeface="Century Gothic" panose="020B0502020202020204" pitchFamily="34" charset="0"/>
-              </a:rPr>
-              <a:t>vulneraibilidades</a:t>
+              <a:t>ependencias</a:t>
             </a:r>
             <a:endParaRPr lang="es-ES" sz="3000" b="1" dirty="0">
               <a:latin typeface="Century Gothic" panose="020B0502020202020204" pitchFamily="34" charset="0"/>
@@ -8808,80 +8784,96 @@
           </a:p>
         </p:txBody>
       </p:sp>
-      <p:sp>
-        <p:nvSpPr>
-          <p:cNvPr id="49" name="CuadroTexto 48"/>
-          <p:cNvSpPr txBox="1"/>
-          <p:nvPr/>
-        </p:nvSpPr>
-        <p:spPr>
-          <a:xfrm>
-            <a:off x="1046279" y="4361789"/>
-            <a:ext cx="3357415" cy="1015663"/>
-          </a:xfrm>
-          <a:prstGeom prst="rect">
-            <a:avLst/>
-          </a:prstGeom>
-          <a:noFill/>
-        </p:spPr>
-        <p:txBody>
-          <a:bodyPr wrap="square" rtlCol="0">
-            <a:spAutoFit/>
-          </a:bodyPr>
-          <a:lstStyle/>
-          <a:p>
-            <a:r>
-              <a:rPr lang="es-ES" sz="3000" b="1" dirty="0" smtClean="0">
-                <a:latin typeface="Century Gothic" panose="020B0502020202020204" pitchFamily="34" charset="0"/>
-              </a:rPr>
-              <a:t>Preparación del informe HTML</a:t>
-            </a:r>
-            <a:endParaRPr lang="es-ES" sz="3000" b="1" dirty="0">
-              <a:latin typeface="Century Gothic" panose="020B0502020202020204" pitchFamily="34" charset="0"/>
-            </a:endParaRPr>
-          </a:p>
-        </p:txBody>
-      </p:sp>
-      <p:sp>
-        <p:nvSpPr>
-          <p:cNvPr id="50" name="CuadroTexto 49"/>
-          <p:cNvSpPr txBox="1"/>
-          <p:nvPr/>
-        </p:nvSpPr>
-        <p:spPr>
-          <a:xfrm>
-            <a:off x="5526444" y="4384414"/>
-            <a:ext cx="3357415" cy="1477328"/>
-          </a:xfrm>
-          <a:prstGeom prst="rect">
-            <a:avLst/>
-          </a:prstGeom>
-          <a:noFill/>
-        </p:spPr>
-        <p:txBody>
-          <a:bodyPr wrap="square" rtlCol="0">
-            <a:spAutoFit/>
-          </a:bodyPr>
-          <a:lstStyle/>
-          <a:p>
-            <a:r>
-              <a:rPr lang="es-ES" sz="3000" b="1" dirty="0" smtClean="0">
-                <a:latin typeface="Century Gothic" panose="020B0502020202020204" pitchFamily="34" charset="0"/>
-              </a:rPr>
-              <a:t>Comunicación de los resultados vía </a:t>
-            </a:r>
-            <a:r>
-              <a:rPr lang="es-ES" sz="3000" b="1" dirty="0" err="1" smtClean="0">
-                <a:latin typeface="Century Gothic" panose="020B0502020202020204" pitchFamily="34" charset="0"/>
-              </a:rPr>
-              <a:t>Slack</a:t>
-            </a:r>
-            <a:endParaRPr lang="es-ES" sz="3000" b="1" dirty="0">
-              <a:latin typeface="Century Gothic" panose="020B0502020202020204" pitchFamily="34" charset="0"/>
-            </a:endParaRPr>
-          </a:p>
-        </p:txBody>
-      </p:sp>
+      <p:pic>
+        <p:nvPicPr>
+          <p:cNvPr id="4" name="Imagen 3"/>
+          <p:cNvPicPr>
+            <a:picLocks noChangeAspect="1"/>
+          </p:cNvPicPr>
+          <p:nvPr/>
+        </p:nvPicPr>
+        <p:blipFill>
+          <a:blip r:embed="rId4">
+            <a:extLst>
+              <a:ext uri="{28A0092B-C50C-407E-A947-70E740481C1C}">
+                <a14:useLocalDpi xmlns:a14="http://schemas.microsoft.com/office/drawing/2010/main" val="0"/>
+              </a:ext>
+            </a:extLst>
+          </a:blip>
+          <a:stretch>
+            <a:fillRect/>
+          </a:stretch>
+        </p:blipFill>
+        <p:spPr>
+          <a:xfrm>
+            <a:off x="6274620" y="1780993"/>
+            <a:ext cx="1573200" cy="1573200"/>
+          </a:xfrm>
+          <a:prstGeom prst="rect">
+            <a:avLst/>
+          </a:prstGeom>
+        </p:spPr>
+      </p:pic>
+      <p:pic>
+        <p:nvPicPr>
+          <p:cNvPr id="5" name="Imagen 4"/>
+          <p:cNvPicPr>
+            <a:picLocks noChangeAspect="1"/>
+          </p:cNvPicPr>
+          <p:nvPr/>
+        </p:nvPicPr>
+        <p:blipFill>
+          <a:blip r:embed="rId5">
+            <a:extLst>
+              <a:ext uri="{28A0092B-C50C-407E-A947-70E740481C1C}">
+                <a14:useLocalDpi xmlns:a14="http://schemas.microsoft.com/office/drawing/2010/main" val="0"/>
+              </a:ext>
+            </a:extLst>
+          </a:blip>
+          <a:stretch>
+            <a:fillRect/>
+          </a:stretch>
+        </p:blipFill>
+        <p:spPr>
+          <a:xfrm>
+            <a:off x="1565119" y="4498497"/>
+            <a:ext cx="1589810" cy="1589810"/>
+          </a:xfrm>
+          <a:prstGeom prst="rect">
+            <a:avLst/>
+          </a:prstGeom>
+        </p:spPr>
+      </p:pic>
+      <p:pic>
+        <p:nvPicPr>
+          <p:cNvPr id="6" name="Imagen 5"/>
+          <p:cNvPicPr>
+            <a:picLocks noChangeAspect="1"/>
+          </p:cNvPicPr>
+          <p:nvPr/>
+        </p:nvPicPr>
+        <p:blipFill>
+          <a:blip r:embed="rId6">
+            <a:extLst>
+              <a:ext uri="{28A0092B-C50C-407E-A947-70E740481C1C}">
+                <a14:useLocalDpi xmlns:a14="http://schemas.microsoft.com/office/drawing/2010/main" val="0"/>
+              </a:ext>
+            </a:extLst>
+          </a:blip>
+          <a:stretch>
+            <a:fillRect/>
+          </a:stretch>
+        </p:blipFill>
+        <p:spPr>
+          <a:xfrm>
+            <a:off x="6322772" y="4408121"/>
+            <a:ext cx="1705679" cy="1705679"/>
+          </a:xfrm>
+          <a:prstGeom prst="rect">
+            <a:avLst/>
+          </a:prstGeom>
+        </p:spPr>
+      </p:pic>
     </p:spTree>
     <p:extLst>
       <p:ext uri="{BB962C8B-B14F-4D97-AF65-F5344CB8AC3E}">
@@ -9696,42 +9688,6 @@
       </p:sp>
       <p:sp>
         <p:nvSpPr>
-          <p:cNvPr id="25" name="Shape 102"/>
-          <p:cNvSpPr/>
-          <p:nvPr/>
-        </p:nvSpPr>
-        <p:spPr>
-          <a:xfrm>
-            <a:off x="0" y="825219"/>
-            <a:ext cx="9144000" cy="720000"/>
-          </a:xfrm>
-          <a:prstGeom prst="rect">
-            <a:avLst/>
-          </a:prstGeom>
-          <a:solidFill>
-            <a:srgbClr val="424242"/>
-          </a:solidFill>
-          <a:ln w="12700">
-            <a:miter lim="400000"/>
-          </a:ln>
-        </p:spPr>
-        <p:txBody>
-          <a:bodyPr lIns="0" tIns="0" rIns="0" bIns="0" anchor="ctr"/>
-          <a:lstStyle/>
-          <a:p>
-            <a:pPr lvl="0">
-              <a:defRPr sz="2400">
-                <a:solidFill>
-                  <a:srgbClr val="FFFFFF"/>
-                </a:solidFill>
-              </a:defRPr>
-            </a:pPr>
-            <a:endParaRPr sz="3200"/>
-          </a:p>
-        </p:txBody>
-      </p:sp>
-      <p:sp>
-        <p:nvSpPr>
           <p:cNvPr id="27" name="Shape 63"/>
           <p:cNvSpPr txBox="1"/>
           <p:nvPr/>
@@ -9850,60 +9806,6 @@
               </a:rPr>
               <a:t>4</a:t>
             </a:r>
-          </a:p>
-        </p:txBody>
-      </p:sp>
-      <p:sp>
-        <p:nvSpPr>
-          <p:cNvPr id="30" name="Shape 63"/>
-          <p:cNvSpPr txBox="1"/>
-          <p:nvPr/>
-        </p:nvSpPr>
-        <p:spPr>
-          <a:xfrm>
-            <a:off x="801361" y="961787"/>
-            <a:ext cx="7521300" cy="452312"/>
-          </a:xfrm>
-          <a:prstGeom prst="rect">
-            <a:avLst/>
-          </a:prstGeom>
-          <a:noFill/>
-          <a:ln>
-            <a:noFill/>
-          </a:ln>
-        </p:spPr>
-        <p:txBody>
-          <a:bodyPr lIns="91425" tIns="91425" rIns="91425" bIns="91425" anchor="ctr" anchorCtr="0">
-            <a:noAutofit/>
-          </a:bodyPr>
-          <a:lstStyle/>
-          <a:p>
-            <a:pPr algn="ctr">
-              <a:spcBef>
-                <a:spcPts val="600"/>
-              </a:spcBef>
-            </a:pPr>
-            <a:r>
-              <a:rPr lang="en" sz="2000" b="1" dirty="0" smtClean="0">
-                <a:solidFill>
-                  <a:srgbClr val="FFFFFF"/>
-                </a:solidFill>
-                <a:latin typeface="Century Gothic" panose="020B0502020202020204" pitchFamily="34" charset="0"/>
-                <a:ea typeface="Quicksand"/>
-                <a:cs typeface="Quicksand"/>
-                <a:sym typeface="Quicksand"/>
-              </a:rPr>
-              <a:t>Dependencias Ruby – Gemfile.lock</a:t>
-            </a:r>
-            <a:endParaRPr lang="en" sz="2000" b="1" dirty="0">
-              <a:solidFill>
-                <a:srgbClr val="FFFFFF"/>
-              </a:solidFill>
-              <a:latin typeface="Century Gothic" panose="020B0502020202020204" pitchFamily="34" charset="0"/>
-              <a:ea typeface="Quicksand"/>
-              <a:cs typeface="Quicksand"/>
-              <a:sym typeface="Quicksand"/>
-            </a:endParaRPr>
           </a:p>
         </p:txBody>
       </p:sp>
@@ -9937,6 +9839,96 @@
           </a:prstGeom>
         </p:spPr>
       </p:pic>
+      <p:sp>
+        <p:nvSpPr>
+          <p:cNvPr id="25" name="Shape 102"/>
+          <p:cNvSpPr/>
+          <p:nvPr/>
+        </p:nvSpPr>
+        <p:spPr>
+          <a:xfrm>
+            <a:off x="0" y="825219"/>
+            <a:ext cx="9144000" cy="720000"/>
+          </a:xfrm>
+          <a:prstGeom prst="rect">
+            <a:avLst/>
+          </a:prstGeom>
+          <a:solidFill>
+            <a:srgbClr val="424242"/>
+          </a:solidFill>
+          <a:ln w="12700">
+            <a:miter lim="400000"/>
+          </a:ln>
+        </p:spPr>
+        <p:txBody>
+          <a:bodyPr lIns="0" tIns="0" rIns="0" bIns="0" anchor="ctr"/>
+          <a:lstStyle/>
+          <a:p>
+            <a:pPr lvl="0">
+              <a:defRPr sz="2400">
+                <a:solidFill>
+                  <a:srgbClr val="FFFFFF"/>
+                </a:solidFill>
+              </a:defRPr>
+            </a:pPr>
+            <a:endParaRPr sz="3200"/>
+          </a:p>
+        </p:txBody>
+      </p:sp>
+      <p:sp>
+        <p:nvSpPr>
+          <p:cNvPr id="30" name="Shape 63"/>
+          <p:cNvSpPr txBox="1"/>
+          <p:nvPr/>
+        </p:nvSpPr>
+        <p:spPr>
+          <a:xfrm>
+            <a:off x="801361" y="961787"/>
+            <a:ext cx="7521300" cy="452312"/>
+          </a:xfrm>
+          <a:prstGeom prst="rect">
+            <a:avLst/>
+          </a:prstGeom>
+          <a:noFill/>
+          <a:ln>
+            <a:noFill/>
+          </a:ln>
+        </p:spPr>
+        <p:txBody>
+          <a:bodyPr lIns="91425" tIns="91425" rIns="91425" bIns="91425" anchor="ctr" anchorCtr="0">
+            <a:noAutofit/>
+          </a:bodyPr>
+          <a:lstStyle/>
+          <a:p>
+            <a:pPr algn="ctr">
+              <a:spcBef>
+                <a:spcPts val="600"/>
+              </a:spcBef>
+            </a:pPr>
+            <a:r>
+              <a:rPr lang="en" sz="2000" b="1" dirty="0" smtClean="0">
+                <a:solidFill>
+                  <a:srgbClr val="FFFFFF"/>
+                </a:solidFill>
+                <a:latin typeface="Century Gothic" panose="020B0502020202020204" pitchFamily="34" charset="0"/>
+                <a:ea typeface="Quicksand"/>
+                <a:cs typeface="Quicksand"/>
+                <a:sym typeface="Quicksand"/>
+              </a:rPr>
+              <a:t>Dependencias Ruby – Gemfile.lock</a:t>
+            </a:r>
+            <a:endParaRPr lang="en" sz="2000" b="1" dirty="0">
+              <a:solidFill>
+                <a:srgbClr val="FFFFFF"/>
+              </a:solidFill>
+              <a:latin typeface="Century Gothic" panose="020B0502020202020204" pitchFamily="34" charset="0"/>
+              <a:ea typeface="Quicksand"/>
+              <a:cs typeface="Quicksand"/>
+              <a:sym typeface="Quicksand"/>
+            </a:endParaRPr>
+          </a:p>
+        </p:txBody>
+      </p:sp>
     </p:spTree>
     <p:extLst>
       <p:ext uri="{BB962C8B-B14F-4D97-AF65-F5344CB8AC3E}">
@@ -10261,7 +10253,7 @@
         </p:blipFill>
         <p:spPr>
           <a:xfrm>
-            <a:off x="-19977" y="1541983"/>
+            <a:off x="-927" y="1541983"/>
             <a:ext cx="5249703" cy="2917753"/>
           </a:xfrm>
           <a:prstGeom prst="rect">
@@ -10329,6 +10321,41 @@
           </a:prstGeom>
         </p:spPr>
       </p:pic>
+      <p:cxnSp>
+        <p:nvCxnSpPr>
+          <p:cNvPr id="6" name="Conector recto 5"/>
+          <p:cNvCxnSpPr/>
+          <p:nvPr/>
+        </p:nvCxnSpPr>
+        <p:spPr>
+          <a:xfrm>
+            <a:off x="5248776" y="1708150"/>
+            <a:ext cx="3895224" cy="0"/>
+          </a:xfrm>
+          <a:prstGeom prst="line">
+            <a:avLst/>
+          </a:prstGeom>
+          <a:ln w="9525">
+            <a:solidFill>
+              <a:srgbClr val="7EE799"/>
+            </a:solidFill>
+          </a:ln>
+        </p:spPr>
+        <p:style>
+          <a:lnRef idx="1">
+            <a:schemeClr val="accent1"/>
+          </a:lnRef>
+          <a:fillRef idx="0">
+            <a:schemeClr val="accent1"/>
+          </a:fillRef>
+          <a:effectRef idx="0">
+            <a:schemeClr val="accent1"/>
+          </a:effectRef>
+          <a:fontRef idx="minor">
+            <a:schemeClr val="tx1"/>
+          </a:fontRef>
+        </p:style>
+      </p:cxnSp>
     </p:spTree>
     <p:extLst>
       <p:ext uri="{BB962C8B-B14F-4D97-AF65-F5344CB8AC3E}">
@@ -10608,18 +10635,6 @@
               </a:spcBef>
             </a:pPr>
             <a:r>
-              <a:rPr lang="en" sz="2000" b="1" dirty="0">
-                <a:solidFill>
-                  <a:srgbClr val="FFFFFF"/>
-                </a:solidFill>
-                <a:latin typeface="Century Gothic" panose="020B0502020202020204" pitchFamily="34" charset="0"/>
-                <a:ea typeface="Quicksand"/>
-                <a:cs typeface="Quicksand"/>
-                <a:sym typeface="Quicksand"/>
-              </a:rPr>
-              <a:t>Dependencias </a:t>
-            </a:r>
-            <a:r>
               <a:rPr lang="en" sz="2000" b="1" dirty="0" smtClean="0">
                 <a:solidFill>
                   <a:srgbClr val="FFFFFF"/>
@@ -10629,31 +10644,7 @@
                 <a:cs typeface="Quicksand"/>
                 <a:sym typeface="Quicksand"/>
               </a:rPr>
-              <a:t>Node JS </a:t>
-            </a:r>
-            <a:r>
-              <a:rPr lang="en" sz="2000" b="1" dirty="0">
-                <a:solidFill>
-                  <a:srgbClr val="FFFFFF"/>
-                </a:solidFill>
-                <a:latin typeface="Century Gothic" panose="020B0502020202020204" pitchFamily="34" charset="0"/>
-                <a:ea typeface="Quicksand"/>
-                <a:cs typeface="Quicksand"/>
-                <a:sym typeface="Quicksand"/>
-              </a:rPr>
-              <a:t>– </a:t>
-            </a:r>
-            <a:r>
-              <a:rPr lang="en" sz="2000" b="1" dirty="0" smtClean="0">
-                <a:solidFill>
-                  <a:srgbClr val="FFFFFF"/>
-                </a:solidFill>
-                <a:latin typeface="Century Gothic" panose="020B0502020202020204" pitchFamily="34" charset="0"/>
-                <a:ea typeface="Quicksand"/>
-                <a:cs typeface="Quicksand"/>
-                <a:sym typeface="Quicksand"/>
-              </a:rPr>
-              <a:t>package.json</a:t>
+              <a:t>Clair y Clairctl</a:t>
             </a:r>
             <a:endParaRPr lang="en" sz="2000" b="1" dirty="0">
               <a:solidFill>
@@ -10675,66 +10666,8 @@
           </p:cNvPicPr>
           <p:nvPr/>
         </p:nvPicPr>
-        <p:blipFill rotWithShape="1">
+        <p:blipFill>
           <a:blip r:embed="rId3">
-            <a:extLst>
-              <a:ext uri="{28A0092B-C50C-407E-A947-70E740481C1C}">
-                <a14:useLocalDpi xmlns:a14="http://schemas.microsoft.com/office/drawing/2010/main" val="0"/>
-              </a:ext>
-            </a:extLst>
-          </a:blip>
-          <a:srcRect l="2" r="-17479"/>
-          <a:stretch/>
-        </p:blipFill>
-        <p:spPr>
-          <a:xfrm>
-            <a:off x="0" y="1539486"/>
-            <a:ext cx="9127958" cy="2375886"/>
-          </a:xfrm>
-          <a:prstGeom prst="rect">
-            <a:avLst/>
-          </a:prstGeom>
-        </p:spPr>
-      </p:pic>
-      <p:pic>
-        <p:nvPicPr>
-          <p:cNvPr id="4" name="Imagen 3"/>
-          <p:cNvPicPr>
-            <a:picLocks noChangeAspect="1"/>
-          </p:cNvPicPr>
-          <p:nvPr/>
-        </p:nvPicPr>
-        <p:blipFill rotWithShape="1">
-          <a:blip r:embed="rId4">
-            <a:extLst>
-              <a:ext uri="{28A0092B-C50C-407E-A947-70E740481C1C}">
-                <a14:useLocalDpi xmlns:a14="http://schemas.microsoft.com/office/drawing/2010/main" val="0"/>
-              </a:ext>
-            </a:extLst>
-          </a:blip>
-          <a:srcRect r="50877"/>
-          <a:stretch/>
-        </p:blipFill>
-        <p:spPr>
-          <a:xfrm>
-            <a:off x="4997116" y="1944234"/>
-            <a:ext cx="4154905" cy="2068672"/>
-          </a:xfrm>
-          <a:prstGeom prst="rect">
-            <a:avLst/>
-          </a:prstGeom>
-        </p:spPr>
-      </p:pic>
-      <p:pic>
-        <p:nvPicPr>
-          <p:cNvPr id="2" name="Imagen 1"/>
-          <p:cNvPicPr>
-            <a:picLocks noChangeAspect="1"/>
-          </p:cNvPicPr>
-          <p:nvPr/>
-        </p:nvPicPr>
-        <p:blipFill>
-          <a:blip r:embed="rId5">
             <a:extLst>
               <a:ext uri="{28A0092B-C50C-407E-A947-70E740481C1C}">
                 <a14:useLocalDpi xmlns:a14="http://schemas.microsoft.com/office/drawing/2010/main" val="0"/>
@@ -10747,8 +10680,38 @@
         </p:blipFill>
         <p:spPr>
           <a:xfrm>
-            <a:off x="-1" y="3883288"/>
-            <a:ext cx="9144001" cy="2978952"/>
+            <a:off x="385555" y="4991431"/>
+            <a:ext cx="8316085" cy="1670989"/>
+          </a:xfrm>
+          <a:prstGeom prst="rect">
+            <a:avLst/>
+          </a:prstGeom>
+        </p:spPr>
+      </p:pic>
+      <p:pic>
+        <p:nvPicPr>
+          <p:cNvPr id="5" name="Imagen 4"/>
+          <p:cNvPicPr>
+            <a:picLocks noChangeAspect="1"/>
+          </p:cNvPicPr>
+          <p:nvPr/>
+        </p:nvPicPr>
+        <p:blipFill>
+          <a:blip r:embed="rId4">
+            <a:extLst>
+              <a:ext uri="{28A0092B-C50C-407E-A947-70E740481C1C}">
+                <a14:useLocalDpi xmlns:a14="http://schemas.microsoft.com/office/drawing/2010/main" val="0"/>
+              </a:ext>
+            </a:extLst>
+          </a:blip>
+          <a:stretch>
+            <a:fillRect/>
+          </a:stretch>
+        </p:blipFill>
+        <p:spPr>
+          <a:xfrm>
+            <a:off x="385555" y="1729937"/>
+            <a:ext cx="8316086" cy="3076776"/>
           </a:xfrm>
           <a:prstGeom prst="rect">
             <a:avLst/>
@@ -10758,7 +10721,7 @@
     </p:spTree>
     <p:extLst>
       <p:ext uri="{BB962C8B-B14F-4D97-AF65-F5344CB8AC3E}">
-        <p14:creationId xmlns:p14="http://schemas.microsoft.com/office/powerpoint/2010/main" val="992472818"/>
+        <p14:creationId xmlns:p14="http://schemas.microsoft.com/office/powerpoint/2010/main" val="2711185006"/>
       </p:ext>
     </p:extLst>
   </p:cSld>
@@ -11849,13 +11812,13 @@
       </p:sp>
       <p:pic>
         <p:nvPicPr>
-          <p:cNvPr id="3" name="Imagen 2"/>
+          <p:cNvPr id="7" name="Imagen 6"/>
           <p:cNvPicPr>
             <a:picLocks noChangeAspect="1"/>
           </p:cNvPicPr>
           <p:nvPr/>
         </p:nvPicPr>
-        <p:blipFill>
+        <p:blipFill rotWithShape="1">
           <a:blip r:embed="rId3">
             <a:extLst>
               <a:ext uri="{28A0092B-C50C-407E-A947-70E740481C1C}">
@@ -11863,54 +11826,59 @@
               </a:ext>
             </a:extLst>
           </a:blip>
-          <a:stretch>
-            <a:fillRect/>
-          </a:stretch>
+          <a:srcRect l="321" r="304" b="2162"/>
+          <a:stretch/>
         </p:blipFill>
         <p:spPr>
           <a:xfrm>
-            <a:off x="385555" y="4991431"/>
-            <a:ext cx="8316085" cy="1670989"/>
+            <a:off x="0" y="1539485"/>
+            <a:ext cx="9144000" cy="4518077"/>
           </a:xfrm>
           <a:prstGeom prst="rect">
             <a:avLst/>
           </a:prstGeom>
         </p:spPr>
       </p:pic>
-      <p:pic>
-        <p:nvPicPr>
-          <p:cNvPr id="5" name="Imagen 4"/>
-          <p:cNvPicPr>
-            <a:picLocks noChangeAspect="1"/>
-          </p:cNvPicPr>
-          <p:nvPr/>
-        </p:nvPicPr>
-        <p:blipFill>
-          <a:blip r:embed="rId4">
-            <a:extLst>
-              <a:ext uri="{28A0092B-C50C-407E-A947-70E740481C1C}">
-                <a14:useLocalDpi xmlns:a14="http://schemas.microsoft.com/office/drawing/2010/main" val="0"/>
-              </a:ext>
-            </a:extLst>
-          </a:blip>
-          <a:stretch>
-            <a:fillRect/>
-          </a:stretch>
-        </p:blipFill>
-        <p:spPr>
-          <a:xfrm>
-            <a:off x="385555" y="1729937"/>
-            <a:ext cx="8316086" cy="3076776"/>
-          </a:xfrm>
-          <a:prstGeom prst="rect">
-            <a:avLst/>
-          </a:prstGeom>
-        </p:spPr>
-      </p:pic>
+      <p:sp>
+        <p:nvSpPr>
+          <p:cNvPr id="14" name="Shape 102"/>
+          <p:cNvSpPr/>
+          <p:nvPr/>
+        </p:nvSpPr>
+        <p:spPr>
+          <a:xfrm>
+            <a:off x="0" y="6040646"/>
+            <a:ext cx="9144000" cy="817353"/>
+          </a:xfrm>
+          <a:prstGeom prst="rect">
+            <a:avLst/>
+          </a:prstGeom>
+          <a:solidFill>
+            <a:srgbClr val="F9F7FF"/>
+          </a:solidFill>
+          <a:ln w="12700">
+            <a:miter lim="400000"/>
+          </a:ln>
+        </p:spPr>
+        <p:txBody>
+          <a:bodyPr lIns="0" tIns="0" rIns="0" bIns="0" anchor="ctr"/>
+          <a:lstStyle/>
+          <a:p>
+            <a:pPr lvl="0">
+              <a:defRPr sz="2400">
+                <a:solidFill>
+                  <a:srgbClr val="FFFFFF"/>
+                </a:solidFill>
+              </a:defRPr>
+            </a:pPr>
+            <a:endParaRPr sz="3200"/>
+          </a:p>
+        </p:txBody>
+      </p:sp>
     </p:spTree>
     <p:extLst>
       <p:ext uri="{BB962C8B-B14F-4D97-AF65-F5344CB8AC3E}">
-        <p14:creationId xmlns:p14="http://schemas.microsoft.com/office/powerpoint/2010/main" val="2711185006"/>
+        <p14:creationId xmlns:p14="http://schemas.microsoft.com/office/powerpoint/2010/main" val="859824628"/>
       </p:ext>
     </p:extLst>
   </p:cSld>
@@ -11944,6 +11912,65 @@
           <a:chExt cx="0" cy="0"/>
         </a:xfrm>
       </p:grpSpPr>
+      <p:pic>
+        <p:nvPicPr>
+          <p:cNvPr id="11" name="Imagen 10"/>
+          <p:cNvPicPr>
+            <a:picLocks noChangeAspect="1"/>
+          </p:cNvPicPr>
+          <p:nvPr/>
+        </p:nvPicPr>
+        <p:blipFill>
+          <a:blip r:embed="rId3">
+            <a:extLst>
+              <a:ext uri="{28A0092B-C50C-407E-A947-70E740481C1C}">
+                <a14:useLocalDpi xmlns:a14="http://schemas.microsoft.com/office/drawing/2010/main" val="0"/>
+              </a:ext>
+            </a:extLst>
+          </a:blip>
+          <a:stretch>
+            <a:fillRect/>
+          </a:stretch>
+        </p:blipFill>
+        <p:spPr>
+          <a:xfrm>
+            <a:off x="140649" y="1553891"/>
+            <a:ext cx="5249703" cy="2917753"/>
+          </a:xfrm>
+          <a:prstGeom prst="rect">
+            <a:avLst/>
+          </a:prstGeom>
+        </p:spPr>
+      </p:pic>
+      <p:pic>
+        <p:nvPicPr>
+          <p:cNvPr id="4" name="Imagen 3"/>
+          <p:cNvPicPr>
+            <a:picLocks noChangeAspect="1"/>
+          </p:cNvPicPr>
+          <p:nvPr/>
+        </p:nvPicPr>
+        <p:blipFill rotWithShape="1">
+          <a:blip r:embed="rId4">
+            <a:extLst>
+              <a:ext uri="{28A0092B-C50C-407E-A947-70E740481C1C}">
+                <a14:useLocalDpi xmlns:a14="http://schemas.microsoft.com/office/drawing/2010/main" val="0"/>
+              </a:ext>
+            </a:extLst>
+          </a:blip>
+          <a:srcRect r="4203"/>
+          <a:stretch/>
+        </p:blipFill>
+        <p:spPr>
+          <a:xfrm>
+            <a:off x="4656929" y="1520370"/>
+            <a:ext cx="4363246" cy="765010"/>
+          </a:xfrm>
+          <a:prstGeom prst="rect">
+            <a:avLst/>
+          </a:prstGeom>
+        </p:spPr>
+      </p:pic>
       <p:sp>
         <p:nvSpPr>
           <p:cNvPr id="36" name="Rectángulo 35"/>
@@ -12195,7 +12222,7 @@
                 <a:cs typeface="Quicksand"/>
                 <a:sym typeface="Quicksand"/>
               </a:rPr>
-              <a:t>Clair y Clairctl</a:t>
+              <a:t>Evaluación de la solución</a:t>
             </a:r>
             <a:endParaRPr lang="en" sz="2000" b="1" dirty="0">
               <a:solidFill>
@@ -12211,14 +12238,14 @@
       </p:sp>
       <p:pic>
         <p:nvPicPr>
-          <p:cNvPr id="6" name="Imagen 5"/>
+          <p:cNvPr id="2" name="Imagen 1"/>
           <p:cNvPicPr>
             <a:picLocks noChangeAspect="1"/>
           </p:cNvPicPr>
           <p:nvPr/>
         </p:nvPicPr>
         <p:blipFill>
-          <a:blip r:embed="rId3">
+          <a:blip r:embed="rId5">
             <a:extLst>
               <a:ext uri="{28A0092B-C50C-407E-A947-70E740481C1C}">
                 <a14:useLocalDpi xmlns:a14="http://schemas.microsoft.com/office/drawing/2010/main" val="0"/>
@@ -12231,8 +12258,8 @@
         </p:blipFill>
         <p:spPr>
           <a:xfrm>
-            <a:off x="0" y="3025221"/>
-            <a:ext cx="9144000" cy="4009668"/>
+            <a:off x="2150849" y="4431853"/>
+            <a:ext cx="4763094" cy="622489"/>
           </a:xfrm>
           <a:prstGeom prst="rect">
             <a:avLst/>
@@ -12241,14 +12268,107 @@
       </p:pic>
       <p:pic>
         <p:nvPicPr>
-          <p:cNvPr id="4" name="Imagen 3"/>
+          <p:cNvPr id="3" name="Imagen 2"/>
           <p:cNvPicPr>
             <a:picLocks noChangeAspect="1"/>
           </p:cNvPicPr>
           <p:nvPr/>
         </p:nvPicPr>
+        <p:blipFill rotWithShape="1">
+          <a:blip r:embed="rId6">
+            <a:extLst>
+              <a:ext uri="{28A0092B-C50C-407E-A947-70E740481C1C}">
+                <a14:useLocalDpi xmlns:a14="http://schemas.microsoft.com/office/drawing/2010/main" val="0"/>
+              </a:ext>
+            </a:extLst>
+          </a:blip>
+          <a:srcRect l="11979" t="77706"/>
+          <a:stretch/>
+        </p:blipFill>
+        <p:spPr>
+          <a:xfrm>
+            <a:off x="0" y="5982771"/>
+            <a:ext cx="9143999" cy="865704"/>
+          </a:xfrm>
+          <a:prstGeom prst="rect">
+            <a:avLst/>
+          </a:prstGeom>
+        </p:spPr>
+      </p:pic>
+      <p:pic>
+        <p:nvPicPr>
+          <p:cNvPr id="12" name="Imagen 11"/>
+          <p:cNvPicPr>
+            <a:picLocks noChangeAspect="1"/>
+          </p:cNvPicPr>
+          <p:nvPr/>
+        </p:nvPicPr>
+        <p:blipFill rotWithShape="1">
+          <a:blip r:embed="rId6">
+            <a:extLst>
+              <a:ext uri="{28A0092B-C50C-407E-A947-70E740481C1C}">
+                <a14:useLocalDpi xmlns:a14="http://schemas.microsoft.com/office/drawing/2010/main" val="0"/>
+              </a:ext>
+            </a:extLst>
+          </a:blip>
+          <a:srcRect l="11979" t="38247" b="41582"/>
+          <a:stretch/>
+        </p:blipFill>
+        <p:spPr>
+          <a:xfrm>
+            <a:off x="0" y="5193908"/>
+            <a:ext cx="9143999" cy="783285"/>
+          </a:xfrm>
+          <a:prstGeom prst="rect">
+            <a:avLst/>
+          </a:prstGeom>
+        </p:spPr>
+      </p:pic>
+      <p:cxnSp>
+        <p:nvCxnSpPr>
+          <p:cNvPr id="6" name="Conector recto 5"/>
+          <p:cNvCxnSpPr/>
+          <p:nvPr/>
+        </p:nvCxnSpPr>
+        <p:spPr>
+          <a:xfrm>
+            <a:off x="2182871" y="5053446"/>
+            <a:ext cx="4698000" cy="1"/>
+          </a:xfrm>
+          <a:prstGeom prst="line">
+            <a:avLst/>
+          </a:prstGeom>
+          <a:ln>
+            <a:solidFill>
+              <a:schemeClr val="tx1"/>
+            </a:solidFill>
+          </a:ln>
+        </p:spPr>
+        <p:style>
+          <a:lnRef idx="1">
+            <a:schemeClr val="accent1"/>
+          </a:lnRef>
+          <a:fillRef idx="0">
+            <a:schemeClr val="accent1"/>
+          </a:fillRef>
+          <a:effectRef idx="0">
+            <a:schemeClr val="accent1"/>
+          </a:effectRef>
+          <a:fontRef idx="minor">
+            <a:schemeClr val="tx1"/>
+          </a:fontRef>
+        </p:style>
+      </p:cxnSp>
+      <p:pic>
+        <p:nvPicPr>
+          <p:cNvPr id="9" name="Imagen 8"/>
+          <p:cNvPicPr>
+            <a:picLocks noChangeAspect="1"/>
+          </p:cNvPicPr>
+          <p:nvPr/>
+        </p:nvPicPr>
         <p:blipFill>
-          <a:blip r:embed="rId4">
+          <a:blip r:embed="rId7" cstate="print">
             <a:extLst>
               <a:ext uri="{28A0092B-C50C-407E-A947-70E740481C1C}">
                 <a14:useLocalDpi xmlns:a14="http://schemas.microsoft.com/office/drawing/2010/main" val="0"/>
@@ -12261,8 +12381,8 @@
         </p:blipFill>
         <p:spPr>
           <a:xfrm>
-            <a:off x="4118885" y="413057"/>
-            <a:ext cx="8859177" cy="4419344"/>
+            <a:off x="6184521" y="2401830"/>
+            <a:ext cx="1555712" cy="1195305"/>
           </a:xfrm>
           <a:prstGeom prst="rect">
             <a:avLst/>
@@ -12272,7 +12392,7 @@
     </p:spTree>
     <p:extLst>
       <p:ext uri="{BB962C8B-B14F-4D97-AF65-F5344CB8AC3E}">
-        <p14:creationId xmlns:p14="http://schemas.microsoft.com/office/powerpoint/2010/main" val="859824628"/>
+        <p14:creationId xmlns:p14="http://schemas.microsoft.com/office/powerpoint/2010/main" val="1814699273"/>
       </p:ext>
     </p:extLst>
   </p:cSld>
@@ -12308,7 +12428,7 @@
       </p:grpSpPr>
       <p:sp>
         <p:nvSpPr>
-          <p:cNvPr id="36" name="Rectángulo 35"/>
+          <p:cNvPr id="20" name="Rectángulo 19"/>
           <p:cNvSpPr/>
           <p:nvPr/>
         </p:nvSpPr>
@@ -12360,14 +12480,14 @@
       </p:sp>
       <p:sp>
         <p:nvSpPr>
-          <p:cNvPr id="25" name="Shape 102"/>
+          <p:cNvPr id="47" name="Shape 102"/>
           <p:cNvSpPr/>
           <p:nvPr/>
         </p:nvSpPr>
         <p:spPr>
           <a:xfrm>
             <a:off x="0" y="825219"/>
-            <a:ext cx="9144000" cy="720000"/>
+            <a:ext cx="9143999" cy="3337348"/>
           </a:xfrm>
           <a:prstGeom prst="rect">
             <a:avLst/>
@@ -12376,6 +12496,12 @@
             <a:srgbClr val="424242"/>
           </a:solidFill>
           <a:ln w="12700">
+            <a:solidFill>
+              <a:schemeClr val="tx1">
+                <a:lumMod val="75000"/>
+                <a:lumOff val="25000"/>
+              </a:schemeClr>
+            </a:solidFill>
             <a:miter lim="400000"/>
           </a:ln>
         </p:spPr>
@@ -12434,7 +12560,7 @@
                 <a:cs typeface="Quicksand"/>
                 <a:sym typeface="Quicksand"/>
               </a:rPr>
-              <a:t>Desarrollo de la aplicación</a:t>
+              <a:t>Conclusión</a:t>
             </a:r>
             <a:endParaRPr lang="en" sz="2400" b="1" dirty="0">
               <a:solidFill>
@@ -12512,7 +12638,7 @@
               <a:rPr lang="es-ES" b="1" dirty="0">
                 <a:latin typeface="Century Gothic" panose="020B0502020202020204" pitchFamily="34" charset="0"/>
               </a:rPr>
-              <a:t>4</a:t>
+              <a:t>5</a:t>
             </a:r>
           </a:p>
         </p:txBody>
@@ -12525,8 +12651,8 @@
         </p:nvSpPr>
         <p:spPr>
           <a:xfrm>
-            <a:off x="801361" y="961787"/>
-            <a:ext cx="7521300" cy="452312"/>
+            <a:off x="2965221" y="1021118"/>
+            <a:ext cx="3193578" cy="452312"/>
           </a:xfrm>
           <a:prstGeom prst="rect">
             <a:avLst/>
@@ -12557,7 +12683,7 @@
                 <a:cs typeface="Quicksand"/>
                 <a:sym typeface="Quicksand"/>
               </a:rPr>
-              <a:t>Evaluación de la solución</a:t>
+              <a:t>Objetivos cumplidos</a:t>
             </a:r>
             <a:endParaRPr lang="en" sz="2000" b="1" dirty="0">
               <a:solidFill>
@@ -12571,16 +12697,131 @@
           </a:p>
         </p:txBody>
       </p:sp>
+      <p:sp>
+        <p:nvSpPr>
+          <p:cNvPr id="49" name="Shape 63"/>
+          <p:cNvSpPr txBox="1"/>
+          <p:nvPr/>
+        </p:nvSpPr>
+        <p:spPr>
+          <a:xfrm>
+            <a:off x="2729552" y="4274946"/>
+            <a:ext cx="3664918" cy="452312"/>
+          </a:xfrm>
+          <a:prstGeom prst="rect">
+            <a:avLst/>
+          </a:prstGeom>
+          <a:noFill/>
+          <a:ln>
+            <a:noFill/>
+          </a:ln>
+        </p:spPr>
+        <p:txBody>
+          <a:bodyPr lIns="91425" tIns="91425" rIns="91425" bIns="91425" anchor="ctr" anchorCtr="0">
+            <a:noAutofit/>
+          </a:bodyPr>
+          <a:lstStyle/>
+          <a:p>
+            <a:pPr algn="ctr">
+              <a:spcBef>
+                <a:spcPts val="600"/>
+              </a:spcBef>
+            </a:pPr>
+            <a:r>
+              <a:rPr lang="en" sz="2000" b="1" dirty="0" smtClean="0">
+                <a:latin typeface="Century Gothic" panose="020B0502020202020204" pitchFamily="34" charset="0"/>
+                <a:ea typeface="Quicksand"/>
+                <a:cs typeface="Quicksand"/>
+                <a:sym typeface="Quicksand"/>
+              </a:rPr>
+              <a:t>Línea futura de trabajo</a:t>
+            </a:r>
+            <a:endParaRPr lang="en" sz="2000" b="1" dirty="0">
+              <a:latin typeface="Century Gothic" panose="020B0502020202020204" pitchFamily="34" charset="0"/>
+              <a:ea typeface="Quicksand"/>
+              <a:cs typeface="Quicksand"/>
+              <a:sym typeface="Quicksand"/>
+            </a:endParaRPr>
+          </a:p>
+        </p:txBody>
+      </p:sp>
+      <p:sp>
+        <p:nvSpPr>
+          <p:cNvPr id="5" name="Rectángulo 4"/>
+          <p:cNvSpPr/>
+          <p:nvPr/>
+        </p:nvSpPr>
+        <p:spPr>
+          <a:xfrm>
+            <a:off x="3282588" y="6090114"/>
+            <a:ext cx="2551369" cy="646331"/>
+          </a:xfrm>
+          <a:prstGeom prst="rect">
+            <a:avLst/>
+          </a:prstGeom>
+        </p:spPr>
+        <p:txBody>
+          <a:bodyPr wrap="square">
+            <a:spAutoFit/>
+          </a:bodyPr>
+          <a:lstStyle/>
+          <a:p>
+            <a:pPr algn="ctr"/>
+            <a:r>
+              <a:rPr lang="es-ES" spc="-20" dirty="0" smtClean="0">
+                <a:ea typeface="Calibri" panose="020F0502020204030204" pitchFamily="34" charset="0"/>
+                <a:cs typeface="Times New Roman" panose="02020603050405020304" pitchFamily="18" charset="0"/>
+              </a:rPr>
+              <a:t>Preparación del entorno para producción</a:t>
+            </a:r>
+            <a:endParaRPr lang="es-ES" dirty="0">
+              <a:cs typeface="Times New Roman" panose="02020603050405020304" pitchFamily="18" charset="0"/>
+            </a:endParaRPr>
+          </a:p>
+        </p:txBody>
+      </p:sp>
+      <p:sp>
+        <p:nvSpPr>
+          <p:cNvPr id="6" name="Rectángulo 5"/>
+          <p:cNvSpPr/>
+          <p:nvPr/>
+        </p:nvSpPr>
+        <p:spPr>
+          <a:xfrm>
+            <a:off x="6097657" y="5923969"/>
+            <a:ext cx="2763425" cy="646331"/>
+          </a:xfrm>
+          <a:prstGeom prst="rect">
+            <a:avLst/>
+          </a:prstGeom>
+        </p:spPr>
+        <p:txBody>
+          <a:bodyPr wrap="square">
+            <a:spAutoFit/>
+          </a:bodyPr>
+          <a:lstStyle/>
+          <a:p>
+            <a:pPr algn="ctr"/>
+            <a:r>
+              <a:rPr lang="es-ES" spc="-20" dirty="0" smtClean="0">
+                <a:ea typeface="Calibri" panose="020F0502020204030204" pitchFamily="34" charset="0"/>
+                <a:cs typeface="Times New Roman" panose="02020603050405020304" pitchFamily="18" charset="0"/>
+              </a:rPr>
+              <a:t>Ampliar la cantidad de repositorios alcanzados</a:t>
+            </a:r>
+          </a:p>
+        </p:txBody>
+      </p:sp>
       <p:pic>
         <p:nvPicPr>
-          <p:cNvPr id="2" name="Imagen 1"/>
+          <p:cNvPr id="9" name="Imagen 8"/>
           <p:cNvPicPr>
             <a:picLocks noChangeAspect="1"/>
           </p:cNvPicPr>
           <p:nvPr/>
         </p:nvPicPr>
         <p:blipFill>
-          <a:blip r:embed="rId3">
+          <a:blip r:embed="rId3" cstate="print">
             <a:extLst>
               <a:ext uri="{28A0092B-C50C-407E-A947-70E740481C1C}">
                 <a14:useLocalDpi xmlns:a14="http://schemas.microsoft.com/office/drawing/2010/main" val="0"/>
@@ -12593,24 +12834,196 @@
         </p:blipFill>
         <p:spPr>
           <a:xfrm>
-            <a:off x="1836136" y="2539499"/>
-            <a:ext cx="6486525" cy="847725"/>
+            <a:off x="4137043" y="4802448"/>
+            <a:ext cx="807216" cy="1196710"/>
           </a:xfrm>
           <a:prstGeom prst="rect">
             <a:avLst/>
           </a:prstGeom>
         </p:spPr>
       </p:pic>
+      <p:sp>
+        <p:nvSpPr>
+          <p:cNvPr id="51" name="Rectángulo 50"/>
+          <p:cNvSpPr/>
+          <p:nvPr/>
+        </p:nvSpPr>
+        <p:spPr>
+          <a:xfrm>
+            <a:off x="278047" y="3125355"/>
+            <a:ext cx="2763425" cy="646331"/>
+          </a:xfrm>
+          <a:prstGeom prst="rect">
+            <a:avLst/>
+          </a:prstGeom>
+        </p:spPr>
+        <p:txBody>
+          <a:bodyPr wrap="square">
+            <a:spAutoFit/>
+          </a:bodyPr>
+          <a:lstStyle/>
+          <a:p>
+            <a:pPr algn="ctr"/>
+            <a:r>
+              <a:rPr lang="es-ES" spc="-20" dirty="0" smtClean="0">
+                <a:solidFill>
+                  <a:schemeClr val="bg1"/>
+                </a:solidFill>
+                <a:ea typeface="Calibri" panose="020F0502020204030204" pitchFamily="34" charset="0"/>
+                <a:cs typeface="Times New Roman" panose="02020603050405020304" pitchFamily="18" charset="0"/>
+              </a:rPr>
+              <a:t>Análisis estático de </a:t>
+            </a:r>
+          </a:p>
+          <a:p>
+            <a:pPr algn="ctr"/>
+            <a:r>
+              <a:rPr lang="es-ES" spc="-20" dirty="0" smtClean="0">
+                <a:solidFill>
+                  <a:schemeClr val="bg1"/>
+                </a:solidFill>
+                <a:ea typeface="Calibri" panose="020F0502020204030204" pitchFamily="34" charset="0"/>
+                <a:cs typeface="Times New Roman" panose="02020603050405020304" pitchFamily="18" charset="0"/>
+              </a:rPr>
+              <a:t>forma pasiva</a:t>
+            </a:r>
+          </a:p>
+        </p:txBody>
+      </p:sp>
+      <p:sp>
+        <p:nvSpPr>
+          <p:cNvPr id="52" name="Rectángulo 51"/>
+          <p:cNvSpPr/>
+          <p:nvPr/>
+        </p:nvSpPr>
+        <p:spPr>
+          <a:xfrm>
+            <a:off x="2829723" y="1603662"/>
+            <a:ext cx="3457101" cy="646331"/>
+          </a:xfrm>
+          <a:prstGeom prst="rect">
+            <a:avLst/>
+          </a:prstGeom>
+        </p:spPr>
+        <p:txBody>
+          <a:bodyPr wrap="square">
+            <a:spAutoFit/>
+          </a:bodyPr>
+          <a:lstStyle/>
+          <a:p>
+            <a:pPr algn="ctr"/>
+            <a:r>
+              <a:rPr lang="es-ES" spc="-20" dirty="0" smtClean="0">
+                <a:solidFill>
+                  <a:schemeClr val="bg1"/>
+                </a:solidFill>
+                <a:ea typeface="Calibri" panose="020F0502020204030204" pitchFamily="34" charset="0"/>
+                <a:cs typeface="Times New Roman" panose="02020603050405020304" pitchFamily="18" charset="0"/>
+              </a:rPr>
+              <a:t>Incluido en el propio </a:t>
+            </a:r>
+            <a:br>
+              <a:rPr lang="es-ES" spc="-20" dirty="0" smtClean="0">
+                <a:solidFill>
+                  <a:schemeClr val="bg1"/>
+                </a:solidFill>
+                <a:ea typeface="Calibri" panose="020F0502020204030204" pitchFamily="34" charset="0"/>
+                <a:cs typeface="Times New Roman" panose="02020603050405020304" pitchFamily="18" charset="0"/>
+              </a:rPr>
+            </a:br>
+            <a:r>
+              <a:rPr lang="es-ES" spc="-20" dirty="0" smtClean="0">
+                <a:solidFill>
+                  <a:schemeClr val="bg1"/>
+                </a:solidFill>
+                <a:ea typeface="Calibri" panose="020F0502020204030204" pitchFamily="34" charset="0"/>
+                <a:cs typeface="Times New Roman" panose="02020603050405020304" pitchFamily="18" charset="0"/>
+              </a:rPr>
+              <a:t>proceso de desarrollo</a:t>
+            </a:r>
+          </a:p>
+        </p:txBody>
+      </p:sp>
+      <p:sp>
+        <p:nvSpPr>
+          <p:cNvPr id="55" name="Rectángulo 54"/>
+          <p:cNvSpPr/>
+          <p:nvPr/>
+        </p:nvSpPr>
+        <p:spPr>
+          <a:xfrm>
+            <a:off x="6097657" y="3125355"/>
+            <a:ext cx="2763425" cy="646331"/>
+          </a:xfrm>
+          <a:prstGeom prst="rect">
+            <a:avLst/>
+          </a:prstGeom>
+        </p:spPr>
+        <p:txBody>
+          <a:bodyPr wrap="square">
+            <a:spAutoFit/>
+          </a:bodyPr>
+          <a:lstStyle/>
+          <a:p>
+            <a:pPr algn="ctr"/>
+            <a:r>
+              <a:rPr lang="es-ES" spc="-20" dirty="0" smtClean="0">
+                <a:solidFill>
+                  <a:schemeClr val="bg1"/>
+                </a:solidFill>
+                <a:ea typeface="Calibri" panose="020F0502020204030204" pitchFamily="34" charset="0"/>
+                <a:cs typeface="Times New Roman" panose="02020603050405020304" pitchFamily="18" charset="0"/>
+              </a:rPr>
+              <a:t>Utilizando contenedores de imágenes</a:t>
+            </a:r>
+          </a:p>
+        </p:txBody>
+      </p:sp>
+      <p:sp>
+        <p:nvSpPr>
+          <p:cNvPr id="23" name="Rectángulo 22"/>
+          <p:cNvSpPr/>
+          <p:nvPr/>
+        </p:nvSpPr>
+        <p:spPr>
+          <a:xfrm>
+            <a:off x="171430" y="6017968"/>
+            <a:ext cx="2610904" cy="646331"/>
+          </a:xfrm>
+          <a:prstGeom prst="rect">
+            <a:avLst/>
+          </a:prstGeom>
+        </p:spPr>
+        <p:txBody>
+          <a:bodyPr wrap="square">
+            <a:spAutoFit/>
+          </a:bodyPr>
+          <a:lstStyle/>
+          <a:p>
+            <a:pPr algn="ctr"/>
+            <a:r>
+              <a:rPr lang="es-ES" spc="-20" dirty="0" smtClean="0">
+                <a:ea typeface="Calibri" panose="020F0502020204030204" pitchFamily="34" charset="0"/>
+                <a:cs typeface="Times New Roman" panose="02020603050405020304" pitchFamily="18" charset="0"/>
+              </a:rPr>
+              <a:t>Lenguajes de programación examinados</a:t>
+            </a:r>
+            <a:endParaRPr lang="es-ES" dirty="0">
+              <a:cs typeface="Times New Roman" panose="02020603050405020304" pitchFamily="18" charset="0"/>
+            </a:endParaRPr>
+          </a:p>
+        </p:txBody>
+      </p:sp>
       <p:pic>
         <p:nvPicPr>
-          <p:cNvPr id="3" name="Imagen 2"/>
+          <p:cNvPr id="2" name="Imagen 1"/>
           <p:cNvPicPr>
             <a:picLocks noChangeAspect="1"/>
           </p:cNvPicPr>
           <p:nvPr/>
         </p:nvPicPr>
         <p:blipFill>
-          <a:blip r:embed="rId4">
+          <a:blip r:embed="rId4" cstate="print">
             <a:extLst>
               <a:ext uri="{28A0092B-C50C-407E-A947-70E740481C1C}">
                 <a14:useLocalDpi xmlns:a14="http://schemas.microsoft.com/office/drawing/2010/main" val="0"/>
@@ -12623,8 +13036,8 @@
         </p:blipFill>
         <p:spPr>
           <a:xfrm>
-            <a:off x="0" y="3440097"/>
-            <a:ext cx="9144000" cy="3417903"/>
+            <a:off x="879282" y="4802448"/>
+            <a:ext cx="1195200" cy="1195200"/>
           </a:xfrm>
           <a:prstGeom prst="rect">
             <a:avLst/>
@@ -12633,14 +13046,14 @@
       </p:pic>
       <p:pic>
         <p:nvPicPr>
-          <p:cNvPr id="4" name="Imagen 3"/>
+          <p:cNvPr id="3" name="Imagen 2"/>
           <p:cNvPicPr>
             <a:picLocks noChangeAspect="1"/>
           </p:cNvPicPr>
           <p:nvPr/>
         </p:nvPicPr>
         <p:blipFill>
-          <a:blip r:embed="rId5">
+          <a:blip r:embed="rId5" cstate="print">
             <a:extLst>
               <a:ext uri="{28A0092B-C50C-407E-A947-70E740481C1C}">
                 <a14:useLocalDpi xmlns:a14="http://schemas.microsoft.com/office/drawing/2010/main" val="0"/>
@@ -12653,8 +13066,120 @@
         </p:blipFill>
         <p:spPr>
           <a:xfrm>
-            <a:off x="242386" y="1545561"/>
-            <a:ext cx="6124575" cy="1028700"/>
+            <a:off x="6585908" y="4727258"/>
+            <a:ext cx="1786922" cy="1195200"/>
+          </a:xfrm>
+          <a:prstGeom prst="rect">
+            <a:avLst/>
+          </a:prstGeom>
+        </p:spPr>
+      </p:pic>
+      <p:pic>
+        <p:nvPicPr>
+          <p:cNvPr id="7" name="Imagen 6"/>
+          <p:cNvPicPr>
+            <a:picLocks noChangeAspect="1"/>
+          </p:cNvPicPr>
+          <p:nvPr/>
+        </p:nvPicPr>
+        <p:blipFill>
+          <a:blip r:embed="rId6" cstate="print">
+            <a:extLst>
+              <a:ext uri="{28A0092B-C50C-407E-A947-70E740481C1C}">
+                <a14:useLocalDpi xmlns:a14="http://schemas.microsoft.com/office/drawing/2010/main" val="0"/>
+              </a:ext>
+            </a:extLst>
+          </a:blip>
+          <a:stretch>
+            <a:fillRect/>
+          </a:stretch>
+        </p:blipFill>
+        <p:spPr>
+          <a:xfrm>
+            <a:off x="6641322" y="1813444"/>
+            <a:ext cx="1676093" cy="1310400"/>
+          </a:xfrm>
+          <a:prstGeom prst="ellipse">
+            <a:avLst/>
+          </a:prstGeom>
+          <a:ln w="63500" cap="rnd">
+            <a:noFill/>
+          </a:ln>
+          <a:effectLst>
+            <a:outerShdw blurRad="381000" dist="292100" dir="5400000" sx="-80000" sy="-18000" rotWithShape="0">
+              <a:srgbClr val="000000">
+                <a:alpha val="22000"/>
+              </a:srgbClr>
+            </a:outerShdw>
+          </a:effectLst>
+          <a:scene3d>
+            <a:camera prst="orthographicFront"/>
+            <a:lightRig rig="contrasting" dir="t">
+              <a:rot lat="0" lon="0" rev="3000000"/>
+            </a:lightRig>
+          </a:scene3d>
+          <a:sp3d contourW="7620">
+            <a:bevelT w="95250" h="31750"/>
+            <a:contourClr>
+              <a:srgbClr val="333333"/>
+            </a:contourClr>
+          </a:sp3d>
+        </p:spPr>
+      </p:pic>
+      <p:pic>
+        <p:nvPicPr>
+          <p:cNvPr id="10" name="Imagen 9"/>
+          <p:cNvPicPr>
+            <a:picLocks noChangeAspect="1"/>
+          </p:cNvPicPr>
+          <p:nvPr/>
+        </p:nvPicPr>
+        <p:blipFill>
+          <a:blip r:embed="rId7" cstate="print">
+            <a:extLst>
+              <a:ext uri="{28A0092B-C50C-407E-A947-70E740481C1C}">
+                <a14:useLocalDpi xmlns:a14="http://schemas.microsoft.com/office/drawing/2010/main" val="0"/>
+              </a:ext>
+            </a:extLst>
+          </a:blip>
+          <a:stretch>
+            <a:fillRect/>
+          </a:stretch>
+        </p:blipFill>
+        <p:spPr>
+          <a:xfrm>
+            <a:off x="3888500" y="2380225"/>
+            <a:ext cx="1308899" cy="1308899"/>
+          </a:xfrm>
+          <a:prstGeom prst="rect">
+            <a:avLst/>
+          </a:prstGeom>
+        </p:spPr>
+      </p:pic>
+      <p:pic>
+        <p:nvPicPr>
+          <p:cNvPr id="11" name="Imagen 10"/>
+          <p:cNvPicPr>
+            <a:picLocks noChangeAspect="1"/>
+          </p:cNvPicPr>
+          <p:nvPr/>
+        </p:nvPicPr>
+        <p:blipFill>
+          <a:blip r:embed="rId8" cstate="print">
+            <a:extLst>
+              <a:ext uri="{28A0092B-C50C-407E-A947-70E740481C1C}">
+                <a14:useLocalDpi xmlns:a14="http://schemas.microsoft.com/office/drawing/2010/main" val="0"/>
+              </a:ext>
+            </a:extLst>
+          </a:blip>
+          <a:stretch>
+            <a:fillRect/>
+          </a:stretch>
+        </p:blipFill>
+        <p:spPr>
+          <a:xfrm>
+            <a:off x="1002976" y="1813444"/>
+            <a:ext cx="1313565" cy="1310400"/>
           </a:xfrm>
           <a:prstGeom prst="rect">
             <a:avLst/>
@@ -12664,7 +13189,7 @@
     </p:spTree>
     <p:extLst>
       <p:ext uri="{BB962C8B-B14F-4D97-AF65-F5344CB8AC3E}">
-        <p14:creationId xmlns:p14="http://schemas.microsoft.com/office/powerpoint/2010/main" val="1814699273"/>
+        <p14:creationId xmlns:p14="http://schemas.microsoft.com/office/powerpoint/2010/main" val="3053281417"/>
       </p:ext>
     </p:extLst>
   </p:cSld>
@@ -12700,7 +13225,7 @@
       </p:grpSpPr>
       <p:sp>
         <p:nvSpPr>
-          <p:cNvPr id="20" name="Rectángulo 19"/>
+          <p:cNvPr id="36" name="Rectángulo 35"/>
           <p:cNvSpPr/>
           <p:nvPr/>
         </p:nvSpPr>
@@ -12752,48 +13277,6 @@
       </p:sp>
       <p:sp>
         <p:nvSpPr>
-          <p:cNvPr id="47" name="Shape 102"/>
-          <p:cNvSpPr/>
-          <p:nvPr/>
-        </p:nvSpPr>
-        <p:spPr>
-          <a:xfrm>
-            <a:off x="0" y="825219"/>
-            <a:ext cx="9143999" cy="3337348"/>
-          </a:xfrm>
-          <a:prstGeom prst="rect">
-            <a:avLst/>
-          </a:prstGeom>
-          <a:solidFill>
-            <a:srgbClr val="424242"/>
-          </a:solidFill>
-          <a:ln w="12700">
-            <a:solidFill>
-              <a:schemeClr val="tx1">
-                <a:lumMod val="75000"/>
-                <a:lumOff val="25000"/>
-              </a:schemeClr>
-            </a:solidFill>
-            <a:miter lim="400000"/>
-          </a:ln>
-        </p:spPr>
-        <p:txBody>
-          <a:bodyPr lIns="0" tIns="0" rIns="0" bIns="0" anchor="ctr"/>
-          <a:lstStyle/>
-          <a:p>
-            <a:pPr lvl="0">
-              <a:defRPr sz="2400">
-                <a:solidFill>
-                  <a:srgbClr val="FFFFFF"/>
-                </a:solidFill>
-              </a:defRPr>
-            </a:pPr>
-            <a:endParaRPr sz="3200"/>
-          </a:p>
-        </p:txBody>
-      </p:sp>
-      <p:sp>
-        <p:nvSpPr>
           <p:cNvPr id="27" name="Shape 63"/>
           <p:cNvSpPr txBox="1"/>
           <p:nvPr/>
@@ -12832,7 +13315,7 @@
                 <a:cs typeface="Quicksand"/>
                 <a:sym typeface="Quicksand"/>
               </a:rPr>
-              <a:t>Conclusión</a:t>
+              <a:t>GitHub - EleazarWorkshare</a:t>
             </a:r>
             <a:endParaRPr lang="en" sz="2400" b="1" dirty="0">
               <a:solidFill>
@@ -12907,797 +13390,6 @@
           <a:p>
             <a:pPr algn="ctr"/>
             <a:r>
-              <a:rPr lang="es-ES" b="1" dirty="0">
-                <a:latin typeface="Century Gothic" panose="020B0502020202020204" pitchFamily="34" charset="0"/>
-              </a:rPr>
-              <a:t>5</a:t>
-            </a:r>
-          </a:p>
-        </p:txBody>
-      </p:sp>
-      <p:sp>
-        <p:nvSpPr>
-          <p:cNvPr id="30" name="Shape 63"/>
-          <p:cNvSpPr txBox="1"/>
-          <p:nvPr/>
-        </p:nvSpPr>
-        <p:spPr>
-          <a:xfrm>
-            <a:off x="2965221" y="1021118"/>
-            <a:ext cx="3193578" cy="452312"/>
-          </a:xfrm>
-          <a:prstGeom prst="rect">
-            <a:avLst/>
-          </a:prstGeom>
-          <a:noFill/>
-          <a:ln>
-            <a:noFill/>
-          </a:ln>
-        </p:spPr>
-        <p:txBody>
-          <a:bodyPr lIns="91425" tIns="91425" rIns="91425" bIns="91425" anchor="ctr" anchorCtr="0">
-            <a:noAutofit/>
-          </a:bodyPr>
-          <a:lstStyle/>
-          <a:p>
-            <a:pPr algn="ctr">
-              <a:spcBef>
-                <a:spcPts val="600"/>
-              </a:spcBef>
-            </a:pPr>
-            <a:r>
-              <a:rPr lang="en" sz="2000" b="1" dirty="0" smtClean="0">
-                <a:solidFill>
-                  <a:srgbClr val="FFFFFF"/>
-                </a:solidFill>
-                <a:latin typeface="Century Gothic" panose="020B0502020202020204" pitchFamily="34" charset="0"/>
-                <a:ea typeface="Quicksand"/>
-                <a:cs typeface="Quicksand"/>
-                <a:sym typeface="Quicksand"/>
-              </a:rPr>
-              <a:t>Objetivos cumplidos</a:t>
-            </a:r>
-            <a:endParaRPr lang="en" sz="2000" b="1" dirty="0">
-              <a:solidFill>
-                <a:srgbClr val="FFFFFF"/>
-              </a:solidFill>
-              <a:latin typeface="Century Gothic" panose="020B0502020202020204" pitchFamily="34" charset="0"/>
-              <a:ea typeface="Quicksand"/>
-              <a:cs typeface="Quicksand"/>
-              <a:sym typeface="Quicksand"/>
-            </a:endParaRPr>
-          </a:p>
-        </p:txBody>
-      </p:sp>
-      <p:sp>
-        <p:nvSpPr>
-          <p:cNvPr id="49" name="Shape 63"/>
-          <p:cNvSpPr txBox="1"/>
-          <p:nvPr/>
-        </p:nvSpPr>
-        <p:spPr>
-          <a:xfrm>
-            <a:off x="2729552" y="4274946"/>
-            <a:ext cx="3664918" cy="452312"/>
-          </a:xfrm>
-          <a:prstGeom prst="rect">
-            <a:avLst/>
-          </a:prstGeom>
-          <a:noFill/>
-          <a:ln>
-            <a:noFill/>
-          </a:ln>
-        </p:spPr>
-        <p:txBody>
-          <a:bodyPr lIns="91425" tIns="91425" rIns="91425" bIns="91425" anchor="ctr" anchorCtr="0">
-            <a:noAutofit/>
-          </a:bodyPr>
-          <a:lstStyle/>
-          <a:p>
-            <a:pPr algn="ctr">
-              <a:spcBef>
-                <a:spcPts val="600"/>
-              </a:spcBef>
-            </a:pPr>
-            <a:r>
-              <a:rPr lang="en" sz="2000" b="1" dirty="0" smtClean="0">
-                <a:latin typeface="Century Gothic" panose="020B0502020202020204" pitchFamily="34" charset="0"/>
-                <a:ea typeface="Quicksand"/>
-                <a:cs typeface="Quicksand"/>
-                <a:sym typeface="Quicksand"/>
-              </a:rPr>
-              <a:t>Línea futura de trabajo</a:t>
-            </a:r>
-            <a:endParaRPr lang="en" sz="2000" b="1" dirty="0">
-              <a:latin typeface="Century Gothic" panose="020B0502020202020204" pitchFamily="34" charset="0"/>
-              <a:ea typeface="Quicksand"/>
-              <a:cs typeface="Quicksand"/>
-              <a:sym typeface="Quicksand"/>
-            </a:endParaRPr>
-          </a:p>
-        </p:txBody>
-      </p:sp>
-      <p:sp>
-        <p:nvSpPr>
-          <p:cNvPr id="5" name="Rectángulo 4"/>
-          <p:cNvSpPr/>
-          <p:nvPr/>
-        </p:nvSpPr>
-        <p:spPr>
-          <a:xfrm>
-            <a:off x="3282588" y="6090114"/>
-            <a:ext cx="2551369" cy="646331"/>
-          </a:xfrm>
-          <a:prstGeom prst="rect">
-            <a:avLst/>
-          </a:prstGeom>
-        </p:spPr>
-        <p:txBody>
-          <a:bodyPr wrap="square">
-            <a:spAutoFit/>
-          </a:bodyPr>
-          <a:lstStyle/>
-          <a:p>
-            <a:pPr algn="ctr"/>
-            <a:r>
-              <a:rPr lang="es-ES" spc="-20" dirty="0" smtClean="0">
-                <a:ea typeface="Calibri" panose="020F0502020204030204" pitchFamily="34" charset="0"/>
-                <a:cs typeface="Times New Roman" panose="02020603050405020304" pitchFamily="18" charset="0"/>
-              </a:rPr>
-              <a:t>Preparación del entorno para producción</a:t>
-            </a:r>
-            <a:endParaRPr lang="es-ES" dirty="0">
-              <a:cs typeface="Times New Roman" panose="02020603050405020304" pitchFamily="18" charset="0"/>
-            </a:endParaRPr>
-          </a:p>
-        </p:txBody>
-      </p:sp>
-      <p:sp>
-        <p:nvSpPr>
-          <p:cNvPr id="6" name="Rectángulo 5"/>
-          <p:cNvSpPr/>
-          <p:nvPr/>
-        </p:nvSpPr>
-        <p:spPr>
-          <a:xfrm>
-            <a:off x="6097657" y="5923969"/>
-            <a:ext cx="2763425" cy="646331"/>
-          </a:xfrm>
-          <a:prstGeom prst="rect">
-            <a:avLst/>
-          </a:prstGeom>
-        </p:spPr>
-        <p:txBody>
-          <a:bodyPr wrap="square">
-            <a:spAutoFit/>
-          </a:bodyPr>
-          <a:lstStyle/>
-          <a:p>
-            <a:pPr algn="ctr"/>
-            <a:r>
-              <a:rPr lang="es-ES" spc="-20" dirty="0" smtClean="0">
-                <a:ea typeface="Calibri" panose="020F0502020204030204" pitchFamily="34" charset="0"/>
-                <a:cs typeface="Times New Roman" panose="02020603050405020304" pitchFamily="18" charset="0"/>
-              </a:rPr>
-              <a:t>Ampliar la cantidad de repositorios alcanzados</a:t>
-            </a:r>
-          </a:p>
-        </p:txBody>
-      </p:sp>
-      <p:pic>
-        <p:nvPicPr>
-          <p:cNvPr id="9" name="Imagen 8"/>
-          <p:cNvPicPr>
-            <a:picLocks noChangeAspect="1"/>
-          </p:cNvPicPr>
-          <p:nvPr/>
-        </p:nvPicPr>
-        <p:blipFill>
-          <a:blip r:embed="rId3" cstate="print">
-            <a:extLst>
-              <a:ext uri="{28A0092B-C50C-407E-A947-70E740481C1C}">
-                <a14:useLocalDpi xmlns:a14="http://schemas.microsoft.com/office/drawing/2010/main" val="0"/>
-              </a:ext>
-            </a:extLst>
-          </a:blip>
-          <a:stretch>
-            <a:fillRect/>
-          </a:stretch>
-        </p:blipFill>
-        <p:spPr>
-          <a:xfrm>
-            <a:off x="4137043" y="4802448"/>
-            <a:ext cx="807216" cy="1196710"/>
-          </a:xfrm>
-          <a:prstGeom prst="rect">
-            <a:avLst/>
-          </a:prstGeom>
-        </p:spPr>
-      </p:pic>
-      <p:sp>
-        <p:nvSpPr>
-          <p:cNvPr id="51" name="Rectángulo 50"/>
-          <p:cNvSpPr/>
-          <p:nvPr/>
-        </p:nvSpPr>
-        <p:spPr>
-          <a:xfrm>
-            <a:off x="278047" y="3125355"/>
-            <a:ext cx="2763425" cy="646331"/>
-          </a:xfrm>
-          <a:prstGeom prst="rect">
-            <a:avLst/>
-          </a:prstGeom>
-        </p:spPr>
-        <p:txBody>
-          <a:bodyPr wrap="square">
-            <a:spAutoFit/>
-          </a:bodyPr>
-          <a:lstStyle/>
-          <a:p>
-            <a:pPr algn="ctr"/>
-            <a:r>
-              <a:rPr lang="es-ES" spc="-20" dirty="0" smtClean="0">
-                <a:solidFill>
-                  <a:schemeClr val="bg1"/>
-                </a:solidFill>
-                <a:ea typeface="Calibri" panose="020F0502020204030204" pitchFamily="34" charset="0"/>
-                <a:cs typeface="Times New Roman" panose="02020603050405020304" pitchFamily="18" charset="0"/>
-              </a:rPr>
-              <a:t>Análisis estático de </a:t>
-            </a:r>
-          </a:p>
-          <a:p>
-            <a:pPr algn="ctr"/>
-            <a:r>
-              <a:rPr lang="es-ES" spc="-20" dirty="0" smtClean="0">
-                <a:solidFill>
-                  <a:schemeClr val="bg1"/>
-                </a:solidFill>
-                <a:ea typeface="Calibri" panose="020F0502020204030204" pitchFamily="34" charset="0"/>
-                <a:cs typeface="Times New Roman" panose="02020603050405020304" pitchFamily="18" charset="0"/>
-              </a:rPr>
-              <a:t>forma pasiva</a:t>
-            </a:r>
-          </a:p>
-        </p:txBody>
-      </p:sp>
-      <p:sp>
-        <p:nvSpPr>
-          <p:cNvPr id="52" name="Rectángulo 51"/>
-          <p:cNvSpPr/>
-          <p:nvPr/>
-        </p:nvSpPr>
-        <p:spPr>
-          <a:xfrm>
-            <a:off x="2829723" y="1603662"/>
-            <a:ext cx="3457101" cy="646331"/>
-          </a:xfrm>
-          <a:prstGeom prst="rect">
-            <a:avLst/>
-          </a:prstGeom>
-        </p:spPr>
-        <p:txBody>
-          <a:bodyPr wrap="square">
-            <a:spAutoFit/>
-          </a:bodyPr>
-          <a:lstStyle/>
-          <a:p>
-            <a:pPr algn="ctr"/>
-            <a:r>
-              <a:rPr lang="es-ES" spc="-20" dirty="0" smtClean="0">
-                <a:solidFill>
-                  <a:schemeClr val="bg1"/>
-                </a:solidFill>
-                <a:ea typeface="Calibri" panose="020F0502020204030204" pitchFamily="34" charset="0"/>
-                <a:cs typeface="Times New Roman" panose="02020603050405020304" pitchFamily="18" charset="0"/>
-              </a:rPr>
-              <a:t>Incluido en el propio </a:t>
-            </a:r>
-            <a:br>
-              <a:rPr lang="es-ES" spc="-20" dirty="0" smtClean="0">
-                <a:solidFill>
-                  <a:schemeClr val="bg1"/>
-                </a:solidFill>
-                <a:ea typeface="Calibri" panose="020F0502020204030204" pitchFamily="34" charset="0"/>
-                <a:cs typeface="Times New Roman" panose="02020603050405020304" pitchFamily="18" charset="0"/>
-              </a:rPr>
-            </a:br>
-            <a:r>
-              <a:rPr lang="es-ES" spc="-20" dirty="0" smtClean="0">
-                <a:solidFill>
-                  <a:schemeClr val="bg1"/>
-                </a:solidFill>
-                <a:ea typeface="Calibri" panose="020F0502020204030204" pitchFamily="34" charset="0"/>
-                <a:cs typeface="Times New Roman" panose="02020603050405020304" pitchFamily="18" charset="0"/>
-              </a:rPr>
-              <a:t>proceso de desarrollo</a:t>
-            </a:r>
-          </a:p>
-        </p:txBody>
-      </p:sp>
-      <p:sp>
-        <p:nvSpPr>
-          <p:cNvPr id="55" name="Rectángulo 54"/>
-          <p:cNvSpPr/>
-          <p:nvPr/>
-        </p:nvSpPr>
-        <p:spPr>
-          <a:xfrm>
-            <a:off x="6097657" y="3125355"/>
-            <a:ext cx="2763425" cy="646331"/>
-          </a:xfrm>
-          <a:prstGeom prst="rect">
-            <a:avLst/>
-          </a:prstGeom>
-        </p:spPr>
-        <p:txBody>
-          <a:bodyPr wrap="square">
-            <a:spAutoFit/>
-          </a:bodyPr>
-          <a:lstStyle/>
-          <a:p>
-            <a:pPr algn="ctr"/>
-            <a:r>
-              <a:rPr lang="es-ES" spc="-20" dirty="0" smtClean="0">
-                <a:solidFill>
-                  <a:schemeClr val="bg1"/>
-                </a:solidFill>
-                <a:ea typeface="Calibri" panose="020F0502020204030204" pitchFamily="34" charset="0"/>
-                <a:cs typeface="Times New Roman" panose="02020603050405020304" pitchFamily="18" charset="0"/>
-              </a:rPr>
-              <a:t>Utilizando contenedores de imágenes</a:t>
-            </a:r>
-          </a:p>
-        </p:txBody>
-      </p:sp>
-      <p:sp>
-        <p:nvSpPr>
-          <p:cNvPr id="23" name="Rectángulo 22"/>
-          <p:cNvSpPr/>
-          <p:nvPr/>
-        </p:nvSpPr>
-        <p:spPr>
-          <a:xfrm>
-            <a:off x="171430" y="6017968"/>
-            <a:ext cx="2610904" cy="646331"/>
-          </a:xfrm>
-          <a:prstGeom prst="rect">
-            <a:avLst/>
-          </a:prstGeom>
-        </p:spPr>
-        <p:txBody>
-          <a:bodyPr wrap="square">
-            <a:spAutoFit/>
-          </a:bodyPr>
-          <a:lstStyle/>
-          <a:p>
-            <a:pPr algn="ctr"/>
-            <a:r>
-              <a:rPr lang="es-ES" spc="-20" dirty="0" smtClean="0">
-                <a:ea typeface="Calibri" panose="020F0502020204030204" pitchFamily="34" charset="0"/>
-                <a:cs typeface="Times New Roman" panose="02020603050405020304" pitchFamily="18" charset="0"/>
-              </a:rPr>
-              <a:t>Lenguajes de programación examinados</a:t>
-            </a:r>
-            <a:endParaRPr lang="es-ES" dirty="0">
-              <a:cs typeface="Times New Roman" panose="02020603050405020304" pitchFamily="18" charset="0"/>
-            </a:endParaRPr>
-          </a:p>
-        </p:txBody>
-      </p:sp>
-      <p:pic>
-        <p:nvPicPr>
-          <p:cNvPr id="2" name="Imagen 1"/>
-          <p:cNvPicPr>
-            <a:picLocks noChangeAspect="1"/>
-          </p:cNvPicPr>
-          <p:nvPr/>
-        </p:nvPicPr>
-        <p:blipFill>
-          <a:blip r:embed="rId4" cstate="print">
-            <a:extLst>
-              <a:ext uri="{28A0092B-C50C-407E-A947-70E740481C1C}">
-                <a14:useLocalDpi xmlns:a14="http://schemas.microsoft.com/office/drawing/2010/main" val="0"/>
-              </a:ext>
-            </a:extLst>
-          </a:blip>
-          <a:stretch>
-            <a:fillRect/>
-          </a:stretch>
-        </p:blipFill>
-        <p:spPr>
-          <a:xfrm>
-            <a:off x="879282" y="4802448"/>
-            <a:ext cx="1195200" cy="1195200"/>
-          </a:xfrm>
-          <a:prstGeom prst="rect">
-            <a:avLst/>
-          </a:prstGeom>
-        </p:spPr>
-      </p:pic>
-      <p:pic>
-        <p:nvPicPr>
-          <p:cNvPr id="3" name="Imagen 2"/>
-          <p:cNvPicPr>
-            <a:picLocks noChangeAspect="1"/>
-          </p:cNvPicPr>
-          <p:nvPr/>
-        </p:nvPicPr>
-        <p:blipFill>
-          <a:blip r:embed="rId5" cstate="print">
-            <a:extLst>
-              <a:ext uri="{28A0092B-C50C-407E-A947-70E740481C1C}">
-                <a14:useLocalDpi xmlns:a14="http://schemas.microsoft.com/office/drawing/2010/main" val="0"/>
-              </a:ext>
-            </a:extLst>
-          </a:blip>
-          <a:stretch>
-            <a:fillRect/>
-          </a:stretch>
-        </p:blipFill>
-        <p:spPr>
-          <a:xfrm>
-            <a:off x="6585908" y="4727258"/>
-            <a:ext cx="1786922" cy="1195200"/>
-          </a:xfrm>
-          <a:prstGeom prst="rect">
-            <a:avLst/>
-          </a:prstGeom>
-        </p:spPr>
-      </p:pic>
-      <p:pic>
-        <p:nvPicPr>
-          <p:cNvPr id="7" name="Imagen 6"/>
-          <p:cNvPicPr>
-            <a:picLocks noChangeAspect="1"/>
-          </p:cNvPicPr>
-          <p:nvPr/>
-        </p:nvPicPr>
-        <p:blipFill>
-          <a:blip r:embed="rId6" cstate="print">
-            <a:extLst>
-              <a:ext uri="{28A0092B-C50C-407E-A947-70E740481C1C}">
-                <a14:useLocalDpi xmlns:a14="http://schemas.microsoft.com/office/drawing/2010/main" val="0"/>
-              </a:ext>
-            </a:extLst>
-          </a:blip>
-          <a:stretch>
-            <a:fillRect/>
-          </a:stretch>
-        </p:blipFill>
-        <p:spPr>
-          <a:xfrm>
-            <a:off x="6641322" y="1813444"/>
-            <a:ext cx="1676093" cy="1310400"/>
-          </a:xfrm>
-          <a:prstGeom prst="ellipse">
-            <a:avLst/>
-          </a:prstGeom>
-          <a:ln w="63500" cap="rnd">
-            <a:noFill/>
-          </a:ln>
-          <a:effectLst>
-            <a:outerShdw blurRad="381000" dist="292100" dir="5400000" sx="-80000" sy="-18000" rotWithShape="0">
-              <a:srgbClr val="000000">
-                <a:alpha val="22000"/>
-              </a:srgbClr>
-            </a:outerShdw>
-          </a:effectLst>
-          <a:scene3d>
-            <a:camera prst="orthographicFront"/>
-            <a:lightRig rig="contrasting" dir="t">
-              <a:rot lat="0" lon="0" rev="3000000"/>
-            </a:lightRig>
-          </a:scene3d>
-          <a:sp3d contourW="7620">
-            <a:bevelT w="95250" h="31750"/>
-            <a:contourClr>
-              <a:srgbClr val="333333"/>
-            </a:contourClr>
-          </a:sp3d>
-        </p:spPr>
-      </p:pic>
-      <p:pic>
-        <p:nvPicPr>
-          <p:cNvPr id="10" name="Imagen 9"/>
-          <p:cNvPicPr>
-            <a:picLocks noChangeAspect="1"/>
-          </p:cNvPicPr>
-          <p:nvPr/>
-        </p:nvPicPr>
-        <p:blipFill>
-          <a:blip r:embed="rId7" cstate="print">
-            <a:extLst>
-              <a:ext uri="{28A0092B-C50C-407E-A947-70E740481C1C}">
-                <a14:useLocalDpi xmlns:a14="http://schemas.microsoft.com/office/drawing/2010/main" val="0"/>
-              </a:ext>
-            </a:extLst>
-          </a:blip>
-          <a:stretch>
-            <a:fillRect/>
-          </a:stretch>
-        </p:blipFill>
-        <p:spPr>
-          <a:xfrm>
-            <a:off x="3888500" y="2380225"/>
-            <a:ext cx="1308899" cy="1308899"/>
-          </a:xfrm>
-          <a:prstGeom prst="rect">
-            <a:avLst/>
-          </a:prstGeom>
-        </p:spPr>
-      </p:pic>
-      <p:pic>
-        <p:nvPicPr>
-          <p:cNvPr id="11" name="Imagen 10"/>
-          <p:cNvPicPr>
-            <a:picLocks noChangeAspect="1"/>
-          </p:cNvPicPr>
-          <p:nvPr/>
-        </p:nvPicPr>
-        <p:blipFill>
-          <a:blip r:embed="rId8" cstate="print">
-            <a:extLst>
-              <a:ext uri="{28A0092B-C50C-407E-A947-70E740481C1C}">
-                <a14:useLocalDpi xmlns:a14="http://schemas.microsoft.com/office/drawing/2010/main" val="0"/>
-              </a:ext>
-            </a:extLst>
-          </a:blip>
-          <a:stretch>
-            <a:fillRect/>
-          </a:stretch>
-        </p:blipFill>
-        <p:spPr>
-          <a:xfrm>
-            <a:off x="1002976" y="1813444"/>
-            <a:ext cx="1313565" cy="1310400"/>
-          </a:xfrm>
-          <a:prstGeom prst="rect">
-            <a:avLst/>
-          </a:prstGeom>
-        </p:spPr>
-      </p:pic>
-    </p:spTree>
-    <p:extLst>
-      <p:ext uri="{BB962C8B-B14F-4D97-AF65-F5344CB8AC3E}">
-        <p14:creationId xmlns:p14="http://schemas.microsoft.com/office/powerpoint/2010/main" val="3053281417"/>
-      </p:ext>
-    </p:extLst>
-  </p:cSld>
-  <p:clrMapOvr>
-    <a:masterClrMapping/>
-  </p:clrMapOvr>
-  <p:timing>
-    <p:tnLst>
-      <p:par>
-        <p:cTn id="1" dur="indefinite" restart="never" nodeType="tmRoot"/>
-      </p:par>
-    </p:tnLst>
-  </p:timing>
-</p:sld>
-</file>
-
-<file path=ppt/slides/slide24.xml><?xml version="1.0" encoding="utf-8"?>
-<p:sld xmlns:a="http://schemas.openxmlformats.org/drawingml/2006/main" xmlns:r="http://schemas.openxmlformats.org/officeDocument/2006/relationships" xmlns:p="http://schemas.openxmlformats.org/presentationml/2006/main">
-  <p:cSld>
-    <p:spTree>
-      <p:nvGrpSpPr>
-        <p:cNvPr id="1" name=""/>
-        <p:cNvGrpSpPr/>
-        <p:nvPr/>
-      </p:nvGrpSpPr>
-      <p:grpSpPr>
-        <a:xfrm>
-          <a:off x="0" y="0"/>
-          <a:ext cx="0" cy="0"/>
-          <a:chOff x="0" y="0"/>
-          <a:chExt cx="0" cy="0"/>
-        </a:xfrm>
-      </p:grpSpPr>
-      <p:sp>
-        <p:nvSpPr>
-          <p:cNvPr id="36" name="Rectángulo 35"/>
-          <p:cNvSpPr/>
-          <p:nvPr/>
-        </p:nvSpPr>
-        <p:spPr>
-          <a:xfrm>
-            <a:off x="-19977" y="0"/>
-            <a:ext cx="9163977" cy="836400"/>
-          </a:xfrm>
-          <a:prstGeom prst="rect">
-            <a:avLst/>
-          </a:prstGeom>
-          <a:solidFill>
-            <a:srgbClr val="002F7D">
-              <a:alpha val="75000"/>
-            </a:srgbClr>
-          </a:solidFill>
-          <a:ln>
-            <a:solidFill>
-              <a:srgbClr val="002F7D">
-                <a:alpha val="75000"/>
-              </a:srgbClr>
-            </a:solidFill>
-          </a:ln>
-        </p:spPr>
-        <p:style>
-          <a:lnRef idx="2">
-            <a:schemeClr val="accent1">
-              <a:shade val="50000"/>
-            </a:schemeClr>
-          </a:lnRef>
-          <a:fillRef idx="1">
-            <a:schemeClr val="accent1"/>
-          </a:fillRef>
-          <a:effectRef idx="0">
-            <a:schemeClr val="accent1"/>
-          </a:effectRef>
-          <a:fontRef idx="minor">
-            <a:schemeClr val="lt1"/>
-          </a:fontRef>
-        </p:style>
-        <p:txBody>
-          <a:bodyPr rtlCol="0" anchor="ctr"/>
-          <a:lstStyle/>
-          <a:p>
-            <a:pPr algn="ctr"/>
-            <a:endParaRPr lang="es-ES"/>
-          </a:p>
-        </p:txBody>
-      </p:sp>
-      <p:sp>
-        <p:nvSpPr>
-          <p:cNvPr id="25" name="Shape 102"/>
-          <p:cNvSpPr/>
-          <p:nvPr/>
-        </p:nvSpPr>
-        <p:spPr>
-          <a:xfrm>
-            <a:off x="0" y="825219"/>
-            <a:ext cx="9144000" cy="720000"/>
-          </a:xfrm>
-          <a:prstGeom prst="rect">
-            <a:avLst/>
-          </a:prstGeom>
-          <a:solidFill>
-            <a:srgbClr val="424242"/>
-          </a:solidFill>
-          <a:ln w="12700">
-            <a:miter lim="400000"/>
-          </a:ln>
-        </p:spPr>
-        <p:txBody>
-          <a:bodyPr lIns="0" tIns="0" rIns="0" bIns="0" anchor="ctr"/>
-          <a:lstStyle/>
-          <a:p>
-            <a:pPr lvl="0">
-              <a:defRPr sz="2400">
-                <a:solidFill>
-                  <a:srgbClr val="FFFFFF"/>
-                </a:solidFill>
-              </a:defRPr>
-            </a:pPr>
-            <a:endParaRPr sz="3200"/>
-          </a:p>
-        </p:txBody>
-      </p:sp>
-      <p:sp>
-        <p:nvSpPr>
-          <p:cNvPr id="27" name="Shape 63"/>
-          <p:cNvSpPr txBox="1"/>
-          <p:nvPr/>
-        </p:nvSpPr>
-        <p:spPr>
-          <a:xfrm>
-            <a:off x="1543977" y="186901"/>
-            <a:ext cx="7521300" cy="453600"/>
-          </a:xfrm>
-          <a:prstGeom prst="rect">
-            <a:avLst/>
-          </a:prstGeom>
-          <a:noFill/>
-          <a:ln>
-            <a:noFill/>
-          </a:ln>
-        </p:spPr>
-        <p:txBody>
-          <a:bodyPr lIns="91425" tIns="91425" rIns="91425" bIns="91425" anchor="ctr" anchorCtr="0">
-            <a:noAutofit/>
-          </a:bodyPr>
-          <a:lstStyle/>
-          <a:p>
-            <a:pPr>
-              <a:spcBef>
-                <a:spcPts val="600"/>
-              </a:spcBef>
-            </a:pPr>
-            <a:r>
-              <a:rPr lang="en" sz="2400" b="1" dirty="0" smtClean="0">
-                <a:solidFill>
-                  <a:srgbClr val="FFFFFF"/>
-                </a:solidFill>
-                <a:latin typeface="Century Gothic" panose="020B0502020202020204" pitchFamily="34" charset="0"/>
-                <a:ea typeface="Quicksand"/>
-                <a:cs typeface="Quicksand"/>
-                <a:sym typeface="Quicksand"/>
-              </a:rPr>
-              <a:t>GitHub</a:t>
-            </a:r>
-            <a:endParaRPr lang="en" sz="2400" b="1" dirty="0">
-              <a:solidFill>
-                <a:srgbClr val="FFFFFF"/>
-              </a:solidFill>
-              <a:latin typeface="Century Gothic" panose="020B0502020202020204" pitchFamily="34" charset="0"/>
-              <a:ea typeface="Quicksand"/>
-              <a:cs typeface="Quicksand"/>
-              <a:sym typeface="Quicksand"/>
-            </a:endParaRPr>
-          </a:p>
-        </p:txBody>
-      </p:sp>
-      <p:sp>
-        <p:nvSpPr>
-          <p:cNvPr id="28" name="Shape 33"/>
-          <p:cNvSpPr/>
-          <p:nvPr/>
-        </p:nvSpPr>
-        <p:spPr>
-          <a:xfrm>
-            <a:off x="385555" y="146927"/>
-            <a:ext cx="532267" cy="532267"/>
-          </a:xfrm>
-          <a:prstGeom prst="ellipse">
-            <a:avLst/>
-          </a:prstGeom>
-          <a:solidFill>
-            <a:schemeClr val="bg1"/>
-          </a:solidFill>
-          <a:ln w="9525" cap="flat" cmpd="sng">
-            <a:solidFill>
-              <a:srgbClr val="999FA9"/>
-            </a:solidFill>
-            <a:prstDash val="solid"/>
-            <a:round/>
-            <a:headEnd type="none" w="med" len="med"/>
-            <a:tailEnd type="none" w="med" len="med"/>
-          </a:ln>
-        </p:spPr>
-        <p:txBody>
-          <a:bodyPr lIns="91425" tIns="91425" rIns="91425" bIns="91425" anchor="ctr" anchorCtr="0">
-            <a:noAutofit/>
-          </a:bodyPr>
-          <a:lstStyle/>
-          <a:p>
-            <a:endParaRPr/>
-          </a:p>
-        </p:txBody>
-      </p:sp>
-      <p:sp>
-        <p:nvSpPr>
-          <p:cNvPr id="29" name="CuadroTexto 28"/>
-          <p:cNvSpPr txBox="1"/>
-          <p:nvPr/>
-        </p:nvSpPr>
-        <p:spPr>
-          <a:xfrm>
-            <a:off x="494432" y="228391"/>
-            <a:ext cx="314510" cy="369332"/>
-          </a:xfrm>
-          <a:prstGeom prst="rect">
-            <a:avLst/>
-          </a:prstGeom>
-          <a:noFill/>
-        </p:spPr>
-        <p:txBody>
-          <a:bodyPr wrap="none" rtlCol="0" anchor="ctr">
-            <a:spAutoFit/>
-          </a:bodyPr>
-          <a:lstStyle/>
-          <a:p>
-            <a:pPr algn="ctr"/>
-            <a:r>
               <a:rPr lang="es-ES" b="1" dirty="0" smtClean="0">
                 <a:latin typeface="Century Gothic" panose="020B0502020202020204" pitchFamily="34" charset="0"/>
               </a:rPr>
@@ -13709,63 +13401,9 @@
           </a:p>
         </p:txBody>
       </p:sp>
-      <p:sp>
-        <p:nvSpPr>
-          <p:cNvPr id="30" name="Shape 63"/>
-          <p:cNvSpPr txBox="1"/>
-          <p:nvPr/>
-        </p:nvSpPr>
-        <p:spPr>
-          <a:xfrm>
-            <a:off x="801361" y="961787"/>
-            <a:ext cx="7521300" cy="452312"/>
-          </a:xfrm>
-          <a:prstGeom prst="rect">
-            <a:avLst/>
-          </a:prstGeom>
-          <a:noFill/>
-          <a:ln>
-            <a:noFill/>
-          </a:ln>
-        </p:spPr>
-        <p:txBody>
-          <a:bodyPr lIns="91425" tIns="91425" rIns="91425" bIns="91425" anchor="ctr" anchorCtr="0">
-            <a:noAutofit/>
-          </a:bodyPr>
-          <a:lstStyle/>
-          <a:p>
-            <a:pPr algn="ctr">
-              <a:spcBef>
-                <a:spcPts val="600"/>
-              </a:spcBef>
-            </a:pPr>
-            <a:r>
-              <a:rPr lang="en" sz="2000" b="1" dirty="0" smtClean="0">
-                <a:solidFill>
-                  <a:srgbClr val="FFFFFF"/>
-                </a:solidFill>
-                <a:latin typeface="Century Gothic" panose="020B0502020202020204" pitchFamily="34" charset="0"/>
-                <a:ea typeface="Quicksand"/>
-                <a:cs typeface="Quicksand"/>
-                <a:sym typeface="Quicksand"/>
-              </a:rPr>
-              <a:t>Esto no acaba aquí</a:t>
-            </a:r>
-            <a:endParaRPr lang="en" sz="2000" b="1" dirty="0">
-              <a:solidFill>
-                <a:srgbClr val="FFFFFF"/>
-              </a:solidFill>
-              <a:latin typeface="Century Gothic" panose="020B0502020202020204" pitchFamily="34" charset="0"/>
-              <a:ea typeface="Quicksand"/>
-              <a:cs typeface="Quicksand"/>
-              <a:sym typeface="Quicksand"/>
-            </a:endParaRPr>
-          </a:p>
-        </p:txBody>
-      </p:sp>
       <p:pic>
         <p:nvPicPr>
-          <p:cNvPr id="5" name="Imagen 4"/>
+          <p:cNvPr id="2" name="Imagen 1"/>
           <p:cNvPicPr>
             <a:picLocks noChangeAspect="1"/>
           </p:cNvPicPr>
@@ -13785,14 +13423,104 @@
         </p:blipFill>
         <p:spPr>
           <a:xfrm>
-            <a:off x="0" y="1539487"/>
-            <a:ext cx="10408438" cy="5318514"/>
+            <a:off x="-525291" y="1549009"/>
+            <a:ext cx="9929067" cy="5318516"/>
           </a:xfrm>
           <a:prstGeom prst="rect">
             <a:avLst/>
           </a:prstGeom>
         </p:spPr>
       </p:pic>
+      <p:sp>
+        <p:nvSpPr>
+          <p:cNvPr id="25" name="Shape 102"/>
+          <p:cNvSpPr/>
+          <p:nvPr/>
+        </p:nvSpPr>
+        <p:spPr>
+          <a:xfrm>
+            <a:off x="0" y="825219"/>
+            <a:ext cx="9144000" cy="720000"/>
+          </a:xfrm>
+          <a:prstGeom prst="rect">
+            <a:avLst/>
+          </a:prstGeom>
+          <a:solidFill>
+            <a:srgbClr val="424242"/>
+          </a:solidFill>
+          <a:ln w="12700">
+            <a:miter lim="400000"/>
+          </a:ln>
+        </p:spPr>
+        <p:txBody>
+          <a:bodyPr lIns="0" tIns="0" rIns="0" bIns="0" anchor="ctr"/>
+          <a:lstStyle/>
+          <a:p>
+            <a:pPr lvl="0">
+              <a:defRPr sz="2400">
+                <a:solidFill>
+                  <a:srgbClr val="FFFFFF"/>
+                </a:solidFill>
+              </a:defRPr>
+            </a:pPr>
+            <a:endParaRPr sz="3200"/>
+          </a:p>
+        </p:txBody>
+      </p:sp>
+      <p:sp>
+        <p:nvSpPr>
+          <p:cNvPr id="30" name="Shape 63"/>
+          <p:cNvSpPr txBox="1"/>
+          <p:nvPr/>
+        </p:nvSpPr>
+        <p:spPr>
+          <a:xfrm>
+            <a:off x="801361" y="961787"/>
+            <a:ext cx="7521300" cy="452312"/>
+          </a:xfrm>
+          <a:prstGeom prst="rect">
+            <a:avLst/>
+          </a:prstGeom>
+          <a:noFill/>
+          <a:ln>
+            <a:noFill/>
+          </a:ln>
+        </p:spPr>
+        <p:txBody>
+          <a:bodyPr lIns="91425" tIns="91425" rIns="91425" bIns="91425" anchor="ctr" anchorCtr="0">
+            <a:noAutofit/>
+          </a:bodyPr>
+          <a:lstStyle/>
+          <a:p>
+            <a:pPr algn="ctr">
+              <a:spcBef>
+                <a:spcPts val="600"/>
+              </a:spcBef>
+            </a:pPr>
+            <a:r>
+              <a:rPr lang="en" sz="2000" b="1" dirty="0" smtClean="0">
+                <a:solidFill>
+                  <a:srgbClr val="FFFFFF"/>
+                </a:solidFill>
+                <a:latin typeface="Century Gothic" panose="020B0502020202020204" pitchFamily="34" charset="0"/>
+                <a:ea typeface="Quicksand"/>
+                <a:cs typeface="Quicksand"/>
+                <a:sym typeface="Quicksand"/>
+              </a:rPr>
+              <a:t>Y ahora… ¿Cómo colaboro?</a:t>
+            </a:r>
+            <a:endParaRPr lang="en" sz="2000" b="1" dirty="0">
+              <a:solidFill>
+                <a:srgbClr val="FFFFFF"/>
+              </a:solidFill>
+              <a:latin typeface="Century Gothic" panose="020B0502020202020204" pitchFamily="34" charset="0"/>
+              <a:ea typeface="Quicksand"/>
+              <a:cs typeface="Quicksand"/>
+              <a:sym typeface="Quicksand"/>
+            </a:endParaRPr>
+          </a:p>
+        </p:txBody>
+      </p:sp>
     </p:spTree>
     <p:extLst>
       <p:ext uri="{BB962C8B-B14F-4D97-AF65-F5344CB8AC3E}">
@@ -13813,7 +13541,7 @@
 </p:sld>
 </file>
 
-<file path=ppt/slides/slide25.xml><?xml version="1.0" encoding="utf-8"?>
+<file path=ppt/slides/slide24.xml><?xml version="1.0" encoding="utf-8"?>
 <p:sld xmlns:a="http://schemas.openxmlformats.org/drawingml/2006/main" xmlns:r="http://schemas.openxmlformats.org/officeDocument/2006/relationships" xmlns:p="http://schemas.openxmlformats.org/presentationml/2006/main">
   <p:cSld>
     <p:spTree>
@@ -14159,7 +13887,7 @@
           <a:graphicData uri="http://schemas.openxmlformats.org/presentationml/2006/ole">
             <mc:AlternateContent xmlns:mc="http://schemas.openxmlformats.org/markup-compatibility/2006">
               <mc:Choice xmlns:v="urn:schemas-microsoft-com:vml" Requires="v">
-                <p:oleObj spid="_x0000_s2120" name="Acrobat Document" r:id="rId5" imgW="1904818" imgH="1904835" progId="AcroExch.Document.DC">
+                <p:oleObj spid="_x0000_s2146" name="Acrobat Document" r:id="rId5" imgW="1904818" imgH="1904835" progId="AcroExch.Document.DC">
                   <p:embed/>
                 </p:oleObj>
               </mc:Choice>
@@ -15276,14 +15004,12 @@
       <p:cxnSp>
         <p:nvCxnSpPr>
           <p:cNvPr id="13" name="Conector recto de flecha 12"/>
-          <p:cNvCxnSpPr>
-            <a:endCxn id="9" idx="0"/>
-          </p:cNvCxnSpPr>
+          <p:cNvCxnSpPr/>
           <p:nvPr/>
         </p:nvCxnSpPr>
         <p:spPr>
           <a:xfrm>
-            <a:off x="4556234" y="2257293"/>
+            <a:off x="4556234" y="2276343"/>
             <a:ext cx="5777" cy="1193315"/>
           </a:xfrm>
           <a:prstGeom prst="straightConnector1">
@@ -16655,36 +16381,6 @@
           <a:chExt cx="0" cy="0"/>
         </a:xfrm>
       </p:grpSpPr>
-      <p:pic>
-        <p:nvPicPr>
-          <p:cNvPr id="16" name="Imagen 15"/>
-          <p:cNvPicPr>
-            <a:picLocks noChangeAspect="1"/>
-          </p:cNvPicPr>
-          <p:nvPr/>
-        </p:nvPicPr>
-        <p:blipFill>
-          <a:blip r:embed="rId3">
-            <a:extLst>
-              <a:ext uri="{28A0092B-C50C-407E-A947-70E740481C1C}">
-                <a14:useLocalDpi xmlns:a14="http://schemas.microsoft.com/office/drawing/2010/main" val="0"/>
-              </a:ext>
-            </a:extLst>
-          </a:blip>
-          <a:stretch>
-            <a:fillRect/>
-          </a:stretch>
-        </p:blipFill>
-        <p:spPr>
-          <a:xfrm>
-            <a:off x="2361061" y="4108237"/>
-            <a:ext cx="6538986" cy="2618307"/>
-          </a:xfrm>
-          <a:prstGeom prst="rect">
-            <a:avLst/>
-          </a:prstGeom>
-        </p:spPr>
-      </p:pic>
       <p:sp>
         <p:nvSpPr>
           <p:cNvPr id="15" name="Rectángulo 14"/>
@@ -16872,7 +16568,7 @@
           <p:nvPr/>
         </p:nvPicPr>
         <p:blipFill>
-          <a:blip r:embed="rId4">
+          <a:blip r:embed="rId3">
             <a:extLst>
               <a:ext uri="{28A0092B-C50C-407E-A947-70E740481C1C}">
                 <a14:useLocalDpi xmlns:a14="http://schemas.microsoft.com/office/drawing/2010/main" val="0"/>
@@ -16885,7 +16581,7 @@
         </p:blipFill>
         <p:spPr>
           <a:xfrm>
-            <a:off x="4404023" y="2644331"/>
+            <a:off x="4001857" y="2763379"/>
             <a:ext cx="966123" cy="1288165"/>
           </a:xfrm>
           <a:prstGeom prst="rect">
@@ -16902,7 +16598,7 @@
           <p:nvPr/>
         </p:nvPicPr>
         <p:blipFill>
-          <a:blip r:embed="rId5" cstate="print">
+          <a:blip r:embed="rId4" cstate="print">
             <a:extLst>
               <a:ext uri="{28A0092B-C50C-407E-A947-70E740481C1C}">
                 <a14:useLocalDpi xmlns:a14="http://schemas.microsoft.com/office/drawing/2010/main" val="0"/>
@@ -16915,7 +16611,7 @@
         </p:blipFill>
         <p:spPr>
           <a:xfrm>
-            <a:off x="6392731" y="2632321"/>
+            <a:off x="7527061" y="2780755"/>
             <a:ext cx="1291558" cy="1283199"/>
           </a:xfrm>
           <a:prstGeom prst="rect">
@@ -16926,6 +16622,36 @@
       <p:pic>
         <p:nvPicPr>
           <p:cNvPr id="8" name="Imagen 7"/>
+          <p:cNvPicPr>
+            <a:picLocks noChangeAspect="1"/>
+          </p:cNvPicPr>
+          <p:nvPr/>
+        </p:nvPicPr>
+        <p:blipFill>
+          <a:blip r:embed="rId5">
+            <a:extLst>
+              <a:ext uri="{28A0092B-C50C-407E-A947-70E740481C1C}">
+                <a14:useLocalDpi xmlns:a14="http://schemas.microsoft.com/office/drawing/2010/main" val="0"/>
+              </a:ext>
+            </a:extLst>
+          </a:blip>
+          <a:stretch>
+            <a:fillRect/>
+          </a:stretch>
+        </p:blipFill>
+        <p:spPr>
+          <a:xfrm>
+            <a:off x="6679594" y="957223"/>
+            <a:ext cx="1493246" cy="1493246"/>
+          </a:xfrm>
+          <a:prstGeom prst="rect">
+            <a:avLst/>
+          </a:prstGeom>
+        </p:spPr>
+      </p:pic>
+      <p:pic>
+        <p:nvPicPr>
+          <p:cNvPr id="9" name="Imagen 8"/>
           <p:cNvPicPr>
             <a:picLocks noChangeAspect="1"/>
           </p:cNvPicPr>
@@ -16945,8 +16671,8 @@
         </p:blipFill>
         <p:spPr>
           <a:xfrm>
-            <a:off x="7226241" y="1152852"/>
-            <a:ext cx="1493246" cy="1493246"/>
+            <a:off x="5414971" y="2414156"/>
+            <a:ext cx="1827817" cy="1049064"/>
           </a:xfrm>
           <a:prstGeom prst="rect">
             <a:avLst/>
@@ -16955,14 +16681,14 @@
       </p:pic>
       <p:pic>
         <p:nvPicPr>
-          <p:cNvPr id="9" name="Imagen 8"/>
+          <p:cNvPr id="11" name="Imagen 10"/>
           <p:cNvPicPr>
             <a:picLocks noChangeAspect="1"/>
           </p:cNvPicPr>
           <p:nvPr/>
         </p:nvPicPr>
         <p:blipFill>
-          <a:blip r:embed="rId7">
+          <a:blip r:embed="rId7" cstate="print">
             <a:extLst>
               <a:ext uri="{28A0092B-C50C-407E-A947-70E740481C1C}">
                 <a14:useLocalDpi xmlns:a14="http://schemas.microsoft.com/office/drawing/2010/main" val="0"/>
@@ -16975,24 +16701,215 @@
         </p:blipFill>
         <p:spPr>
           <a:xfrm>
-            <a:off x="5075356" y="1374943"/>
-            <a:ext cx="1827817" cy="1049064"/>
+            <a:off x="4273139" y="1074926"/>
+            <a:ext cx="1705026" cy="1449927"/>
           </a:xfrm>
           <a:prstGeom prst="rect">
             <a:avLst/>
           </a:prstGeom>
         </p:spPr>
       </p:pic>
+      <p:sp>
+        <p:nvSpPr>
+          <p:cNvPr id="20" name="CuadroTexto 19"/>
+          <p:cNvSpPr txBox="1"/>
+          <p:nvPr/>
+        </p:nvSpPr>
+        <p:spPr>
+          <a:xfrm>
+            <a:off x="494432" y="1177751"/>
+            <a:ext cx="2330655" cy="3970318"/>
+          </a:xfrm>
+          <a:prstGeom prst="rect">
+            <a:avLst/>
+          </a:prstGeom>
+          <a:noFill/>
+        </p:spPr>
+        <p:txBody>
+          <a:bodyPr wrap="square" rtlCol="0">
+            <a:spAutoFit/>
+          </a:bodyPr>
+          <a:lstStyle/>
+          <a:p>
+            <a:pPr marL="285750" indent="-285750">
+              <a:lnSpc>
+                <a:spcPct val="200000"/>
+              </a:lnSpc>
+              <a:buFont typeface="Arial" panose="020B0604020202020204" pitchFamily="34" charset="0"/>
+              <a:buChar char="•"/>
+            </a:pPr>
+            <a:r>
+              <a:rPr lang="es-ES" b="1" dirty="0" err="1" smtClean="0">
+                <a:latin typeface="Century Gothic" panose="020B0502020202020204" pitchFamily="34" charset="0"/>
+              </a:rPr>
+              <a:t>Git</a:t>
+            </a:r>
+            <a:r>
+              <a:rPr lang="es-ES" b="1" dirty="0" smtClean="0">
+                <a:latin typeface="Century Gothic" panose="020B0502020202020204" pitchFamily="34" charset="0"/>
+              </a:rPr>
+              <a:t> y </a:t>
+            </a:r>
+            <a:r>
+              <a:rPr lang="es-ES" b="1" dirty="0" err="1" smtClean="0">
+                <a:latin typeface="Century Gothic" panose="020B0502020202020204" pitchFamily="34" charset="0"/>
+              </a:rPr>
+              <a:t>GitHub</a:t>
+            </a:r>
+            <a:r>
+              <a:rPr lang="es-ES" b="1" dirty="0" smtClean="0">
+                <a:latin typeface="Century Gothic" panose="020B0502020202020204" pitchFamily="34" charset="0"/>
+              </a:rPr>
+              <a:t>.</a:t>
+            </a:r>
+          </a:p>
+          <a:p>
+            <a:pPr marL="285750" indent="-285750">
+              <a:lnSpc>
+                <a:spcPct val="200000"/>
+              </a:lnSpc>
+              <a:buFont typeface="Arial" panose="020B0604020202020204" pitchFamily="34" charset="0"/>
+              <a:buChar char="•"/>
+            </a:pPr>
+            <a:r>
+              <a:rPr lang="es-ES" b="1" dirty="0" err="1" smtClean="0">
+                <a:latin typeface="Century Gothic" panose="020B0502020202020204" pitchFamily="34" charset="0"/>
+              </a:rPr>
+              <a:t>Bundler</a:t>
+            </a:r>
+            <a:r>
+              <a:rPr lang="es-ES" b="1" dirty="0" smtClean="0">
+                <a:latin typeface="Century Gothic" panose="020B0502020202020204" pitchFamily="34" charset="0"/>
+              </a:rPr>
+              <a:t> </a:t>
+            </a:r>
+            <a:r>
+              <a:rPr lang="es-ES" b="1" dirty="0" err="1" smtClean="0">
+                <a:latin typeface="Century Gothic" panose="020B0502020202020204" pitchFamily="34" charset="0"/>
+              </a:rPr>
+              <a:t>Audit</a:t>
+            </a:r>
+            <a:r>
+              <a:rPr lang="es-ES" b="1" dirty="0" smtClean="0">
+                <a:latin typeface="Century Gothic" panose="020B0502020202020204" pitchFamily="34" charset="0"/>
+              </a:rPr>
+              <a:t>.</a:t>
+            </a:r>
+          </a:p>
+          <a:p>
+            <a:pPr marL="285750" indent="-285750">
+              <a:lnSpc>
+                <a:spcPct val="200000"/>
+              </a:lnSpc>
+              <a:buFont typeface="Arial" panose="020B0604020202020204" pitchFamily="34" charset="0"/>
+              <a:buChar char="•"/>
+            </a:pPr>
+            <a:r>
+              <a:rPr lang="es-ES" b="1" dirty="0" smtClean="0">
+                <a:latin typeface="Century Gothic" panose="020B0502020202020204" pitchFamily="34" charset="0"/>
+              </a:rPr>
+              <a:t>NSP.</a:t>
+            </a:r>
+          </a:p>
+          <a:p>
+            <a:pPr marL="285750" indent="-285750">
+              <a:lnSpc>
+                <a:spcPct val="200000"/>
+              </a:lnSpc>
+              <a:buFont typeface="Arial" panose="020B0604020202020204" pitchFamily="34" charset="0"/>
+              <a:buChar char="•"/>
+            </a:pPr>
+            <a:r>
+              <a:rPr lang="es-ES" b="1" dirty="0" err="1" smtClean="0">
+                <a:latin typeface="Century Gothic" panose="020B0502020202020204" pitchFamily="34" charset="0"/>
+              </a:rPr>
+              <a:t>Docker</a:t>
+            </a:r>
+            <a:r>
+              <a:rPr lang="es-ES" b="1" dirty="0" smtClean="0">
+                <a:latin typeface="Century Gothic" panose="020B0502020202020204" pitchFamily="34" charset="0"/>
+              </a:rPr>
+              <a:t>.</a:t>
+            </a:r>
+          </a:p>
+          <a:p>
+            <a:pPr marL="285750" indent="-285750">
+              <a:lnSpc>
+                <a:spcPct val="200000"/>
+              </a:lnSpc>
+              <a:buFont typeface="Arial" panose="020B0604020202020204" pitchFamily="34" charset="0"/>
+              <a:buChar char="•"/>
+            </a:pPr>
+            <a:r>
+              <a:rPr lang="es-ES" b="1" dirty="0" smtClean="0">
+                <a:latin typeface="Century Gothic" panose="020B0502020202020204" pitchFamily="34" charset="0"/>
+              </a:rPr>
+              <a:t>Clair y </a:t>
+            </a:r>
+            <a:r>
+              <a:rPr lang="es-ES" b="1" dirty="0" err="1" smtClean="0">
+                <a:latin typeface="Century Gothic" panose="020B0502020202020204" pitchFamily="34" charset="0"/>
+              </a:rPr>
+              <a:t>Clairctl</a:t>
+            </a:r>
+            <a:r>
+              <a:rPr lang="es-ES" b="1" dirty="0" smtClean="0">
+                <a:latin typeface="Century Gothic" panose="020B0502020202020204" pitchFamily="34" charset="0"/>
+              </a:rPr>
+              <a:t>.</a:t>
+            </a:r>
+          </a:p>
+          <a:p>
+            <a:pPr marL="285750" indent="-285750">
+              <a:lnSpc>
+                <a:spcPct val="200000"/>
+              </a:lnSpc>
+              <a:buFont typeface="Arial" panose="020B0604020202020204" pitchFamily="34" charset="0"/>
+              <a:buChar char="•"/>
+            </a:pPr>
+            <a:r>
+              <a:rPr lang="es-ES" b="1" dirty="0" smtClean="0">
+                <a:latin typeface="Century Gothic" panose="020B0502020202020204" pitchFamily="34" charset="0"/>
+              </a:rPr>
+              <a:t>Jenkins.</a:t>
+            </a:r>
+          </a:p>
+          <a:p>
+            <a:pPr marL="285750" indent="-285750">
+              <a:lnSpc>
+                <a:spcPct val="200000"/>
+              </a:lnSpc>
+              <a:buFont typeface="Arial" panose="020B0604020202020204" pitchFamily="34" charset="0"/>
+              <a:buChar char="•"/>
+            </a:pPr>
+            <a:r>
+              <a:rPr lang="es-ES" b="1" dirty="0" err="1" smtClean="0">
+                <a:latin typeface="Century Gothic" panose="020B0502020202020204" pitchFamily="34" charset="0"/>
+              </a:rPr>
+              <a:t>Slack</a:t>
+            </a:r>
+            <a:r>
+              <a:rPr lang="es-ES" b="1" dirty="0" smtClean="0">
+                <a:latin typeface="Century Gothic" panose="020B0502020202020204" pitchFamily="34" charset="0"/>
+              </a:rPr>
+              <a:t>.</a:t>
+            </a:r>
+            <a:endParaRPr lang="es-ES" b="1" dirty="0">
+              <a:latin typeface="Century Gothic" panose="020B0502020202020204" pitchFamily="34" charset="0"/>
+            </a:endParaRPr>
+          </a:p>
+        </p:txBody>
+      </p:sp>
       <p:pic>
         <p:nvPicPr>
-          <p:cNvPr id="11" name="Imagen 10"/>
+          <p:cNvPr id="13" name="Imagen 12"/>
           <p:cNvPicPr>
             <a:picLocks noChangeAspect="1"/>
           </p:cNvPicPr>
           <p:nvPr/>
         </p:nvPicPr>
         <p:blipFill>
-          <a:blip r:embed="rId8" cstate="print">
+          <a:blip r:embed="rId8">
             <a:extLst>
               <a:ext uri="{28A0092B-C50C-407E-A947-70E740481C1C}">
                 <a14:useLocalDpi xmlns:a14="http://schemas.microsoft.com/office/drawing/2010/main" val="0"/>
@@ -17005,205 +16922,14 @@
         </p:blipFill>
         <p:spPr>
           <a:xfrm>
-            <a:off x="3047262" y="1167294"/>
-            <a:ext cx="1705026" cy="1449927"/>
+            <a:off x="2390775" y="4091286"/>
+            <a:ext cx="6610350" cy="2646882"/>
           </a:xfrm>
           <a:prstGeom prst="rect">
             <a:avLst/>
           </a:prstGeom>
         </p:spPr>
       </p:pic>
-      <p:sp>
-        <p:nvSpPr>
-          <p:cNvPr id="20" name="CuadroTexto 19"/>
-          <p:cNvSpPr txBox="1"/>
-          <p:nvPr/>
-        </p:nvSpPr>
-        <p:spPr>
-          <a:xfrm>
-            <a:off x="494432" y="1177751"/>
-            <a:ext cx="2330655" cy="3970318"/>
-          </a:xfrm>
-          <a:prstGeom prst="rect">
-            <a:avLst/>
-          </a:prstGeom>
-          <a:noFill/>
-        </p:spPr>
-        <p:txBody>
-          <a:bodyPr wrap="square" rtlCol="0">
-            <a:spAutoFit/>
-          </a:bodyPr>
-          <a:lstStyle/>
-          <a:p>
-            <a:pPr marL="285750" indent="-285750">
-              <a:lnSpc>
-                <a:spcPct val="200000"/>
-              </a:lnSpc>
-              <a:buFont typeface="Arial" panose="020B0604020202020204" pitchFamily="34" charset="0"/>
-              <a:buChar char="•"/>
-            </a:pPr>
-            <a:r>
-              <a:rPr lang="es-ES" b="1" dirty="0" err="1" smtClean="0">
-                <a:latin typeface="Century Gothic" panose="020B0502020202020204" pitchFamily="34" charset="0"/>
-              </a:rPr>
-              <a:t>Git</a:t>
-            </a:r>
-            <a:r>
-              <a:rPr lang="es-ES" b="1" dirty="0" smtClean="0">
-                <a:latin typeface="Century Gothic" panose="020B0502020202020204" pitchFamily="34" charset="0"/>
-              </a:rPr>
-              <a:t> y </a:t>
-            </a:r>
-            <a:r>
-              <a:rPr lang="es-ES" b="1" dirty="0" err="1" smtClean="0">
-                <a:latin typeface="Century Gothic" panose="020B0502020202020204" pitchFamily="34" charset="0"/>
-              </a:rPr>
-              <a:t>GitHub</a:t>
-            </a:r>
-            <a:r>
-              <a:rPr lang="es-ES" b="1" dirty="0" smtClean="0">
-                <a:latin typeface="Century Gothic" panose="020B0502020202020204" pitchFamily="34" charset="0"/>
-              </a:rPr>
-              <a:t>.</a:t>
-            </a:r>
-          </a:p>
-          <a:p>
-            <a:pPr marL="285750" indent="-285750">
-              <a:lnSpc>
-                <a:spcPct val="200000"/>
-              </a:lnSpc>
-              <a:buFont typeface="Arial" panose="020B0604020202020204" pitchFamily="34" charset="0"/>
-              <a:buChar char="•"/>
-            </a:pPr>
-            <a:r>
-              <a:rPr lang="es-ES" b="1" dirty="0" err="1" smtClean="0">
-                <a:latin typeface="Century Gothic" panose="020B0502020202020204" pitchFamily="34" charset="0"/>
-              </a:rPr>
-              <a:t>Bundler</a:t>
-            </a:r>
-            <a:r>
-              <a:rPr lang="es-ES" b="1" dirty="0" smtClean="0">
-                <a:latin typeface="Century Gothic" panose="020B0502020202020204" pitchFamily="34" charset="0"/>
-              </a:rPr>
-              <a:t> </a:t>
-            </a:r>
-            <a:r>
-              <a:rPr lang="es-ES" b="1" dirty="0" err="1" smtClean="0">
-                <a:latin typeface="Century Gothic" panose="020B0502020202020204" pitchFamily="34" charset="0"/>
-              </a:rPr>
-              <a:t>Audit</a:t>
-            </a:r>
-            <a:r>
-              <a:rPr lang="es-ES" b="1" dirty="0" smtClean="0">
-                <a:latin typeface="Century Gothic" panose="020B0502020202020204" pitchFamily="34" charset="0"/>
-              </a:rPr>
-              <a:t>.</a:t>
-            </a:r>
-          </a:p>
-          <a:p>
-            <a:pPr marL="285750" indent="-285750">
-              <a:lnSpc>
-                <a:spcPct val="200000"/>
-              </a:lnSpc>
-              <a:buFont typeface="Arial" panose="020B0604020202020204" pitchFamily="34" charset="0"/>
-              <a:buChar char="•"/>
-            </a:pPr>
-            <a:r>
-              <a:rPr lang="es-ES" b="1" dirty="0" smtClean="0">
-                <a:latin typeface="Century Gothic" panose="020B0502020202020204" pitchFamily="34" charset="0"/>
-              </a:rPr>
-              <a:t>NSP.</a:t>
-            </a:r>
-          </a:p>
-          <a:p>
-            <a:pPr marL="285750" indent="-285750">
-              <a:lnSpc>
-                <a:spcPct val="200000"/>
-              </a:lnSpc>
-              <a:buFont typeface="Arial" panose="020B0604020202020204" pitchFamily="34" charset="0"/>
-              <a:buChar char="•"/>
-            </a:pPr>
-            <a:r>
-              <a:rPr lang="es-ES" b="1" dirty="0" err="1" smtClean="0">
-                <a:latin typeface="Century Gothic" panose="020B0502020202020204" pitchFamily="34" charset="0"/>
-              </a:rPr>
-              <a:t>Docker</a:t>
-            </a:r>
-            <a:r>
-              <a:rPr lang="es-ES" b="1" dirty="0" smtClean="0">
-                <a:latin typeface="Century Gothic" panose="020B0502020202020204" pitchFamily="34" charset="0"/>
-              </a:rPr>
-              <a:t>.</a:t>
-            </a:r>
-          </a:p>
-          <a:p>
-            <a:pPr marL="285750" indent="-285750">
-              <a:lnSpc>
-                <a:spcPct val="200000"/>
-              </a:lnSpc>
-              <a:buFont typeface="Arial" panose="020B0604020202020204" pitchFamily="34" charset="0"/>
-              <a:buChar char="•"/>
-            </a:pPr>
-            <a:r>
-              <a:rPr lang="es-ES" b="1" dirty="0" smtClean="0">
-                <a:latin typeface="Century Gothic" panose="020B0502020202020204" pitchFamily="34" charset="0"/>
-              </a:rPr>
-              <a:t>Clair y </a:t>
-            </a:r>
-            <a:r>
-              <a:rPr lang="es-ES" b="1" dirty="0" err="1" smtClean="0">
-                <a:latin typeface="Century Gothic" panose="020B0502020202020204" pitchFamily="34" charset="0"/>
-              </a:rPr>
-              <a:t>Clairctl</a:t>
-            </a:r>
-            <a:r>
-              <a:rPr lang="es-ES" b="1" dirty="0" smtClean="0">
-                <a:latin typeface="Century Gothic" panose="020B0502020202020204" pitchFamily="34" charset="0"/>
-              </a:rPr>
-              <a:t>.</a:t>
-            </a:r>
-          </a:p>
-          <a:p>
-            <a:pPr marL="285750" indent="-285750">
-              <a:lnSpc>
-                <a:spcPct val="200000"/>
-              </a:lnSpc>
-              <a:buFont typeface="Arial" panose="020B0604020202020204" pitchFamily="34" charset="0"/>
-              <a:buChar char="•"/>
-            </a:pPr>
-            <a:r>
-              <a:rPr lang="es-ES" b="1" dirty="0" smtClean="0">
-                <a:latin typeface="Century Gothic" panose="020B0502020202020204" pitchFamily="34" charset="0"/>
-              </a:rPr>
-              <a:t>Jenkins.</a:t>
-            </a:r>
-          </a:p>
-          <a:p>
-            <a:pPr marL="285750" indent="-285750">
-              <a:lnSpc>
-                <a:spcPct val="200000"/>
-              </a:lnSpc>
-              <a:buFont typeface="Arial" panose="020B0604020202020204" pitchFamily="34" charset="0"/>
-              <a:buChar char="•"/>
-            </a:pPr>
-            <a:r>
-              <a:rPr lang="es-ES" b="1" dirty="0" err="1" smtClean="0">
-                <a:latin typeface="Century Gothic" panose="020B0502020202020204" pitchFamily="34" charset="0"/>
-              </a:rPr>
-              <a:t>Slack</a:t>
-            </a:r>
-            <a:r>
-              <a:rPr lang="es-ES" b="1" dirty="0" smtClean="0">
-                <a:latin typeface="Century Gothic" panose="020B0502020202020204" pitchFamily="34" charset="0"/>
-              </a:rPr>
-              <a:t>.</a:t>
-            </a:r>
-            <a:endParaRPr lang="es-ES" b="1" dirty="0">
-              <a:latin typeface="Century Gothic" panose="020B0502020202020204" pitchFamily="34" charset="0"/>
-            </a:endParaRPr>
-          </a:p>
-        </p:txBody>
-      </p:sp>
     </p:spTree>
     <p:extLst>
       <p:ext uri="{BB962C8B-B14F-4D97-AF65-F5344CB8AC3E}">
@@ -17492,7 +17218,19 @@
                 <a:cs typeface="Quicksand"/>
                 <a:sym typeface="Quicksand"/>
               </a:rPr>
-              <a:t>Preparación del entorno</a:t>
+              <a:t>Preparación del </a:t>
+            </a:r>
+            <a:r>
+              <a:rPr lang="en" sz="2000" b="1" dirty="0" smtClean="0">
+                <a:solidFill>
+                  <a:schemeClr val="bg1"/>
+                </a:solidFill>
+                <a:latin typeface="Century Gothic" panose="020B0502020202020204" pitchFamily="34" charset="0"/>
+                <a:ea typeface="Quicksand"/>
+                <a:cs typeface="Quicksand"/>
+                <a:sym typeface="Quicksand"/>
+              </a:rPr>
+              <a:t>entorno – Docker Compose</a:t>
             </a:r>
             <a:endParaRPr lang="en" sz="2000" b="1" dirty="0">
               <a:solidFill>
@@ -17506,94 +17244,372 @@
           </a:p>
         </p:txBody>
       </p:sp>
-      <p:sp>
-        <p:nvSpPr>
-          <p:cNvPr id="2" name="CuadroTexto 1"/>
-          <p:cNvSpPr txBox="1"/>
-          <p:nvPr/>
-        </p:nvSpPr>
-        <p:spPr>
-          <a:xfrm>
-            <a:off x="3465973" y="3658690"/>
-            <a:ext cx="2192075" cy="369332"/>
-          </a:xfrm>
-          <a:prstGeom prst="rect">
-            <a:avLst/>
-          </a:prstGeom>
-          <a:noFill/>
-        </p:spPr>
-        <p:txBody>
-          <a:bodyPr wrap="none" rtlCol="0">
-            <a:spAutoFit/>
-          </a:bodyPr>
-          <a:lstStyle/>
-          <a:p>
-            <a:r>
-              <a:rPr lang="es-ES" dirty="0" smtClean="0"/>
-              <a:t>Esquema del entorno</a:t>
-            </a:r>
-            <a:endParaRPr lang="es-ES" dirty="0"/>
-          </a:p>
-        </p:txBody>
-      </p:sp>
-      <p:sp>
-        <p:nvSpPr>
-          <p:cNvPr id="3" name="CuadroTexto 2"/>
-          <p:cNvSpPr txBox="1"/>
-          <p:nvPr/>
-        </p:nvSpPr>
-        <p:spPr>
-          <a:xfrm>
-            <a:off x="1938105" y="6141493"/>
-            <a:ext cx="5267789" cy="553998"/>
-          </a:xfrm>
-          <a:prstGeom prst="rect">
-            <a:avLst/>
-          </a:prstGeom>
-          <a:noFill/>
-        </p:spPr>
-        <p:txBody>
-          <a:bodyPr wrap="none" rtlCol="0">
-            <a:spAutoFit/>
-          </a:bodyPr>
-          <a:lstStyle/>
-          <a:p>
-            <a:r>
-              <a:rPr lang="es-ES" sz="3000" b="1" dirty="0" err="1" smtClean="0">
-                <a:latin typeface="Century Gothic" panose="020B0502020202020204" pitchFamily="34" charset="0"/>
-              </a:rPr>
-              <a:t>Docker</a:t>
-            </a:r>
-            <a:r>
-              <a:rPr lang="es-ES" sz="3000" b="1" dirty="0" smtClean="0">
-                <a:latin typeface="Century Gothic" panose="020B0502020202020204" pitchFamily="34" charset="0"/>
-              </a:rPr>
-              <a:t> y </a:t>
-            </a:r>
-            <a:r>
-              <a:rPr lang="es-ES" sz="3000" b="1" dirty="0" err="1" smtClean="0">
-                <a:latin typeface="Century Gothic" panose="020B0502020202020204" pitchFamily="34" charset="0"/>
-              </a:rPr>
-              <a:t>Docker</a:t>
-            </a:r>
-            <a:r>
-              <a:rPr lang="es-ES" sz="3000" b="1" dirty="0" smtClean="0">
-                <a:latin typeface="Century Gothic" panose="020B0502020202020204" pitchFamily="34" charset="0"/>
-              </a:rPr>
-              <a:t> </a:t>
-            </a:r>
-            <a:r>
-              <a:rPr lang="es-ES" sz="3000" b="1" dirty="0" err="1" smtClean="0">
-                <a:latin typeface="Century Gothic" panose="020B0502020202020204" pitchFamily="34" charset="0"/>
-              </a:rPr>
-              <a:t>Compose</a:t>
-            </a:r>
-            <a:endParaRPr lang="es-ES" sz="3000" b="1" dirty="0">
-              <a:latin typeface="Century Gothic" panose="020B0502020202020204" pitchFamily="34" charset="0"/>
-            </a:endParaRPr>
-          </a:p>
-        </p:txBody>
-      </p:sp>
+      <p:pic>
+        <p:nvPicPr>
+          <p:cNvPr id="4" name="Imagen 3"/>
+          <p:cNvPicPr>
+            <a:picLocks noChangeAspect="1"/>
+          </p:cNvPicPr>
+          <p:nvPr/>
+        </p:nvPicPr>
+        <p:blipFill>
+          <a:blip r:embed="rId3" cstate="print">
+            <a:extLst>
+              <a:ext uri="{28A0092B-C50C-407E-A947-70E740481C1C}">
+                <a14:useLocalDpi xmlns:a14="http://schemas.microsoft.com/office/drawing/2010/main" val="0"/>
+              </a:ext>
+            </a:extLst>
+          </a:blip>
+          <a:stretch>
+            <a:fillRect/>
+          </a:stretch>
+        </p:blipFill>
+        <p:spPr>
+          <a:xfrm>
+            <a:off x="3871912" y="2130765"/>
+            <a:ext cx="2276475" cy="1620541"/>
+          </a:xfrm>
+          <a:prstGeom prst="rect">
+            <a:avLst/>
+          </a:prstGeom>
+        </p:spPr>
+      </p:pic>
+      <p:pic>
+        <p:nvPicPr>
+          <p:cNvPr id="7" name="Imagen 6"/>
+          <p:cNvPicPr>
+            <a:picLocks noChangeAspect="1"/>
+          </p:cNvPicPr>
+          <p:nvPr/>
+        </p:nvPicPr>
+        <p:blipFill rotWithShape="1">
+          <a:blip r:embed="rId4">
+            <a:extLst>
+              <a:ext uri="{28A0092B-C50C-407E-A947-70E740481C1C}">
+                <a14:useLocalDpi xmlns:a14="http://schemas.microsoft.com/office/drawing/2010/main" val="0"/>
+              </a:ext>
+            </a:extLst>
+          </a:blip>
+          <a:srcRect b="14824"/>
+          <a:stretch/>
+        </p:blipFill>
+        <p:spPr>
+          <a:xfrm>
+            <a:off x="745521" y="4325435"/>
+            <a:ext cx="7660792" cy="2387797"/>
+          </a:xfrm>
+          <a:prstGeom prst="rect">
+            <a:avLst/>
+          </a:prstGeom>
+        </p:spPr>
+      </p:pic>
+      <p:pic>
+        <p:nvPicPr>
+          <p:cNvPr id="22" name="Imagen 21"/>
+          <p:cNvPicPr>
+            <a:picLocks noChangeAspect="1"/>
+          </p:cNvPicPr>
+          <p:nvPr/>
+        </p:nvPicPr>
+        <p:blipFill>
+          <a:blip r:embed="rId5" cstate="print">
+            <a:extLst>
+              <a:ext uri="{28A0092B-C50C-407E-A947-70E740481C1C}">
+                <a14:useLocalDpi xmlns:a14="http://schemas.microsoft.com/office/drawing/2010/main" val="0"/>
+              </a:ext>
+            </a:extLst>
+          </a:blip>
+          <a:stretch>
+            <a:fillRect/>
+          </a:stretch>
+        </p:blipFill>
+        <p:spPr>
+          <a:xfrm>
+            <a:off x="792669" y="1889716"/>
+            <a:ext cx="934773" cy="794916"/>
+          </a:xfrm>
+          <a:prstGeom prst="rect">
+            <a:avLst/>
+          </a:prstGeom>
+        </p:spPr>
+      </p:pic>
+      <p:pic>
+        <p:nvPicPr>
+          <p:cNvPr id="23" name="Imagen 22"/>
+          <p:cNvPicPr>
+            <a:picLocks noChangeAspect="1"/>
+          </p:cNvPicPr>
+          <p:nvPr/>
+        </p:nvPicPr>
+        <p:blipFill>
+          <a:blip r:embed="rId6" cstate="print">
+            <a:extLst>
+              <a:ext uri="{28A0092B-C50C-407E-A947-70E740481C1C}">
+                <a14:useLocalDpi xmlns:a14="http://schemas.microsoft.com/office/drawing/2010/main" val="0"/>
+              </a:ext>
+            </a:extLst>
+          </a:blip>
+          <a:stretch>
+            <a:fillRect/>
+          </a:stretch>
+        </p:blipFill>
+        <p:spPr>
+          <a:xfrm>
+            <a:off x="882987" y="3146321"/>
+            <a:ext cx="754135" cy="749254"/>
+          </a:xfrm>
+          <a:prstGeom prst="rect">
+            <a:avLst/>
+          </a:prstGeom>
+        </p:spPr>
+      </p:pic>
+      <p:pic>
+        <p:nvPicPr>
+          <p:cNvPr id="8" name="Imagen 7"/>
+          <p:cNvPicPr>
+            <a:picLocks noChangeAspect="1"/>
+          </p:cNvPicPr>
+          <p:nvPr/>
+        </p:nvPicPr>
+        <p:blipFill>
+          <a:blip r:embed="rId7">
+            <a:extLst>
+              <a:ext uri="{28A0092B-C50C-407E-A947-70E740481C1C}">
+                <a14:useLocalDpi xmlns:a14="http://schemas.microsoft.com/office/drawing/2010/main" val="0"/>
+              </a:ext>
+            </a:extLst>
+          </a:blip>
+          <a:stretch>
+            <a:fillRect/>
+          </a:stretch>
+        </p:blipFill>
+        <p:spPr>
+          <a:xfrm>
+            <a:off x="7232049" y="1958332"/>
+            <a:ext cx="1281112" cy="657683"/>
+          </a:xfrm>
+          <a:prstGeom prst="rect">
+            <a:avLst/>
+          </a:prstGeom>
+        </p:spPr>
+      </p:pic>
+      <p:pic>
+        <p:nvPicPr>
+          <p:cNvPr id="9" name="Imagen 8"/>
+          <p:cNvPicPr>
+            <a:picLocks noChangeAspect="1"/>
+          </p:cNvPicPr>
+          <p:nvPr/>
+        </p:nvPicPr>
+        <p:blipFill>
+          <a:blip r:embed="rId8">
+            <a:extLst>
+              <a:ext uri="{28A0092B-C50C-407E-A947-70E740481C1C}">
+                <a14:useLocalDpi xmlns:a14="http://schemas.microsoft.com/office/drawing/2010/main" val="0"/>
+              </a:ext>
+            </a:extLst>
+          </a:blip>
+          <a:stretch>
+            <a:fillRect/>
+          </a:stretch>
+        </p:blipFill>
+        <p:spPr>
+          <a:xfrm>
+            <a:off x="7232049" y="3266057"/>
+            <a:ext cx="1281600" cy="657934"/>
+          </a:xfrm>
+          <a:prstGeom prst="rect">
+            <a:avLst/>
+          </a:prstGeom>
+        </p:spPr>
+      </p:pic>
+      <p:cxnSp>
+        <p:nvCxnSpPr>
+          <p:cNvPr id="20" name="Conector recto de flecha 19"/>
+          <p:cNvCxnSpPr>
+            <a:stCxn id="22" idx="3"/>
+          </p:cNvCxnSpPr>
+          <p:nvPr/>
+        </p:nvCxnSpPr>
+        <p:spPr>
+          <a:xfrm>
+            <a:off x="1727442" y="2287174"/>
+            <a:ext cx="2054150" cy="221309"/>
+          </a:xfrm>
+          <a:prstGeom prst="straightConnector1">
+            <a:avLst/>
+          </a:prstGeom>
+          <a:ln w="19050">
+            <a:solidFill>
+              <a:schemeClr val="tx1"/>
+            </a:solidFill>
+            <a:headEnd type="triangle"/>
+            <a:tailEnd type="triangle"/>
+          </a:ln>
+        </p:spPr>
+        <p:style>
+          <a:lnRef idx="1">
+            <a:schemeClr val="accent1"/>
+          </a:lnRef>
+          <a:fillRef idx="0">
+            <a:schemeClr val="accent1"/>
+          </a:fillRef>
+          <a:effectRef idx="0">
+            <a:schemeClr val="accent1"/>
+          </a:effectRef>
+          <a:fontRef idx="minor">
+            <a:schemeClr val="tx1"/>
+          </a:fontRef>
+        </p:style>
+      </p:cxnSp>
+      <p:cxnSp>
+        <p:nvCxnSpPr>
+          <p:cNvPr id="31" name="Conector recto de flecha 30"/>
+          <p:cNvCxnSpPr/>
+          <p:nvPr/>
+        </p:nvCxnSpPr>
+        <p:spPr>
+          <a:xfrm flipV="1">
+            <a:off x="1834682" y="3217302"/>
+            <a:ext cx="1946910" cy="254484"/>
+          </a:xfrm>
+          <a:prstGeom prst="straightConnector1">
+            <a:avLst/>
+          </a:prstGeom>
+          <a:ln w="19050">
+            <a:solidFill>
+              <a:schemeClr val="tx1"/>
+            </a:solidFill>
+            <a:headEnd type="triangle"/>
+            <a:tailEnd type="triangle"/>
+          </a:ln>
+        </p:spPr>
+        <p:style>
+          <a:lnRef idx="1">
+            <a:schemeClr val="accent1"/>
+          </a:lnRef>
+          <a:fillRef idx="0">
+            <a:schemeClr val="accent1"/>
+          </a:fillRef>
+          <a:effectRef idx="0">
+            <a:schemeClr val="accent1"/>
+          </a:effectRef>
+          <a:fontRef idx="minor">
+            <a:schemeClr val="tx1"/>
+          </a:fontRef>
+        </p:style>
+      </p:cxnSp>
+      <p:cxnSp>
+        <p:nvCxnSpPr>
+          <p:cNvPr id="32" name="Conector recto de flecha 31"/>
+          <p:cNvCxnSpPr/>
+          <p:nvPr/>
+        </p:nvCxnSpPr>
+        <p:spPr>
+          <a:xfrm>
+            <a:off x="4562011" y="3828900"/>
+            <a:ext cx="448138" cy="1790850"/>
+          </a:xfrm>
+          <a:prstGeom prst="straightConnector1">
+            <a:avLst/>
+          </a:prstGeom>
+          <a:ln w="19050">
+            <a:solidFill>
+              <a:schemeClr val="tx1"/>
+            </a:solidFill>
+            <a:headEnd type="triangle"/>
+            <a:tailEnd type="triangle"/>
+          </a:ln>
+        </p:spPr>
+        <p:style>
+          <a:lnRef idx="1">
+            <a:schemeClr val="accent1"/>
+          </a:lnRef>
+          <a:fillRef idx="0">
+            <a:schemeClr val="accent1"/>
+          </a:fillRef>
+          <a:effectRef idx="0">
+            <a:schemeClr val="accent1"/>
+          </a:effectRef>
+          <a:fontRef idx="minor">
+            <a:schemeClr val="tx1"/>
+          </a:fontRef>
+        </p:style>
+      </p:cxnSp>
+      <p:cxnSp>
+        <p:nvCxnSpPr>
+          <p:cNvPr id="34" name="Conector recto de flecha 33"/>
+          <p:cNvCxnSpPr/>
+          <p:nvPr/>
+        </p:nvCxnSpPr>
+        <p:spPr>
+          <a:xfrm>
+            <a:off x="5265252" y="3292042"/>
+            <a:ext cx="1868973" cy="302982"/>
+          </a:xfrm>
+          <a:prstGeom prst="straightConnector1">
+            <a:avLst/>
+          </a:prstGeom>
+          <a:ln w="19050">
+            <a:solidFill>
+              <a:schemeClr val="tx1"/>
+            </a:solidFill>
+            <a:headEnd type="triangle"/>
+            <a:tailEnd type="triangle"/>
+          </a:ln>
+        </p:spPr>
+        <p:style>
+          <a:lnRef idx="1">
+            <a:schemeClr val="accent1"/>
+          </a:lnRef>
+          <a:fillRef idx="0">
+            <a:schemeClr val="accent1"/>
+          </a:fillRef>
+          <a:effectRef idx="0">
+            <a:schemeClr val="accent1"/>
+          </a:effectRef>
+          <a:fontRef idx="minor">
+            <a:schemeClr val="tx1"/>
+          </a:fontRef>
+        </p:style>
+      </p:cxnSp>
+      <p:cxnSp>
+        <p:nvCxnSpPr>
+          <p:cNvPr id="36" name="Conector recto de flecha 35"/>
+          <p:cNvCxnSpPr/>
+          <p:nvPr/>
+        </p:nvCxnSpPr>
+        <p:spPr>
+          <a:xfrm flipV="1">
+            <a:off x="6148387" y="2279166"/>
+            <a:ext cx="985838" cy="69372"/>
+          </a:xfrm>
+          <a:prstGeom prst="straightConnector1">
+            <a:avLst/>
+          </a:prstGeom>
+          <a:ln w="19050">
+            <a:solidFill>
+              <a:schemeClr val="tx1"/>
+            </a:solidFill>
+            <a:headEnd type="triangle"/>
+            <a:tailEnd type="triangle"/>
+          </a:ln>
+        </p:spPr>
+        <p:style>
+          <a:lnRef idx="1">
+            <a:schemeClr val="accent1"/>
+          </a:lnRef>
+          <a:fillRef idx="0">
+            <a:schemeClr val="accent1"/>
+          </a:fillRef>
+          <a:effectRef idx="0">
+            <a:schemeClr val="accent1"/>
+          </a:effectRef>
+          <a:fontRef idx="minor">
+            <a:schemeClr val="tx1"/>
+          </a:fontRef>
+        </p:style>
+      </p:cxnSp>
     </p:spTree>
     <p:extLst>
       <p:ext uri="{BB962C8B-B14F-4D97-AF65-F5344CB8AC3E}">

</xml_diff>